<commit_message>
andy edit to slides
</commit_message>
<xml_diff>
--- a/Session 2/Using a Shiny App in Public Health research.pptx
+++ b/Session 2/Using a Shiny App in Public Health research.pptx
@@ -8,9 +8,9 @@
     <p:sldId id="256" r:id="rId5"/>
     <p:sldId id="266" r:id="rId6"/>
     <p:sldId id="267" r:id="rId7"/>
-    <p:sldId id="268" r:id="rId8"/>
-    <p:sldId id="269" r:id="rId9"/>
-    <p:sldId id="259" r:id="rId10"/>
+    <p:sldId id="269" r:id="rId8"/>
+    <p:sldId id="259" r:id="rId9"/>
+    <p:sldId id="282" r:id="rId10"/>
     <p:sldId id="260" r:id="rId11"/>
     <p:sldId id="270" r:id="rId12"/>
     <p:sldId id="271" r:id="rId13"/>
@@ -134,7 +134,7 @@
 <file path=ppt/revisionInfo.xml><?xml version="1.0" encoding="utf-8"?>
 <p1510:revInfo xmlns:a="http://schemas.openxmlformats.org/drawingml/2006/main" xmlns:r="http://schemas.openxmlformats.org/officeDocument/2006/relationships" xmlns:p1510="http://schemas.microsoft.com/office/powerpoint/2015/10/main">
   <p1510:revLst>
-    <p1510:client id="{DC40950D-4C33-4788-8B8E-52CBCA802C67}" v="2" dt="2020-05-14T09:53:13.791"/>
+    <p1510:client id="{8CE00DF8-0901-4D5B-A191-C478C226F4FD}" v="197" dt="2020-05-20T22:03:04.138"/>
   </p1510:revLst>
 </p1510:revInfo>
 </file>
@@ -199,6 +199,534 @@
             <pc:docMk/>
             <pc:sldMk cId="261947619" sldId="266"/>
             <ac:spMk id="3" creationId="{8C226544-3C37-4805-9152-390F9A45FE89}"/>
+          </ac:spMkLst>
+        </pc:spChg>
+      </pc:sldChg>
+    </pc:docChg>
+  </pc:docChgLst>
+  <pc:docChgLst>
+    <pc:chgData name="Andrew" userId="b45e9002-b033-421d-a3d9-6d42475e9a3f" providerId="ADAL" clId="{8CE00DF8-0901-4D5B-A191-C478C226F4FD}"/>
+    <pc:docChg chg="undo custSel mod addSld delSld modSld">
+      <pc:chgData name="Andrew" userId="b45e9002-b033-421d-a3d9-6d42475e9a3f" providerId="ADAL" clId="{8CE00DF8-0901-4D5B-A191-C478C226F4FD}" dt="2020-05-20T22:03:04.138" v="1006"/>
+      <pc:docMkLst>
+        <pc:docMk/>
+      </pc:docMkLst>
+      <pc:sldChg chg="modSp mod">
+        <pc:chgData name="Andrew" userId="b45e9002-b033-421d-a3d9-6d42475e9a3f" providerId="ADAL" clId="{8CE00DF8-0901-4D5B-A191-C478C226F4FD}" dt="2020-05-20T21:52:17.033" v="900" actId="15"/>
+        <pc:sldMkLst>
+          <pc:docMk/>
+          <pc:sldMk cId="3686729372" sldId="259"/>
+        </pc:sldMkLst>
+        <pc:spChg chg="mod">
+          <ac:chgData name="Andrew" userId="b45e9002-b033-421d-a3d9-6d42475e9a3f" providerId="ADAL" clId="{8CE00DF8-0901-4D5B-A191-C478C226F4FD}" dt="2020-05-20T21:52:17.033" v="900" actId="15"/>
+          <ac:spMkLst>
+            <pc:docMk/>
+            <pc:sldMk cId="3686729372" sldId="259"/>
+            <ac:spMk id="4" creationId="{CF62409D-4C04-4253-AA77-A41E96FDE308}"/>
+          </ac:spMkLst>
+        </pc:spChg>
+        <pc:spChg chg="mod">
+          <ac:chgData name="Andrew" userId="b45e9002-b033-421d-a3d9-6d42475e9a3f" providerId="ADAL" clId="{8CE00DF8-0901-4D5B-A191-C478C226F4FD}" dt="2020-05-20T21:52:13.713" v="899" actId="15"/>
+          <ac:spMkLst>
+            <pc:docMk/>
+            <pc:sldMk cId="3686729372" sldId="259"/>
+            <ac:spMk id="5" creationId="{E8424AA9-54FC-4335-BF18-E665AC8C0590}"/>
+          </ac:spMkLst>
+        </pc:spChg>
+      </pc:sldChg>
+      <pc:sldChg chg="addSp modSp mod modAnim">
+        <pc:chgData name="Andrew" userId="b45e9002-b033-421d-a3d9-6d42475e9a3f" providerId="ADAL" clId="{8CE00DF8-0901-4D5B-A191-C478C226F4FD}" dt="2020-05-20T21:40:38.173" v="595" actId="14100"/>
+        <pc:sldMkLst>
+          <pc:docMk/>
+          <pc:sldMk cId="908204321" sldId="260"/>
+        </pc:sldMkLst>
+        <pc:spChg chg="add mod">
+          <ac:chgData name="Andrew" userId="b45e9002-b033-421d-a3d9-6d42475e9a3f" providerId="ADAL" clId="{8CE00DF8-0901-4D5B-A191-C478C226F4FD}" dt="2020-05-20T21:40:38.173" v="595" actId="14100"/>
+          <ac:spMkLst>
+            <pc:docMk/>
+            <pc:sldMk cId="908204321" sldId="260"/>
+            <ac:spMk id="11" creationId="{67D85D37-9E79-4791-8DDD-AF62231666D1}"/>
+          </ac:spMkLst>
+        </pc:spChg>
+        <pc:grpChg chg="add mod">
+          <ac:chgData name="Andrew" userId="b45e9002-b033-421d-a3d9-6d42475e9a3f" providerId="ADAL" clId="{8CE00DF8-0901-4D5B-A191-C478C226F4FD}" dt="2020-05-20T21:13:51.733" v="19" actId="164"/>
+          <ac:grpSpMkLst>
+            <pc:docMk/>
+            <pc:sldMk cId="908204321" sldId="260"/>
+            <ac:grpSpMk id="18" creationId="{F143B0D9-F7FB-4D00-92E2-090FBFF468B0}"/>
+          </ac:grpSpMkLst>
+        </pc:grpChg>
+        <pc:picChg chg="add mod">
+          <ac:chgData name="Andrew" userId="b45e9002-b033-421d-a3d9-6d42475e9a3f" providerId="ADAL" clId="{8CE00DF8-0901-4D5B-A191-C478C226F4FD}" dt="2020-05-20T21:13:51.733" v="19" actId="164"/>
+          <ac:picMkLst>
+            <pc:docMk/>
+            <pc:sldMk cId="908204321" sldId="260"/>
+            <ac:picMk id="10" creationId="{F5713540-BD38-4002-8DE4-A5478AB092F8}"/>
+          </ac:picMkLst>
+        </pc:picChg>
+      </pc:sldChg>
+      <pc:sldChg chg="addSp modSp mod modAnim">
+        <pc:chgData name="Andrew" userId="b45e9002-b033-421d-a3d9-6d42475e9a3f" providerId="ADAL" clId="{8CE00DF8-0901-4D5B-A191-C478C226F4FD}" dt="2020-05-20T22:03:04.138" v="1006"/>
+        <pc:sldMkLst>
+          <pc:docMk/>
+          <pc:sldMk cId="3761447557" sldId="261"/>
+        </pc:sldMkLst>
+        <pc:spChg chg="add mod">
+          <ac:chgData name="Andrew" userId="b45e9002-b033-421d-a3d9-6d42475e9a3f" providerId="ADAL" clId="{8CE00DF8-0901-4D5B-A191-C478C226F4FD}" dt="2020-05-20T22:02:57.012" v="1004" actId="164"/>
+          <ac:spMkLst>
+            <pc:docMk/>
+            <pc:sldMk cId="3761447557" sldId="261"/>
+            <ac:spMk id="3" creationId="{B8F2A13F-5181-4591-AA30-6E797816C567}"/>
+          </ac:spMkLst>
+        </pc:spChg>
+        <pc:grpChg chg="add mod">
+          <ac:chgData name="Andrew" userId="b45e9002-b033-421d-a3d9-6d42475e9a3f" providerId="ADAL" clId="{8CE00DF8-0901-4D5B-A191-C478C226F4FD}" dt="2020-05-20T22:02:57.012" v="1004" actId="164"/>
+          <ac:grpSpMkLst>
+            <pc:docMk/>
+            <pc:sldMk cId="3761447557" sldId="261"/>
+            <ac:grpSpMk id="35" creationId="{0105102C-5C57-4F10-A3A2-EAAA856DE4DC}"/>
+          </ac:grpSpMkLst>
+        </pc:grpChg>
+        <pc:cxnChg chg="add mod">
+          <ac:chgData name="Andrew" userId="b45e9002-b033-421d-a3d9-6d42475e9a3f" providerId="ADAL" clId="{8CE00DF8-0901-4D5B-A191-C478C226F4FD}" dt="2020-05-20T22:02:57.012" v="1004" actId="164"/>
+          <ac:cxnSpMkLst>
+            <pc:docMk/>
+            <pc:sldMk cId="3761447557" sldId="261"/>
+            <ac:cxnSpMk id="16" creationId="{B4D03CFC-02B7-48EA-91F8-F54C713B6722}"/>
+          </ac:cxnSpMkLst>
+        </pc:cxnChg>
+        <pc:cxnChg chg="add mod">
+          <ac:chgData name="Andrew" userId="b45e9002-b033-421d-a3d9-6d42475e9a3f" providerId="ADAL" clId="{8CE00DF8-0901-4D5B-A191-C478C226F4FD}" dt="2020-05-20T22:02:57.012" v="1004" actId="164"/>
+          <ac:cxnSpMkLst>
+            <pc:docMk/>
+            <pc:sldMk cId="3761447557" sldId="261"/>
+            <ac:cxnSpMk id="18" creationId="{B077C113-0037-49EE-9036-2728D1E71879}"/>
+          </ac:cxnSpMkLst>
+        </pc:cxnChg>
+        <pc:cxnChg chg="add mod">
+          <ac:chgData name="Andrew" userId="b45e9002-b033-421d-a3d9-6d42475e9a3f" providerId="ADAL" clId="{8CE00DF8-0901-4D5B-A191-C478C226F4FD}" dt="2020-05-20T22:02:57.012" v="1004" actId="164"/>
+          <ac:cxnSpMkLst>
+            <pc:docMk/>
+            <pc:sldMk cId="3761447557" sldId="261"/>
+            <ac:cxnSpMk id="20" creationId="{7579F93B-C80E-430D-B27B-B93F1532C15F}"/>
+          </ac:cxnSpMkLst>
+        </pc:cxnChg>
+        <pc:cxnChg chg="add mod">
+          <ac:chgData name="Andrew" userId="b45e9002-b033-421d-a3d9-6d42475e9a3f" providerId="ADAL" clId="{8CE00DF8-0901-4D5B-A191-C478C226F4FD}" dt="2020-05-20T22:02:57.012" v="1004" actId="164"/>
+          <ac:cxnSpMkLst>
+            <pc:docMk/>
+            <pc:sldMk cId="3761447557" sldId="261"/>
+            <ac:cxnSpMk id="23" creationId="{B0733D21-B278-4674-8E66-722764F03F8D}"/>
+          </ac:cxnSpMkLst>
+        </pc:cxnChg>
+        <pc:cxnChg chg="add mod">
+          <ac:chgData name="Andrew" userId="b45e9002-b033-421d-a3d9-6d42475e9a3f" providerId="ADAL" clId="{8CE00DF8-0901-4D5B-A191-C478C226F4FD}" dt="2020-05-20T22:02:57.012" v="1004" actId="164"/>
+          <ac:cxnSpMkLst>
+            <pc:docMk/>
+            <pc:sldMk cId="3761447557" sldId="261"/>
+            <ac:cxnSpMk id="26" creationId="{347AD8E4-44EE-44E0-B545-21D10B93C6F9}"/>
+          </ac:cxnSpMkLst>
+        </pc:cxnChg>
+        <pc:cxnChg chg="add mod">
+          <ac:chgData name="Andrew" userId="b45e9002-b033-421d-a3d9-6d42475e9a3f" providerId="ADAL" clId="{8CE00DF8-0901-4D5B-A191-C478C226F4FD}" dt="2020-05-20T22:02:57.012" v="1004" actId="164"/>
+          <ac:cxnSpMkLst>
+            <pc:docMk/>
+            <pc:sldMk cId="3761447557" sldId="261"/>
+            <ac:cxnSpMk id="32" creationId="{5745DF77-C913-4213-9FE6-F2D1D457B19B}"/>
+          </ac:cxnSpMkLst>
+        </pc:cxnChg>
+      </pc:sldChg>
+      <pc:sldChg chg="addSp modSp mod setBg">
+        <pc:chgData name="Andrew" userId="b45e9002-b033-421d-a3d9-6d42475e9a3f" providerId="ADAL" clId="{8CE00DF8-0901-4D5B-A191-C478C226F4FD}" dt="2020-05-20T21:42:03.536" v="600" actId="403"/>
+        <pc:sldMkLst>
+          <pc:docMk/>
+          <pc:sldMk cId="261947619" sldId="266"/>
+        </pc:sldMkLst>
+        <pc:spChg chg="mod">
+          <ac:chgData name="Andrew" userId="b45e9002-b033-421d-a3d9-6d42475e9a3f" providerId="ADAL" clId="{8CE00DF8-0901-4D5B-A191-C478C226F4FD}" dt="2020-05-20T21:41:56.124" v="597" actId="26606"/>
+          <ac:spMkLst>
+            <pc:docMk/>
+            <pc:sldMk cId="261947619" sldId="266"/>
+            <ac:spMk id="2" creationId="{781DA50D-B4DD-4269-BFFE-FC3840DEF882}"/>
+          </ac:spMkLst>
+        </pc:spChg>
+        <pc:spChg chg="mod">
+          <ac:chgData name="Andrew" userId="b45e9002-b033-421d-a3d9-6d42475e9a3f" providerId="ADAL" clId="{8CE00DF8-0901-4D5B-A191-C478C226F4FD}" dt="2020-05-20T21:42:03.536" v="600" actId="403"/>
+          <ac:spMkLst>
+            <pc:docMk/>
+            <pc:sldMk cId="261947619" sldId="266"/>
+            <ac:spMk id="3" creationId="{8C226544-3C37-4805-9152-390F9A45FE89}"/>
+          </ac:spMkLst>
+        </pc:spChg>
+        <pc:picChg chg="add">
+          <ac:chgData name="Andrew" userId="b45e9002-b033-421d-a3d9-6d42475e9a3f" providerId="ADAL" clId="{8CE00DF8-0901-4D5B-A191-C478C226F4FD}" dt="2020-05-20T21:41:56.124" v="597" actId="26606"/>
+          <ac:picMkLst>
+            <pc:docMk/>
+            <pc:sldMk cId="261947619" sldId="266"/>
+            <ac:picMk id="7" creationId="{3AE17242-D677-4AA8-B743-4BA853F539A6}"/>
+          </ac:picMkLst>
+        </pc:picChg>
+      </pc:sldChg>
+      <pc:sldChg chg="addSp delSp modSp mod modClrScheme chgLayout">
+        <pc:chgData name="Andrew" userId="b45e9002-b033-421d-a3d9-6d42475e9a3f" providerId="ADAL" clId="{8CE00DF8-0901-4D5B-A191-C478C226F4FD}" dt="2020-05-20T21:50:30.963" v="830" actId="20577"/>
+        <pc:sldMkLst>
+          <pc:docMk/>
+          <pc:sldMk cId="314727036" sldId="267"/>
+        </pc:sldMkLst>
+        <pc:spChg chg="mod ord">
+          <ac:chgData name="Andrew" userId="b45e9002-b033-421d-a3d9-6d42475e9a3f" providerId="ADAL" clId="{8CE00DF8-0901-4D5B-A191-C478C226F4FD}" dt="2020-05-20T21:48:02.628" v="760" actId="700"/>
+          <ac:spMkLst>
+            <pc:docMk/>
+            <pc:sldMk cId="314727036" sldId="267"/>
+            <ac:spMk id="2" creationId="{F5F79D3D-9F98-4BB9-A9BC-1717C442783F}"/>
+          </ac:spMkLst>
+        </pc:spChg>
+        <pc:spChg chg="mod ord">
+          <ac:chgData name="Andrew" userId="b45e9002-b033-421d-a3d9-6d42475e9a3f" providerId="ADAL" clId="{8CE00DF8-0901-4D5B-A191-C478C226F4FD}" dt="2020-05-20T21:49:48.716" v="797" actId="14100"/>
+          <ac:spMkLst>
+            <pc:docMk/>
+            <pc:sldMk cId="314727036" sldId="267"/>
+            <ac:spMk id="3" creationId="{CCEB4128-F60D-4740-81B4-2A3EF62025F0}"/>
+          </ac:spMkLst>
+        </pc:spChg>
+        <pc:spChg chg="add del mod">
+          <ac:chgData name="Andrew" userId="b45e9002-b033-421d-a3d9-6d42475e9a3f" providerId="ADAL" clId="{8CE00DF8-0901-4D5B-A191-C478C226F4FD}" dt="2020-05-20T21:45:31.666" v="688" actId="478"/>
+          <ac:spMkLst>
+            <pc:docMk/>
+            <pc:sldMk cId="314727036" sldId="267"/>
+            <ac:spMk id="4" creationId="{A0E44E43-8D4F-4794-A251-32C372B1A832}"/>
+          </ac:spMkLst>
+        </pc:spChg>
+        <pc:spChg chg="add mod ord">
+          <ac:chgData name="Andrew" userId="b45e9002-b033-421d-a3d9-6d42475e9a3f" providerId="ADAL" clId="{8CE00DF8-0901-4D5B-A191-C478C226F4FD}" dt="2020-05-20T21:50:30.963" v="830" actId="20577"/>
+          <ac:spMkLst>
+            <pc:docMk/>
+            <pc:sldMk cId="314727036" sldId="267"/>
+            <ac:spMk id="5" creationId="{28624F95-0814-48E2-A3C0-68841245C8F9}"/>
+          </ac:spMkLst>
+        </pc:spChg>
+        <pc:spChg chg="add del mod ord">
+          <ac:chgData name="Andrew" userId="b45e9002-b033-421d-a3d9-6d42475e9a3f" providerId="ADAL" clId="{8CE00DF8-0901-4D5B-A191-C478C226F4FD}" dt="2020-05-20T21:48:07.594" v="764" actId="478"/>
+          <ac:spMkLst>
+            <pc:docMk/>
+            <pc:sldMk cId="314727036" sldId="267"/>
+            <ac:spMk id="6" creationId="{FB9CDD1E-A567-4500-B96F-4B46E9882CBD}"/>
+          </ac:spMkLst>
+        </pc:spChg>
+        <pc:spChg chg="add del mod ord">
+          <ac:chgData name="Andrew" userId="b45e9002-b033-421d-a3d9-6d42475e9a3f" providerId="ADAL" clId="{8CE00DF8-0901-4D5B-A191-C478C226F4FD}" dt="2020-05-20T21:48:09.936" v="765" actId="478"/>
+          <ac:spMkLst>
+            <pc:docMk/>
+            <pc:sldMk cId="314727036" sldId="267"/>
+            <ac:spMk id="7" creationId="{BEDD0D56-446B-46FC-96D5-37148C8AD4D7}"/>
+          </ac:spMkLst>
+        </pc:spChg>
+      </pc:sldChg>
+      <pc:sldChg chg="modSp del mod">
+        <pc:chgData name="Andrew" userId="b45e9002-b033-421d-a3d9-6d42475e9a3f" providerId="ADAL" clId="{8CE00DF8-0901-4D5B-A191-C478C226F4FD}" dt="2020-05-20T21:45:08.372" v="685" actId="47"/>
+        <pc:sldMkLst>
+          <pc:docMk/>
+          <pc:sldMk cId="387730021" sldId="268"/>
+        </pc:sldMkLst>
+        <pc:spChg chg="mod">
+          <ac:chgData name="Andrew" userId="b45e9002-b033-421d-a3d9-6d42475e9a3f" providerId="ADAL" clId="{8CE00DF8-0901-4D5B-A191-C478C226F4FD}" dt="2020-05-20T21:44:15.548" v="667" actId="14100"/>
+          <ac:spMkLst>
+            <pc:docMk/>
+            <pc:sldMk cId="387730021" sldId="268"/>
+            <ac:spMk id="10" creationId="{4CCB4A21-46D0-4343-84BD-0AF63F2B8F5C}"/>
+          </ac:spMkLst>
+        </pc:spChg>
+      </pc:sldChg>
+      <pc:sldChg chg="modSp">
+        <pc:chgData name="Andrew" userId="b45e9002-b033-421d-a3d9-6d42475e9a3f" providerId="ADAL" clId="{8CE00DF8-0901-4D5B-A191-C478C226F4FD}" dt="2020-05-20T21:51:48.383" v="896" actId="20577"/>
+        <pc:sldMkLst>
+          <pc:docMk/>
+          <pc:sldMk cId="3105061773" sldId="269"/>
+        </pc:sldMkLst>
+        <pc:graphicFrameChg chg="mod">
+          <ac:chgData name="Andrew" userId="b45e9002-b033-421d-a3d9-6d42475e9a3f" providerId="ADAL" clId="{8CE00DF8-0901-4D5B-A191-C478C226F4FD}" dt="2020-05-20T21:51:48.383" v="896" actId="20577"/>
+          <ac:graphicFrameMkLst>
+            <pc:docMk/>
+            <pc:sldMk cId="3105061773" sldId="269"/>
+            <ac:graphicFrameMk id="10" creationId="{0E701701-8FF9-4F83-B102-02825D96A351}"/>
+          </ac:graphicFrameMkLst>
+        </pc:graphicFrameChg>
+      </pc:sldChg>
+      <pc:sldChg chg="addSp delSp modSp new mod modAnim">
+        <pc:chgData name="Andrew" userId="b45e9002-b033-421d-a3d9-6d42475e9a3f" providerId="ADAL" clId="{8CE00DF8-0901-4D5B-A191-C478C226F4FD}" dt="2020-05-20T21:38:57.875" v="594"/>
+        <pc:sldMkLst>
+          <pc:docMk/>
+          <pc:sldMk cId="379422893" sldId="282"/>
+        </pc:sldMkLst>
+        <pc:spChg chg="mod">
+          <ac:chgData name="Andrew" userId="b45e9002-b033-421d-a3d9-6d42475e9a3f" providerId="ADAL" clId="{8CE00DF8-0901-4D5B-A191-C478C226F4FD}" dt="2020-05-20T21:19:05.237" v="400" actId="20577"/>
+          <ac:spMkLst>
+            <pc:docMk/>
+            <pc:sldMk cId="379422893" sldId="282"/>
+            <ac:spMk id="2" creationId="{46129A8C-8A94-4F15-95A6-4C2F51B8FB9A}"/>
+          </ac:spMkLst>
+        </pc:spChg>
+        <pc:spChg chg="mod">
+          <ac:chgData name="Andrew" userId="b45e9002-b033-421d-a3d9-6d42475e9a3f" providerId="ADAL" clId="{8CE00DF8-0901-4D5B-A191-C478C226F4FD}" dt="2020-05-20T21:35:43.650" v="537" actId="242"/>
+          <ac:spMkLst>
+            <pc:docMk/>
+            <pc:sldMk cId="379422893" sldId="282"/>
+            <ac:spMk id="3" creationId="{F6FCFF02-107A-484A-A357-DD1BA0B4CC1F}"/>
+          </ac:spMkLst>
+        </pc:spChg>
+        <pc:spChg chg="del mod">
+          <ac:chgData name="Andrew" userId="b45e9002-b033-421d-a3d9-6d42475e9a3f" providerId="ADAL" clId="{8CE00DF8-0901-4D5B-A191-C478C226F4FD}" dt="2020-05-20T21:19:23.013" v="408" actId="478"/>
+          <ac:spMkLst>
+            <pc:docMk/>
+            <pc:sldMk cId="379422893" sldId="282"/>
+            <ac:spMk id="4" creationId="{C384DF64-16B6-4B01-B1FD-93F44FA6045E}"/>
+          </ac:spMkLst>
+        </pc:spChg>
+        <pc:spChg chg="add mod ord topLvl">
+          <ac:chgData name="Andrew" userId="b45e9002-b033-421d-a3d9-6d42475e9a3f" providerId="ADAL" clId="{8CE00DF8-0901-4D5B-A191-C478C226F4FD}" dt="2020-05-20T21:33:55.368" v="516" actId="164"/>
+          <ac:spMkLst>
+            <pc:docMk/>
+            <pc:sldMk cId="379422893" sldId="282"/>
+            <ac:spMk id="5" creationId="{E0ABDC7F-4E83-4525-8E65-D3F1831BF91E}"/>
+          </ac:spMkLst>
+        </pc:spChg>
+        <pc:spChg chg="add mod">
+          <ac:chgData name="Andrew" userId="b45e9002-b033-421d-a3d9-6d42475e9a3f" providerId="ADAL" clId="{8CE00DF8-0901-4D5B-A191-C478C226F4FD}" dt="2020-05-20T21:23:52.199" v="432" actId="208"/>
+          <ac:spMkLst>
+            <pc:docMk/>
+            <pc:sldMk cId="379422893" sldId="282"/>
+            <ac:spMk id="6" creationId="{A37EC92B-46A4-432A-BFB4-17895B2CA251}"/>
+          </ac:spMkLst>
+        </pc:spChg>
+        <pc:spChg chg="add mod">
+          <ac:chgData name="Andrew" userId="b45e9002-b033-421d-a3d9-6d42475e9a3f" providerId="ADAL" clId="{8CE00DF8-0901-4D5B-A191-C478C226F4FD}" dt="2020-05-20T21:36:47.242" v="542" actId="164"/>
+          <ac:spMkLst>
+            <pc:docMk/>
+            <pc:sldMk cId="379422893" sldId="282"/>
+            <ac:spMk id="7" creationId="{9F78966E-516F-42B9-99AA-FF84048F3434}"/>
+          </ac:spMkLst>
+        </pc:spChg>
+        <pc:spChg chg="add mod">
+          <ac:chgData name="Andrew" userId="b45e9002-b033-421d-a3d9-6d42475e9a3f" providerId="ADAL" clId="{8CE00DF8-0901-4D5B-A191-C478C226F4FD}" dt="2020-05-20T21:36:47.242" v="542" actId="164"/>
+          <ac:spMkLst>
+            <pc:docMk/>
+            <pc:sldMk cId="379422893" sldId="282"/>
+            <ac:spMk id="8" creationId="{56AD8C75-73D6-4EF2-90B9-63CDD91DF6CB}"/>
+          </ac:spMkLst>
+        </pc:spChg>
+        <pc:spChg chg="add mod">
+          <ac:chgData name="Andrew" userId="b45e9002-b033-421d-a3d9-6d42475e9a3f" providerId="ADAL" clId="{8CE00DF8-0901-4D5B-A191-C478C226F4FD}" dt="2020-05-20T21:36:47.242" v="542" actId="164"/>
+          <ac:spMkLst>
+            <pc:docMk/>
+            <pc:sldMk cId="379422893" sldId="282"/>
+            <ac:spMk id="9" creationId="{5B0A65A4-526A-47B9-9E7B-9F8D14D1DFEF}"/>
+          </ac:spMkLst>
+        </pc:spChg>
+        <pc:spChg chg="add mod">
+          <ac:chgData name="Andrew" userId="b45e9002-b033-421d-a3d9-6d42475e9a3f" providerId="ADAL" clId="{8CE00DF8-0901-4D5B-A191-C478C226F4FD}" dt="2020-05-20T21:27:14.038" v="459" actId="208"/>
+          <ac:spMkLst>
+            <pc:docMk/>
+            <pc:sldMk cId="379422893" sldId="282"/>
+            <ac:spMk id="10" creationId="{EAFB4463-E613-429E-834A-604D6F167A34}"/>
+          </ac:spMkLst>
+        </pc:spChg>
+        <pc:spChg chg="add mod">
+          <ac:chgData name="Andrew" userId="b45e9002-b033-421d-a3d9-6d42475e9a3f" providerId="ADAL" clId="{8CE00DF8-0901-4D5B-A191-C478C226F4FD}" dt="2020-05-20T21:36:49.428" v="543" actId="164"/>
+          <ac:spMkLst>
+            <pc:docMk/>
+            <pc:sldMk cId="379422893" sldId="282"/>
+            <ac:spMk id="11" creationId="{0C8ADD41-3DAA-4C2A-927B-0A7B30EF2D9A}"/>
+          </ac:spMkLst>
+        </pc:spChg>
+        <pc:spChg chg="add mod">
+          <ac:chgData name="Andrew" userId="b45e9002-b033-421d-a3d9-6d42475e9a3f" providerId="ADAL" clId="{8CE00DF8-0901-4D5B-A191-C478C226F4FD}" dt="2020-05-20T21:36:49.428" v="543" actId="164"/>
+          <ac:spMkLst>
+            <pc:docMk/>
+            <pc:sldMk cId="379422893" sldId="282"/>
+            <ac:spMk id="12" creationId="{5875F767-B307-46A9-ACBB-6F97B393D0C1}"/>
+          </ac:spMkLst>
+        </pc:spChg>
+        <pc:spChg chg="add mod topLvl">
+          <ac:chgData name="Andrew" userId="b45e9002-b033-421d-a3d9-6d42475e9a3f" providerId="ADAL" clId="{8CE00DF8-0901-4D5B-A191-C478C226F4FD}" dt="2020-05-20T21:33:55.368" v="516" actId="164"/>
+          <ac:spMkLst>
+            <pc:docMk/>
+            <pc:sldMk cId="379422893" sldId="282"/>
+            <ac:spMk id="13" creationId="{4B5CB373-0530-4472-B37F-3F92993F8BAE}"/>
+          </ac:spMkLst>
+        </pc:spChg>
+        <pc:spChg chg="add mod ord topLvl">
+          <ac:chgData name="Andrew" userId="b45e9002-b033-421d-a3d9-6d42475e9a3f" providerId="ADAL" clId="{8CE00DF8-0901-4D5B-A191-C478C226F4FD}" dt="2020-05-20T21:33:55.368" v="516" actId="164"/>
+          <ac:spMkLst>
+            <pc:docMk/>
+            <pc:sldMk cId="379422893" sldId="282"/>
+            <ac:spMk id="14" creationId="{A8244744-2A77-42A3-97F2-62CA534337A9}"/>
+          </ac:spMkLst>
+        </pc:spChg>
+        <pc:spChg chg="add mod ord topLvl">
+          <ac:chgData name="Andrew" userId="b45e9002-b033-421d-a3d9-6d42475e9a3f" providerId="ADAL" clId="{8CE00DF8-0901-4D5B-A191-C478C226F4FD}" dt="2020-05-20T21:33:55.368" v="516" actId="164"/>
+          <ac:spMkLst>
+            <pc:docMk/>
+            <pc:sldMk cId="379422893" sldId="282"/>
+            <ac:spMk id="15" creationId="{2D92F3E0-009F-42C2-98E5-B88ADF912C0E}"/>
+          </ac:spMkLst>
+        </pc:spChg>
+        <pc:spChg chg="add mod ord topLvl">
+          <ac:chgData name="Andrew" userId="b45e9002-b033-421d-a3d9-6d42475e9a3f" providerId="ADAL" clId="{8CE00DF8-0901-4D5B-A191-C478C226F4FD}" dt="2020-05-20T21:33:55.368" v="516" actId="164"/>
+          <ac:spMkLst>
+            <pc:docMk/>
+            <pc:sldMk cId="379422893" sldId="282"/>
+            <ac:spMk id="16" creationId="{C44E4B26-B732-4CB1-AC53-0CDEA9E3E0FB}"/>
+          </ac:spMkLst>
+        </pc:spChg>
+        <pc:spChg chg="add mod ord topLvl">
+          <ac:chgData name="Andrew" userId="b45e9002-b033-421d-a3d9-6d42475e9a3f" providerId="ADAL" clId="{8CE00DF8-0901-4D5B-A191-C478C226F4FD}" dt="2020-05-20T21:33:55.368" v="516" actId="164"/>
+          <ac:spMkLst>
+            <pc:docMk/>
+            <pc:sldMk cId="379422893" sldId="282"/>
+            <ac:spMk id="17" creationId="{0494615E-99B7-4D84-B647-7C94E70BF177}"/>
+          </ac:spMkLst>
+        </pc:spChg>
+        <pc:spChg chg="add del mod">
+          <ac:chgData name="Andrew" userId="b45e9002-b033-421d-a3d9-6d42475e9a3f" providerId="ADAL" clId="{8CE00DF8-0901-4D5B-A191-C478C226F4FD}" dt="2020-05-20T21:32:51.036" v="505" actId="478"/>
+          <ac:spMkLst>
+            <pc:docMk/>
+            <pc:sldMk cId="379422893" sldId="282"/>
+            <ac:spMk id="19" creationId="{FFDF21D5-E6D5-4F57-9A18-08F2BDC6EB2B}"/>
+          </ac:spMkLst>
+        </pc:spChg>
+        <pc:spChg chg="add del mod">
+          <ac:chgData name="Andrew" userId="b45e9002-b033-421d-a3d9-6d42475e9a3f" providerId="ADAL" clId="{8CE00DF8-0901-4D5B-A191-C478C226F4FD}" dt="2020-05-20T21:33:09.149" v="509" actId="478"/>
+          <ac:spMkLst>
+            <pc:docMk/>
+            <pc:sldMk cId="379422893" sldId="282"/>
+            <ac:spMk id="20" creationId="{7AEA3B1E-2C5A-4AE6-A8F6-EDD67CF24430}"/>
+          </ac:spMkLst>
+        </pc:spChg>
+        <pc:spChg chg="add mod">
+          <ac:chgData name="Andrew" userId="b45e9002-b033-421d-a3d9-6d42475e9a3f" providerId="ADAL" clId="{8CE00DF8-0901-4D5B-A191-C478C226F4FD}" dt="2020-05-20T21:34:08.777" v="520" actId="207"/>
+          <ac:spMkLst>
+            <pc:docMk/>
+            <pc:sldMk cId="379422893" sldId="282"/>
+            <ac:spMk id="21" creationId="{16FE22ED-761B-4BCD-89D0-E3FBEC9A9A04}"/>
+          </ac:spMkLst>
+        </pc:spChg>
+        <pc:spChg chg="add mod ord">
+          <ac:chgData name="Andrew" userId="b45e9002-b033-421d-a3d9-6d42475e9a3f" providerId="ADAL" clId="{8CE00DF8-0901-4D5B-A191-C478C226F4FD}" dt="2020-05-20T21:35:16.617" v="531" actId="2085"/>
+          <ac:spMkLst>
+            <pc:docMk/>
+            <pc:sldMk cId="379422893" sldId="282"/>
+            <ac:spMk id="23" creationId="{46AAD75B-A2E9-4A40-ABB3-63A55FA528F2}"/>
+          </ac:spMkLst>
+        </pc:spChg>
+        <pc:spChg chg="add mod">
+          <ac:chgData name="Andrew" userId="b45e9002-b033-421d-a3d9-6d42475e9a3f" providerId="ADAL" clId="{8CE00DF8-0901-4D5B-A191-C478C226F4FD}" dt="2020-05-20T21:37:53.653" v="565" actId="1076"/>
+          <ac:spMkLst>
+            <pc:docMk/>
+            <pc:sldMk cId="379422893" sldId="282"/>
+            <ac:spMk id="27" creationId="{2D5B71C1-14CC-4752-B9A8-21CCF3FD711D}"/>
+          </ac:spMkLst>
+        </pc:spChg>
+        <pc:spChg chg="add mod">
+          <ac:chgData name="Andrew" userId="b45e9002-b033-421d-a3d9-6d42475e9a3f" providerId="ADAL" clId="{8CE00DF8-0901-4D5B-A191-C478C226F4FD}" dt="2020-05-20T21:38:17.117" v="581" actId="1076"/>
+          <ac:spMkLst>
+            <pc:docMk/>
+            <pc:sldMk cId="379422893" sldId="282"/>
+            <ac:spMk id="28" creationId="{8EE31F69-9D61-4487-84B1-EA47FD2CC172}"/>
+          </ac:spMkLst>
+        </pc:spChg>
+        <pc:spChg chg="add mod">
+          <ac:chgData name="Andrew" userId="b45e9002-b033-421d-a3d9-6d42475e9a3f" providerId="ADAL" clId="{8CE00DF8-0901-4D5B-A191-C478C226F4FD}" dt="2020-05-20T21:38:36.597" v="593" actId="1076"/>
+          <ac:spMkLst>
+            <pc:docMk/>
+            <pc:sldMk cId="379422893" sldId="282"/>
+            <ac:spMk id="29" creationId="{26080F22-FDEF-410B-A0D0-67DA53833F53}"/>
+          </ac:spMkLst>
+        </pc:spChg>
+        <pc:grpChg chg="add del mod">
+          <ac:chgData name="Andrew" userId="b45e9002-b033-421d-a3d9-6d42475e9a3f" providerId="ADAL" clId="{8CE00DF8-0901-4D5B-A191-C478C226F4FD}" dt="2020-05-20T21:32:56.715" v="506" actId="165"/>
+          <ac:grpSpMkLst>
+            <pc:docMk/>
+            <pc:sldMk cId="379422893" sldId="282"/>
+            <ac:grpSpMk id="18" creationId="{697FE7AB-FA92-4FA9-B9F5-6F8D095A7E50}"/>
+          </ac:grpSpMkLst>
+        </pc:grpChg>
+        <pc:grpChg chg="add mod ord">
+          <ac:chgData name="Andrew" userId="b45e9002-b033-421d-a3d9-6d42475e9a3f" providerId="ADAL" clId="{8CE00DF8-0901-4D5B-A191-C478C226F4FD}" dt="2020-05-20T21:36:08.693" v="538" actId="14429"/>
+          <ac:grpSpMkLst>
+            <pc:docMk/>
+            <pc:sldMk cId="379422893" sldId="282"/>
+            <ac:grpSpMk id="22" creationId="{5CA646F4-089B-4F5D-9240-892A0B0A3612}"/>
+          </ac:grpSpMkLst>
+        </pc:grpChg>
+        <pc:grpChg chg="add mod">
+          <ac:chgData name="Andrew" userId="b45e9002-b033-421d-a3d9-6d42475e9a3f" providerId="ADAL" clId="{8CE00DF8-0901-4D5B-A191-C478C226F4FD}" dt="2020-05-20T21:36:39.584" v="541" actId="164"/>
+          <ac:grpSpMkLst>
+            <pc:docMk/>
+            <pc:sldMk cId="379422893" sldId="282"/>
+            <ac:grpSpMk id="24" creationId="{9392D025-68DB-4049-9B70-9114D87940E0}"/>
+          </ac:grpSpMkLst>
+        </pc:grpChg>
+        <pc:grpChg chg="add mod">
+          <ac:chgData name="Andrew" userId="b45e9002-b033-421d-a3d9-6d42475e9a3f" providerId="ADAL" clId="{8CE00DF8-0901-4D5B-A191-C478C226F4FD}" dt="2020-05-20T21:38:31.613" v="592" actId="14429"/>
+          <ac:grpSpMkLst>
+            <pc:docMk/>
+            <pc:sldMk cId="379422893" sldId="282"/>
+            <ac:grpSpMk id="25" creationId="{979E42C4-E3A7-4B71-B2BF-3CB4E211E058}"/>
+          </ac:grpSpMkLst>
+        </pc:grpChg>
+        <pc:grpChg chg="add mod">
+          <ac:chgData name="Andrew" userId="b45e9002-b033-421d-a3d9-6d42475e9a3f" providerId="ADAL" clId="{8CE00DF8-0901-4D5B-A191-C478C226F4FD}" dt="2020-05-20T21:38:30.461" v="591" actId="14429"/>
+          <ac:grpSpMkLst>
+            <pc:docMk/>
+            <pc:sldMk cId="379422893" sldId="282"/>
+            <ac:grpSpMk id="26" creationId="{788393F3-5DF2-43DE-B53E-831D6F2A358C}"/>
+          </ac:grpSpMkLst>
+        </pc:grpChg>
+      </pc:sldChg>
+      <pc:sldChg chg="delSp modSp new del mod modClrScheme chgLayout">
+        <pc:chgData name="Andrew" userId="b45e9002-b033-421d-a3d9-6d42475e9a3f" providerId="ADAL" clId="{8CE00DF8-0901-4D5B-A191-C478C226F4FD}" dt="2020-05-20T21:47:55.156" v="759" actId="2696"/>
+        <pc:sldMkLst>
+          <pc:docMk/>
+          <pc:sldMk cId="450994472" sldId="283"/>
+        </pc:sldMkLst>
+        <pc:spChg chg="mod ord">
+          <ac:chgData name="Andrew" userId="b45e9002-b033-421d-a3d9-6d42475e9a3f" providerId="ADAL" clId="{8CE00DF8-0901-4D5B-A191-C478C226F4FD}" dt="2020-05-20T21:47:28.476" v="747" actId="700"/>
+          <ac:spMkLst>
+            <pc:docMk/>
+            <pc:sldMk cId="450994472" sldId="283"/>
+            <ac:spMk id="2" creationId="{BDDAF86A-5379-47A7-A1E4-994EF9D30E06}"/>
+          </ac:spMkLst>
+        </pc:spChg>
+        <pc:spChg chg="del mod ord">
+          <ac:chgData name="Andrew" userId="b45e9002-b033-421d-a3d9-6d42475e9a3f" providerId="ADAL" clId="{8CE00DF8-0901-4D5B-A191-C478C226F4FD}" dt="2020-05-20T21:47:32.777" v="748" actId="478"/>
+          <ac:spMkLst>
+            <pc:docMk/>
+            <pc:sldMk cId="450994472" sldId="283"/>
+            <ac:spMk id="3" creationId="{A0B1BAEA-B546-43D8-A48E-95B02DEE7298}"/>
+          </ac:spMkLst>
+        </pc:spChg>
+        <pc:spChg chg="mod ord">
+          <ac:chgData name="Andrew" userId="b45e9002-b033-421d-a3d9-6d42475e9a3f" providerId="ADAL" clId="{8CE00DF8-0901-4D5B-A191-C478C226F4FD}" dt="2020-05-20T21:47:28.476" v="747" actId="700"/>
+          <ac:spMkLst>
+            <pc:docMk/>
+            <pc:sldMk cId="450994472" sldId="283"/>
+            <ac:spMk id="4" creationId="{AA9EF9F3-62D5-49F3-8B20-7F7F3B9B32AA}"/>
+          </ac:spMkLst>
+        </pc:spChg>
+        <pc:spChg chg="del mod ord">
+          <ac:chgData name="Andrew" userId="b45e9002-b033-421d-a3d9-6d42475e9a3f" providerId="ADAL" clId="{8CE00DF8-0901-4D5B-A191-C478C226F4FD}" dt="2020-05-20T21:47:36.508" v="749" actId="478"/>
+          <ac:spMkLst>
+            <pc:docMk/>
+            <pc:sldMk cId="450994472" sldId="283"/>
+            <ac:spMk id="5" creationId="{D5E54516-597B-4085-BD35-43B6CCA636DC}"/>
+          </ac:spMkLst>
+        </pc:spChg>
+        <pc:spChg chg="mod ord">
+          <ac:chgData name="Andrew" userId="b45e9002-b033-421d-a3d9-6d42475e9a3f" providerId="ADAL" clId="{8CE00DF8-0901-4D5B-A191-C478C226F4FD}" dt="2020-05-20T21:47:44.412" v="758" actId="5793"/>
+          <ac:spMkLst>
+            <pc:docMk/>
+            <pc:sldMk cId="450994472" sldId="283"/>
+            <ac:spMk id="6" creationId="{046D3C21-65A0-4162-A296-9629B7231B72}"/>
           </ac:spMkLst>
         </pc:spChg>
       </pc:sldChg>
@@ -1150,10 +1678,18 @@
         <a:lstStyle/>
         <a:p>
           <a:r>
-            <a:rPr lang="en-GB" b="0" i="0"/>
-            <a:t>Code divided in three parts: global, ui and server</a:t>
+            <a:rPr lang="en-GB" b="0" i="0" dirty="0"/>
+            <a:t>Three parts: global, </a:t>
           </a:r>
-          <a:endParaRPr lang="en-US"/>
+          <a:r>
+            <a:rPr lang="en-GB" b="0" i="0" dirty="0" err="1"/>
+            <a:t>ui</a:t>
+          </a:r>
+          <a:r>
+            <a:rPr lang="en-GB" b="0" i="0" dirty="0"/>
+            <a:t> and server</a:t>
+          </a:r>
+          <a:endParaRPr lang="en-US" dirty="0"/>
         </a:p>
       </dgm:t>
     </dgm:pt>
@@ -1187,10 +1723,10 @@
         <a:lstStyle/>
         <a:p>
           <a:r>
-            <a:rPr lang="en-GB" b="0" i="0"/>
-            <a:t>The code can respond to user input</a:t>
+            <a:rPr lang="en-GB" b="0" i="0" dirty="0"/>
+            <a:t>Reactive to user input</a:t>
           </a:r>
-          <a:endParaRPr lang="en-US"/>
+          <a:endParaRPr lang="en-US" dirty="0"/>
         </a:p>
       </dgm:t>
     </dgm:pt>
@@ -1261,10 +1797,10 @@
         <a:lstStyle/>
         <a:p>
           <a:r>
-            <a:rPr lang="en-GB" b="0" i="0"/>
-            <a:t>Differences in the order of things run</a:t>
+            <a:rPr lang="en-GB" b="0" i="0" dirty="0"/>
+            <a:t>Structure and running order of code</a:t>
           </a:r>
-          <a:endParaRPr lang="en-US"/>
+          <a:endParaRPr lang="en-US" dirty="0"/>
         </a:p>
       </dgm:t>
     </dgm:pt>
@@ -1298,13 +1834,6 @@
         </dgm:presLayoutVars>
       </dgm:prSet>
       <dgm:spPr/>
-      <dgm:t>
-        <a:bodyPr/>
-        <a:lstStyle/>
-        <a:p>
-          <a:endParaRPr lang="en-US"/>
-        </a:p>
-      </dgm:t>
     </dgm:pt>
     <dgm:pt modelId="{241B88B2-D62E-452A-816D-EF792F155491}" type="pres">
       <dgm:prSet presAssocID="{E941DDEE-34D2-4312-90B5-07819112845A}" presName="compNode" presStyleCnt="0"/>
@@ -1324,7 +1853,7 @@
                 <a14:useLocalDpi xmlns:a14="http://schemas.microsoft.com/office/drawing/2010/main" val="0"/>
               </a:ext>
               <a:ext uri="{96DAC541-7B7A-43D3-8B79-37D633B846F1}">
-                <asvg:svgBlip xmlns="" xmlns:asvg="http://schemas.microsoft.com/office/drawing/2016/SVG/main" r:embed="rId2"/>
+                <asvg:svgBlip xmlns:asvg="http://schemas.microsoft.com/office/drawing/2016/SVG/main" r:embed="rId2"/>
               </a:ext>
             </a:extLst>
           </a:blip>
@@ -1336,13 +1865,6 @@
           <a:noFill/>
         </a:ln>
       </dgm:spPr>
-      <dgm:t>
-        <a:bodyPr/>
-        <a:lstStyle/>
-        <a:p>
-          <a:endParaRPr lang="en-US"/>
-        </a:p>
-      </dgm:t>
       <dgm:extLst>
         <a:ext uri="{E40237B7-FDA0-4F09-8148-C483321AD2D9}">
           <dgm14:cNvPr xmlns:dgm14="http://schemas.microsoft.com/office/drawing/2010/diagram" id="0" name="" descr="Processor"/>
@@ -1361,13 +1883,6 @@
         </dgm:presLayoutVars>
       </dgm:prSet>
       <dgm:spPr/>
-      <dgm:t>
-        <a:bodyPr/>
-        <a:lstStyle/>
-        <a:p>
-          <a:endParaRPr lang="en-US"/>
-        </a:p>
-      </dgm:t>
     </dgm:pt>
     <dgm:pt modelId="{F64F6A2E-3E1F-4AD7-97AE-6838F231A3F7}" type="pres">
       <dgm:prSet presAssocID="{AE6507B5-D926-48BB-BCAF-8E237144BD00}" presName="sibTrans" presStyleCnt="0"/>
@@ -1391,7 +1906,7 @@
                 <a14:useLocalDpi xmlns:a14="http://schemas.microsoft.com/office/drawing/2010/main" val="0"/>
               </a:ext>
               <a:ext uri="{96DAC541-7B7A-43D3-8B79-37D633B846F1}">
-                <asvg:svgBlip xmlns="" xmlns:asvg="http://schemas.microsoft.com/office/drawing/2016/SVG/main" r:embed="rId4"/>
+                <asvg:svgBlip xmlns:asvg="http://schemas.microsoft.com/office/drawing/2016/SVG/main" r:embed="rId4"/>
               </a:ext>
             </a:extLst>
           </a:blip>
@@ -1403,13 +1918,6 @@
           <a:noFill/>
         </a:ln>
       </dgm:spPr>
-      <dgm:t>
-        <a:bodyPr/>
-        <a:lstStyle/>
-        <a:p>
-          <a:endParaRPr lang="en-US"/>
-        </a:p>
-      </dgm:t>
       <dgm:extLst>
         <a:ext uri="{E40237B7-FDA0-4F09-8148-C483321AD2D9}">
           <dgm14:cNvPr xmlns:dgm14="http://schemas.microsoft.com/office/drawing/2010/diagram" id="0" name="" descr="Subtitles"/>
@@ -1428,13 +1936,6 @@
         </dgm:presLayoutVars>
       </dgm:prSet>
       <dgm:spPr/>
-      <dgm:t>
-        <a:bodyPr/>
-        <a:lstStyle/>
-        <a:p>
-          <a:endParaRPr lang="en-US"/>
-        </a:p>
-      </dgm:t>
     </dgm:pt>
     <dgm:pt modelId="{2B87741B-9097-4DF7-8D30-0CB68B214D96}" type="pres">
       <dgm:prSet presAssocID="{ED2E538E-B4E2-495D-9AF7-7845217096F0}" presName="sibTrans" presStyleCnt="0"/>
@@ -1458,7 +1959,7 @@
                 <a14:useLocalDpi xmlns:a14="http://schemas.microsoft.com/office/drawing/2010/main" val="0"/>
               </a:ext>
               <a:ext uri="{96DAC541-7B7A-43D3-8B79-37D633B846F1}">
-                <asvg:svgBlip xmlns="" xmlns:asvg="http://schemas.microsoft.com/office/drawing/2016/SVG/main" r:embed="rId6"/>
+                <asvg:svgBlip xmlns:asvg="http://schemas.microsoft.com/office/drawing/2016/SVG/main" r:embed="rId6"/>
               </a:ext>
             </a:extLst>
           </a:blip>
@@ -1470,13 +1971,6 @@
           <a:noFill/>
         </a:ln>
       </dgm:spPr>
-      <dgm:t>
-        <a:bodyPr/>
-        <a:lstStyle/>
-        <a:p>
-          <a:endParaRPr lang="en-US"/>
-        </a:p>
-      </dgm:t>
       <dgm:extLst>
         <a:ext uri="{E40237B7-FDA0-4F09-8148-C483321AD2D9}">
           <dgm14:cNvPr xmlns:dgm14="http://schemas.microsoft.com/office/drawing/2010/diagram" id="0" name="" descr="Web Design"/>
@@ -1495,13 +1989,6 @@
         </dgm:presLayoutVars>
       </dgm:prSet>
       <dgm:spPr/>
-      <dgm:t>
-        <a:bodyPr/>
-        <a:lstStyle/>
-        <a:p>
-          <a:endParaRPr lang="en-US"/>
-        </a:p>
-      </dgm:t>
     </dgm:pt>
     <dgm:pt modelId="{BD9D6DA8-934A-4A5F-B0A7-D85AD9B80E5C}" type="pres">
       <dgm:prSet presAssocID="{4DE78722-0412-4DAD-BAB8-6FEB6ECE598E}" presName="sibTrans" presStyleCnt="0"/>
@@ -1525,7 +2012,7 @@
                 <a14:useLocalDpi xmlns:a14="http://schemas.microsoft.com/office/drawing/2010/main" val="0"/>
               </a:ext>
               <a:ext uri="{96DAC541-7B7A-43D3-8B79-37D633B846F1}">
-                <asvg:svgBlip xmlns="" xmlns:asvg="http://schemas.microsoft.com/office/drawing/2016/SVG/main" r:embed="rId8"/>
+                <asvg:svgBlip xmlns:asvg="http://schemas.microsoft.com/office/drawing/2016/SVG/main" r:embed="rId8"/>
               </a:ext>
             </a:extLst>
           </a:blip>
@@ -1537,13 +2024,6 @@
           <a:noFill/>
         </a:ln>
       </dgm:spPr>
-      <dgm:t>
-        <a:bodyPr/>
-        <a:lstStyle/>
-        <a:p>
-          <a:endParaRPr lang="en-US"/>
-        </a:p>
-      </dgm:t>
       <dgm:extLst>
         <a:ext uri="{E40237B7-FDA0-4F09-8148-C483321AD2D9}">
           <dgm14:cNvPr xmlns:dgm14="http://schemas.microsoft.com/office/drawing/2010/diagram" id="0" name="" descr="Venn Diagram"/>
@@ -1562,25 +2042,18 @@
         </dgm:presLayoutVars>
       </dgm:prSet>
       <dgm:spPr/>
-      <dgm:t>
-        <a:bodyPr/>
-        <a:lstStyle/>
-        <a:p>
-          <a:endParaRPr lang="en-US"/>
-        </a:p>
-      </dgm:t>
     </dgm:pt>
   </dgm:ptLst>
   <dgm:cxnLst>
-    <dgm:cxn modelId="{0D500FA1-650E-4AFA-819A-BA2D0D2672D0}" type="presOf" srcId="{BCA2DDCE-D187-4516-BD52-62A36CCB01F9}" destId="{F5581EED-B6FC-472F-8450-D83F9CC0C49B}" srcOrd="0" destOrd="0" presId="urn:microsoft.com/office/officeart/2018/2/layout/IconVerticalSolidList"/>
+    <dgm:cxn modelId="{BC259804-B16B-471A-8800-DA76446251A0}" type="presOf" srcId="{EE7D4CB1-8A32-4EFB-ADF5-D92D36A9B0E9}" destId="{2312FC77-CADA-4251-AC0D-0C25A89D8628}" srcOrd="0" destOrd="0" presId="urn:microsoft.com/office/officeart/2018/2/layout/IconVerticalSolidList"/>
+    <dgm:cxn modelId="{57DEF310-40F9-44C5-8373-9BFCCCBB3F3E}" srcId="{D429744F-34B8-4C39-B8BF-603E87AD9125}" destId="{BCA2DDCE-D187-4516-BD52-62A36CCB01F9}" srcOrd="1" destOrd="0" parTransId="{59912131-9359-4D76-A2C1-6612D2CD8AE2}" sibTransId="{ED2E538E-B4E2-495D-9AF7-7845217096F0}"/>
+    <dgm:cxn modelId="{DB8D2748-E2DB-4580-9039-F03F1CB40E65}" srcId="{D429744F-34B8-4C39-B8BF-603E87AD9125}" destId="{E941DDEE-34D2-4312-90B5-07819112845A}" srcOrd="0" destOrd="0" parTransId="{A0369E8A-2F77-40BE-822F-B9AF8EEFC935}" sibTransId="{AE6507B5-D926-48BB-BCAF-8E237144BD00}"/>
     <dgm:cxn modelId="{80B5326B-3105-47E9-9E66-AC0167B87A4A}" type="presOf" srcId="{D429744F-34B8-4C39-B8BF-603E87AD9125}" destId="{6EE15BFD-D7F0-49A4-8DE2-E1932775B993}" srcOrd="0" destOrd="0" presId="urn:microsoft.com/office/officeart/2018/2/layout/IconVerticalSolidList"/>
     <dgm:cxn modelId="{992EAE6B-863F-497F-B9C6-DDA39098A600}" srcId="{D429744F-34B8-4C39-B8BF-603E87AD9125}" destId="{0CFE54A5-73A0-4D6D-8C0C-D05FE0DADE50}" srcOrd="3" destOrd="0" parTransId="{0F4B2A29-A9D8-4A12-8503-B863A66D5165}" sibTransId="{FA5E7AE5-AD60-4E94-99EA-CD18D82C9615}"/>
+    <dgm:cxn modelId="{7B7AAB4D-15CC-4C4E-A495-805D30F90E40}" type="presOf" srcId="{E941DDEE-34D2-4312-90B5-07819112845A}" destId="{1950379D-3DF6-4377-B7FE-70E11AC267E6}" srcOrd="0" destOrd="0" presId="urn:microsoft.com/office/officeart/2018/2/layout/IconVerticalSolidList"/>
+    <dgm:cxn modelId="{55BF447D-DBA9-4459-B01B-FC10FB3FB108}" srcId="{D429744F-34B8-4C39-B8BF-603E87AD9125}" destId="{EE7D4CB1-8A32-4EFB-ADF5-D92D36A9B0E9}" srcOrd="2" destOrd="0" parTransId="{4E9FD35E-B19E-4747-86C4-8EAD85F5A085}" sibTransId="{4DE78722-0412-4DAD-BAB8-6FEB6ECE598E}"/>
+    <dgm:cxn modelId="{0D500FA1-650E-4AFA-819A-BA2D0D2672D0}" type="presOf" srcId="{BCA2DDCE-D187-4516-BD52-62A36CCB01F9}" destId="{F5581EED-B6FC-472F-8450-D83F9CC0C49B}" srcOrd="0" destOrd="0" presId="urn:microsoft.com/office/officeart/2018/2/layout/IconVerticalSolidList"/>
     <dgm:cxn modelId="{3AE284B2-E41A-4722-831E-11DD22E6A1B6}" type="presOf" srcId="{0CFE54A5-73A0-4D6D-8C0C-D05FE0DADE50}" destId="{9BEBA7A6-EA1D-4EF5-A72A-926B25795EE5}" srcOrd="0" destOrd="0" presId="urn:microsoft.com/office/officeart/2018/2/layout/IconVerticalSolidList"/>
-    <dgm:cxn modelId="{DB8D2748-E2DB-4580-9039-F03F1CB40E65}" srcId="{D429744F-34B8-4C39-B8BF-603E87AD9125}" destId="{E941DDEE-34D2-4312-90B5-07819112845A}" srcOrd="0" destOrd="0" parTransId="{A0369E8A-2F77-40BE-822F-B9AF8EEFC935}" sibTransId="{AE6507B5-D926-48BB-BCAF-8E237144BD00}"/>
-    <dgm:cxn modelId="{7B7AAB4D-15CC-4C4E-A495-805D30F90E40}" type="presOf" srcId="{E941DDEE-34D2-4312-90B5-07819112845A}" destId="{1950379D-3DF6-4377-B7FE-70E11AC267E6}" srcOrd="0" destOrd="0" presId="urn:microsoft.com/office/officeart/2018/2/layout/IconVerticalSolidList"/>
-    <dgm:cxn modelId="{BC259804-B16B-471A-8800-DA76446251A0}" type="presOf" srcId="{EE7D4CB1-8A32-4EFB-ADF5-D92D36A9B0E9}" destId="{2312FC77-CADA-4251-AC0D-0C25A89D8628}" srcOrd="0" destOrd="0" presId="urn:microsoft.com/office/officeart/2018/2/layout/IconVerticalSolidList"/>
-    <dgm:cxn modelId="{57DEF310-40F9-44C5-8373-9BFCCCBB3F3E}" srcId="{D429744F-34B8-4C39-B8BF-603E87AD9125}" destId="{BCA2DDCE-D187-4516-BD52-62A36CCB01F9}" srcOrd="1" destOrd="0" parTransId="{59912131-9359-4D76-A2C1-6612D2CD8AE2}" sibTransId="{ED2E538E-B4E2-495D-9AF7-7845217096F0}"/>
-    <dgm:cxn modelId="{55BF447D-DBA9-4459-B01B-FC10FB3FB108}" srcId="{D429744F-34B8-4C39-B8BF-603E87AD9125}" destId="{EE7D4CB1-8A32-4EFB-ADF5-D92D36A9B0E9}" srcOrd="2" destOrd="0" parTransId="{4E9FD35E-B19E-4747-86C4-8EAD85F5A085}" sibTransId="{4DE78722-0412-4DAD-BAB8-6FEB6ECE598E}"/>
     <dgm:cxn modelId="{3D802AFE-8736-48F4-9A7A-34E017D691F5}" type="presParOf" srcId="{6EE15BFD-D7F0-49A4-8DE2-E1932775B993}" destId="{241B88B2-D62E-452A-816D-EF792F155491}" srcOrd="0" destOrd="0" presId="urn:microsoft.com/office/officeart/2018/2/layout/IconVerticalSolidList"/>
     <dgm:cxn modelId="{04026BE3-B703-4635-B8A1-F37FBDAF41BF}" type="presParOf" srcId="{241B88B2-D62E-452A-816D-EF792F155491}" destId="{356B003D-AF9E-4A6C-A4FE-8D35706DC74E}" srcOrd="0" destOrd="0" presId="urn:microsoft.com/office/officeart/2018/2/layout/IconVerticalSolidList"/>
     <dgm:cxn modelId="{AF38ED86-AB11-4EB2-877F-F3F8BF28AB5E}" type="presParOf" srcId="{241B88B2-D62E-452A-816D-EF792F155491}" destId="{C077A002-EA12-4116-B0D8-040ABA5847FE}" srcOrd="1" destOrd="0" presId="urn:microsoft.com/office/officeart/2018/2/layout/IconVerticalSolidList"/>
@@ -1685,7 +2158,7 @@
                 <a14:useLocalDpi xmlns:a14="http://schemas.microsoft.com/office/drawing/2010/main" val="0"/>
               </a:ext>
               <a:ext uri="{96DAC541-7B7A-43D3-8B79-37D633B846F1}">
-                <asvg:svgBlip xmlns="" xmlns:asvg="http://schemas.microsoft.com/office/drawing/2016/SVG/main" r:embed="rId2"/>
+                <asvg:svgBlip xmlns:asvg="http://schemas.microsoft.com/office/drawing/2016/SVG/main" r:embed="rId2"/>
               </a:ext>
             </a:extLst>
           </a:blip>
@@ -1751,7 +2224,7 @@
         </a:bodyPr>
         <a:lstStyle/>
         <a:p>
-          <a:pPr lvl="0" algn="l" defTabSz="977900">
+          <a:pPr marL="0" lvl="0" indent="0" algn="l" defTabSz="977900">
             <a:lnSpc>
               <a:spcPct val="90000"/>
             </a:lnSpc>
@@ -1761,12 +2234,21 @@
             <a:spcAft>
               <a:spcPct val="35000"/>
             </a:spcAft>
+            <a:buNone/>
           </a:pPr>
           <a:r>
-            <a:rPr lang="en-GB" sz="2200" b="0" i="0" kern="1200"/>
-            <a:t>Code divided in three parts: global, ui and server</a:t>
+            <a:rPr lang="en-GB" sz="2200" b="0" i="0" kern="1200" dirty="0"/>
+            <a:t>Three parts: global, </a:t>
           </a:r>
-          <a:endParaRPr lang="en-US" sz="2200" kern="1200"/>
+          <a:r>
+            <a:rPr lang="en-GB" sz="2200" b="0" i="0" kern="1200" dirty="0" err="1"/>
+            <a:t>ui</a:t>
+          </a:r>
+          <a:r>
+            <a:rPr lang="en-GB" sz="2200" b="0" i="0" kern="1200" dirty="0"/>
+            <a:t> and server</a:t>
+          </a:r>
+          <a:endParaRPr lang="en-US" sz="2200" kern="1200" dirty="0"/>
         </a:p>
       </dsp:txBody>
       <dsp:txXfrm>
@@ -1836,7 +2318,7 @@
                 <a14:useLocalDpi xmlns:a14="http://schemas.microsoft.com/office/drawing/2010/main" val="0"/>
               </a:ext>
               <a:ext uri="{96DAC541-7B7A-43D3-8B79-37D633B846F1}">
-                <asvg:svgBlip xmlns="" xmlns:asvg="http://schemas.microsoft.com/office/drawing/2016/SVG/main" r:embed="rId4"/>
+                <asvg:svgBlip xmlns:asvg="http://schemas.microsoft.com/office/drawing/2016/SVG/main" r:embed="rId4"/>
               </a:ext>
             </a:extLst>
           </a:blip>
@@ -1902,7 +2384,7 @@
         </a:bodyPr>
         <a:lstStyle/>
         <a:p>
-          <a:pPr lvl="0" algn="l" defTabSz="977900">
+          <a:pPr marL="0" lvl="0" indent="0" algn="l" defTabSz="977900">
             <a:lnSpc>
               <a:spcPct val="90000"/>
             </a:lnSpc>
@@ -1912,12 +2394,13 @@
             <a:spcAft>
               <a:spcPct val="35000"/>
             </a:spcAft>
+            <a:buNone/>
           </a:pPr>
           <a:r>
-            <a:rPr lang="en-GB" sz="2200" b="0" i="0" kern="1200"/>
-            <a:t>The code can respond to user input</a:t>
+            <a:rPr lang="en-GB" sz="2200" b="0" i="0" kern="1200" dirty="0"/>
+            <a:t>Reactive to user input</a:t>
           </a:r>
-          <a:endParaRPr lang="en-US" sz="2200" kern="1200"/>
+          <a:endParaRPr lang="en-US" sz="2200" kern="1200" dirty="0"/>
         </a:p>
       </dsp:txBody>
       <dsp:txXfrm>
@@ -1987,7 +2470,7 @@
                 <a14:useLocalDpi xmlns:a14="http://schemas.microsoft.com/office/drawing/2010/main" val="0"/>
               </a:ext>
               <a:ext uri="{96DAC541-7B7A-43D3-8B79-37D633B846F1}">
-                <asvg:svgBlip xmlns="" xmlns:asvg="http://schemas.microsoft.com/office/drawing/2016/SVG/main" r:embed="rId6"/>
+                <asvg:svgBlip xmlns:asvg="http://schemas.microsoft.com/office/drawing/2016/SVG/main" r:embed="rId6"/>
               </a:ext>
             </a:extLst>
           </a:blip>
@@ -2053,7 +2536,7 @@
         </a:bodyPr>
         <a:lstStyle/>
         <a:p>
-          <a:pPr lvl="0" algn="l" defTabSz="977900">
+          <a:pPr marL="0" lvl="0" indent="0" algn="l" defTabSz="977900">
             <a:lnSpc>
               <a:spcPct val="90000"/>
             </a:lnSpc>
@@ -2063,6 +2546,7 @@
             <a:spcAft>
               <a:spcPct val="35000"/>
             </a:spcAft>
+            <a:buNone/>
           </a:pPr>
           <a:r>
             <a:rPr lang="en-GB" sz="2200" b="0" i="0" kern="1200"/>
@@ -2138,7 +2622,7 @@
                 <a14:useLocalDpi xmlns:a14="http://schemas.microsoft.com/office/drawing/2010/main" val="0"/>
               </a:ext>
               <a:ext uri="{96DAC541-7B7A-43D3-8B79-37D633B846F1}">
-                <asvg:svgBlip xmlns="" xmlns:asvg="http://schemas.microsoft.com/office/drawing/2016/SVG/main" r:embed="rId8"/>
+                <asvg:svgBlip xmlns:asvg="http://schemas.microsoft.com/office/drawing/2016/SVG/main" r:embed="rId8"/>
               </a:ext>
             </a:extLst>
           </a:blip>
@@ -2204,7 +2688,7 @@
         </a:bodyPr>
         <a:lstStyle/>
         <a:p>
-          <a:pPr lvl="0" algn="l" defTabSz="977900">
+          <a:pPr marL="0" lvl="0" indent="0" algn="l" defTabSz="977900">
             <a:lnSpc>
               <a:spcPct val="90000"/>
             </a:lnSpc>
@@ -2214,12 +2698,13 @@
             <a:spcAft>
               <a:spcPct val="35000"/>
             </a:spcAft>
+            <a:buNone/>
           </a:pPr>
           <a:r>
-            <a:rPr lang="en-GB" sz="2200" b="0" i="0" kern="1200"/>
-            <a:t>Differences in the order of things run</a:t>
+            <a:rPr lang="en-GB" sz="2200" b="0" i="0" kern="1200" dirty="0"/>
+            <a:t>Structure and running order of code</a:t>
           </a:r>
-          <a:endParaRPr lang="en-US" sz="2200" kern="1200"/>
+          <a:endParaRPr lang="en-US" sz="2200" kern="1200" dirty="0"/>
         </a:p>
       </dsp:txBody>
       <dsp:txXfrm>
@@ -2508,7 +2993,7 @@
   </dgm:layoutNode>
   <dgm:extLst>
     <a:ext uri="{68A01E43-0DF5-4B5B-8FA6-DAF915123BFB}">
-      <dgm1612:lstStyle xmlns="" xmlns:dgm1612="http://schemas.microsoft.com/office/drawing/2016/12/diagram">
+      <dgm1612:lstStyle xmlns:dgm1612="http://schemas.microsoft.com/office/drawing/2016/12/diagram">
         <a:lvl1pPr>
           <a:lnSpc>
             <a:spcPct val="100000"/>
@@ -11183,6 +11668,386 @@
           </a:p>
         </p:txBody>
       </p:sp>
+      <p:grpSp>
+        <p:nvGrpSpPr>
+          <p:cNvPr id="35" name="Group 34">
+            <a:extLst>
+              <a:ext uri="{FF2B5EF4-FFF2-40B4-BE49-F238E27FC236}">
+                <a16:creationId xmlns:a16="http://schemas.microsoft.com/office/drawing/2014/main" id="{0105102C-5C57-4F10-A3A2-EAAA856DE4DC}"/>
+              </a:ext>
+            </a:extLst>
+          </p:cNvPr>
+          <p:cNvGrpSpPr/>
+          <p:nvPr/>
+        </p:nvGrpSpPr>
+        <p:grpSpPr>
+          <a:xfrm>
+            <a:off x="1922106" y="5178490"/>
+            <a:ext cx="8761445" cy="1440424"/>
+            <a:chOff x="1922106" y="5178490"/>
+            <a:chExt cx="8761445" cy="1440424"/>
+          </a:xfrm>
+        </p:grpSpPr>
+        <p:sp>
+          <p:nvSpPr>
+            <p:cNvPr id="3" name="Arrow: Right 2">
+              <a:extLst>
+                <a:ext uri="{FF2B5EF4-FFF2-40B4-BE49-F238E27FC236}">
+                  <a16:creationId xmlns:a16="http://schemas.microsoft.com/office/drawing/2014/main" id="{B8F2A13F-5181-4591-AA30-6E797816C567}"/>
+                </a:ext>
+              </a:extLst>
+            </p:cNvPr>
+            <p:cNvSpPr/>
+            <p:nvPr/>
+          </p:nvSpPr>
+          <p:spPr>
+            <a:xfrm>
+              <a:off x="1922106" y="5178490"/>
+              <a:ext cx="8761445" cy="1440424"/>
+            </a:xfrm>
+            <a:prstGeom prst="rightArrow">
+              <a:avLst>
+                <a:gd name="adj1" fmla="val 61660"/>
+                <a:gd name="adj2" fmla="val 60483"/>
+              </a:avLst>
+            </a:prstGeom>
+            <a:gradFill flip="none" rotWithShape="1">
+              <a:gsLst>
+                <a:gs pos="0">
+                  <a:schemeClr val="accent3">
+                    <a:lumMod val="40000"/>
+                    <a:lumOff val="60000"/>
+                  </a:schemeClr>
+                </a:gs>
+                <a:gs pos="50000">
+                  <a:schemeClr val="accent1">
+                    <a:lumMod val="40000"/>
+                    <a:lumOff val="60000"/>
+                  </a:schemeClr>
+                </a:gs>
+                <a:gs pos="83000">
+                  <a:schemeClr val="accent1">
+                    <a:lumMod val="60000"/>
+                    <a:lumOff val="40000"/>
+                  </a:schemeClr>
+                </a:gs>
+                <a:gs pos="100000">
+                  <a:schemeClr val="accent1">
+                    <a:lumMod val="75000"/>
+                  </a:schemeClr>
+                </a:gs>
+              </a:gsLst>
+              <a:lin ang="0" scaled="1"/>
+              <a:tileRect/>
+            </a:gradFill>
+            <a:ln>
+              <a:noFill/>
+            </a:ln>
+            <a:scene3d>
+              <a:camera prst="perspectiveLeft"/>
+              <a:lightRig rig="threePt" dir="t"/>
+            </a:scene3d>
+          </p:spPr>
+          <p:style>
+            <a:lnRef idx="2">
+              <a:schemeClr val="accent1">
+                <a:shade val="50000"/>
+              </a:schemeClr>
+            </a:lnRef>
+            <a:fillRef idx="1">
+              <a:schemeClr val="accent1"/>
+            </a:fillRef>
+            <a:effectRef idx="0">
+              <a:schemeClr val="accent1"/>
+            </a:effectRef>
+            <a:fontRef idx="minor">
+              <a:schemeClr val="lt1"/>
+            </a:fontRef>
+          </p:style>
+          <p:txBody>
+            <a:bodyPr rtlCol="0" anchor="ctr"/>
+            <a:lstStyle/>
+            <a:p>
+              <a:pPr algn="ctr"/>
+              <a:r>
+                <a:rPr lang="en-GB" sz="6000" b="1" i="1" cap="small" dirty="0">
+                  <a:solidFill>
+                    <a:srgbClr val="FFFF00"/>
+                  </a:solidFill>
+                  <a:latin typeface="Aharoni" panose="02010803020104030203" pitchFamily="2" charset="-79"/>
+                  <a:cs typeface="Aharoni" panose="02010803020104030203" pitchFamily="2" charset="-79"/>
+                </a:rPr>
+                <a:t>Reactive</a:t>
+              </a:r>
+              <a:endParaRPr lang="en-GB" b="1" i="1" cap="small" dirty="0">
+                <a:solidFill>
+                  <a:srgbClr val="FFFF00"/>
+                </a:solidFill>
+                <a:latin typeface="Aharoni" panose="02010803020104030203" pitchFamily="2" charset="-79"/>
+                <a:cs typeface="Aharoni" panose="02010803020104030203" pitchFamily="2" charset="-79"/>
+              </a:endParaRPr>
+            </a:p>
+          </p:txBody>
+        </p:sp>
+        <p:cxnSp>
+          <p:nvCxnSpPr>
+            <p:cNvPr id="16" name="Straight Connector 15">
+              <a:extLst>
+                <a:ext uri="{FF2B5EF4-FFF2-40B4-BE49-F238E27FC236}">
+                  <a16:creationId xmlns:a16="http://schemas.microsoft.com/office/drawing/2014/main" id="{B4D03CFC-02B7-48EA-91F8-F54C713B6722}"/>
+                </a:ext>
+              </a:extLst>
+            </p:cNvPr>
+            <p:cNvCxnSpPr>
+              <a:cxnSpLocks/>
+            </p:cNvCxnSpPr>
+            <p:nvPr/>
+          </p:nvCxnSpPr>
+          <p:spPr>
+            <a:xfrm>
+              <a:off x="4249420" y="6083300"/>
+              <a:ext cx="683260" cy="8890"/>
+            </a:xfrm>
+            <a:prstGeom prst="line">
+              <a:avLst/>
+            </a:prstGeom>
+            <a:ln w="38100">
+              <a:solidFill>
+                <a:srgbClr val="FFFF00"/>
+              </a:solidFill>
+            </a:ln>
+          </p:spPr>
+          <p:style>
+            <a:lnRef idx="1">
+              <a:schemeClr val="accent3"/>
+            </a:lnRef>
+            <a:fillRef idx="0">
+              <a:schemeClr val="accent3"/>
+            </a:fillRef>
+            <a:effectRef idx="0">
+              <a:schemeClr val="accent3"/>
+            </a:effectRef>
+            <a:fontRef idx="minor">
+              <a:schemeClr val="tx1"/>
+            </a:fontRef>
+          </p:style>
+        </p:cxnSp>
+        <p:cxnSp>
+          <p:nvCxnSpPr>
+            <p:cNvPr id="18" name="Straight Connector 17">
+              <a:extLst>
+                <a:ext uri="{FF2B5EF4-FFF2-40B4-BE49-F238E27FC236}">
+                  <a16:creationId xmlns:a16="http://schemas.microsoft.com/office/drawing/2014/main" id="{B077C113-0037-49EE-9036-2728D1E71879}"/>
+                </a:ext>
+              </a:extLst>
+            </p:cNvPr>
+            <p:cNvCxnSpPr>
+              <a:cxnSpLocks/>
+            </p:cNvCxnSpPr>
+            <p:nvPr/>
+          </p:nvCxnSpPr>
+          <p:spPr>
+            <a:xfrm>
+              <a:off x="4790440" y="5636260"/>
+              <a:ext cx="284480" cy="6973"/>
+            </a:xfrm>
+            <a:prstGeom prst="line">
+              <a:avLst/>
+            </a:prstGeom>
+            <a:ln w="38100">
+              <a:solidFill>
+                <a:srgbClr val="FFFF00"/>
+              </a:solidFill>
+            </a:ln>
+          </p:spPr>
+          <p:style>
+            <a:lnRef idx="1">
+              <a:schemeClr val="accent3"/>
+            </a:lnRef>
+            <a:fillRef idx="0">
+              <a:schemeClr val="accent3"/>
+            </a:fillRef>
+            <a:effectRef idx="0">
+              <a:schemeClr val="accent3"/>
+            </a:effectRef>
+            <a:fontRef idx="minor">
+              <a:schemeClr val="tx1"/>
+            </a:fontRef>
+          </p:style>
+        </p:cxnSp>
+        <p:cxnSp>
+          <p:nvCxnSpPr>
+            <p:cNvPr id="20" name="Straight Connector 19">
+              <a:extLst>
+                <a:ext uri="{FF2B5EF4-FFF2-40B4-BE49-F238E27FC236}">
+                  <a16:creationId xmlns:a16="http://schemas.microsoft.com/office/drawing/2014/main" id="{7579F93B-C80E-430D-B27B-B93F1532C15F}"/>
+                </a:ext>
+              </a:extLst>
+            </p:cNvPr>
+            <p:cNvCxnSpPr>
+              <a:cxnSpLocks/>
+            </p:cNvCxnSpPr>
+            <p:nvPr/>
+          </p:nvCxnSpPr>
+          <p:spPr>
+            <a:xfrm>
+              <a:off x="4591050" y="5946509"/>
+              <a:ext cx="267970" cy="9715"/>
+            </a:xfrm>
+            <a:prstGeom prst="line">
+              <a:avLst/>
+            </a:prstGeom>
+            <a:ln w="38100">
+              <a:solidFill>
+                <a:srgbClr val="FFFF00"/>
+              </a:solidFill>
+            </a:ln>
+          </p:spPr>
+          <p:style>
+            <a:lnRef idx="1">
+              <a:schemeClr val="accent3"/>
+            </a:lnRef>
+            <a:fillRef idx="0">
+              <a:schemeClr val="accent3"/>
+            </a:fillRef>
+            <a:effectRef idx="0">
+              <a:schemeClr val="accent3"/>
+            </a:effectRef>
+            <a:fontRef idx="minor">
+              <a:schemeClr val="tx1"/>
+            </a:fontRef>
+          </p:style>
+        </p:cxnSp>
+        <p:cxnSp>
+          <p:nvCxnSpPr>
+            <p:cNvPr id="23" name="Straight Connector 22">
+              <a:extLst>
+                <a:ext uri="{FF2B5EF4-FFF2-40B4-BE49-F238E27FC236}">
+                  <a16:creationId xmlns:a16="http://schemas.microsoft.com/office/drawing/2014/main" id="{B0733D21-B278-4674-8E66-722764F03F8D}"/>
+                </a:ext>
+              </a:extLst>
+            </p:cNvPr>
+            <p:cNvCxnSpPr>
+              <a:cxnSpLocks/>
+            </p:cNvCxnSpPr>
+            <p:nvPr/>
+          </p:nvCxnSpPr>
+          <p:spPr>
+            <a:xfrm>
+              <a:off x="4653280" y="5790426"/>
+              <a:ext cx="205740" cy="8890"/>
+            </a:xfrm>
+            <a:prstGeom prst="line">
+              <a:avLst/>
+            </a:prstGeom>
+            <a:ln w="38100">
+              <a:solidFill>
+                <a:srgbClr val="FFFF00"/>
+              </a:solidFill>
+            </a:ln>
+          </p:spPr>
+          <p:style>
+            <a:lnRef idx="1">
+              <a:schemeClr val="accent3"/>
+            </a:lnRef>
+            <a:fillRef idx="0">
+              <a:schemeClr val="accent3"/>
+            </a:fillRef>
+            <a:effectRef idx="0">
+              <a:schemeClr val="accent3"/>
+            </a:effectRef>
+            <a:fontRef idx="minor">
+              <a:schemeClr val="tx1"/>
+            </a:fontRef>
+          </p:style>
+        </p:cxnSp>
+        <p:cxnSp>
+          <p:nvCxnSpPr>
+            <p:cNvPr id="26" name="Straight Connector 25">
+              <a:extLst>
+                <a:ext uri="{FF2B5EF4-FFF2-40B4-BE49-F238E27FC236}">
+                  <a16:creationId xmlns:a16="http://schemas.microsoft.com/office/drawing/2014/main" id="{347AD8E4-44EE-44E0-B545-21D10B93C6F9}"/>
+                </a:ext>
+              </a:extLst>
+            </p:cNvPr>
+            <p:cNvCxnSpPr>
+              <a:cxnSpLocks/>
+            </p:cNvCxnSpPr>
+            <p:nvPr/>
+          </p:nvCxnSpPr>
+          <p:spPr>
+            <a:xfrm>
+              <a:off x="4408164" y="5947334"/>
+              <a:ext cx="91446" cy="0"/>
+            </a:xfrm>
+            <a:prstGeom prst="line">
+              <a:avLst/>
+            </a:prstGeom>
+            <a:ln w="38100">
+              <a:solidFill>
+                <a:srgbClr val="FFFF00"/>
+              </a:solidFill>
+            </a:ln>
+          </p:spPr>
+          <p:style>
+            <a:lnRef idx="1">
+              <a:schemeClr val="accent3"/>
+            </a:lnRef>
+            <a:fillRef idx="0">
+              <a:schemeClr val="accent3"/>
+            </a:fillRef>
+            <a:effectRef idx="0">
+              <a:schemeClr val="accent3"/>
+            </a:effectRef>
+            <a:fontRef idx="minor">
+              <a:schemeClr val="tx1"/>
+            </a:fontRef>
+          </p:style>
+        </p:cxnSp>
+        <p:cxnSp>
+          <p:nvCxnSpPr>
+            <p:cNvPr id="32" name="Straight Connector 31">
+              <a:extLst>
+                <a:ext uri="{FF2B5EF4-FFF2-40B4-BE49-F238E27FC236}">
+                  <a16:creationId xmlns:a16="http://schemas.microsoft.com/office/drawing/2014/main" id="{5745DF77-C913-4213-9FE6-F2D1D457B19B}"/>
+                </a:ext>
+              </a:extLst>
+            </p:cNvPr>
+            <p:cNvCxnSpPr>
+              <a:cxnSpLocks/>
+            </p:cNvCxnSpPr>
+            <p:nvPr/>
+          </p:nvCxnSpPr>
+          <p:spPr>
+            <a:xfrm>
+              <a:off x="4592955" y="5631180"/>
+              <a:ext cx="85725" cy="3175"/>
+            </a:xfrm>
+            <a:prstGeom prst="line">
+              <a:avLst/>
+            </a:prstGeom>
+            <a:ln w="38100">
+              <a:solidFill>
+                <a:srgbClr val="FFFF00"/>
+              </a:solidFill>
+            </a:ln>
+          </p:spPr>
+          <p:style>
+            <a:lnRef idx="1">
+              <a:schemeClr val="accent3"/>
+            </a:lnRef>
+            <a:fillRef idx="0">
+              <a:schemeClr val="accent3"/>
+            </a:fillRef>
+            <a:effectRef idx="0">
+              <a:schemeClr val="accent3"/>
+            </a:effectRef>
+            <a:fontRef idx="minor">
+              <a:schemeClr val="tx1"/>
+            </a:fontRef>
+          </p:style>
+        </p:cxnSp>
+      </p:grpSp>
     </p:spTree>
     <p:extLst>
       <p:ext uri="{BB962C8B-B14F-4D97-AF65-F5344CB8AC3E}">
@@ -11193,6 +12058,127 @@
   <p:clrMapOvr>
     <a:masterClrMapping/>
   </p:clrMapOvr>
+  <p:timing>
+    <p:tnLst>
+      <p:par>
+        <p:cTn id="1" dur="indefinite" restart="never" nodeType="tmRoot">
+          <p:childTnLst>
+            <p:seq concurrent="1" nextAc="seek">
+              <p:cTn id="2" dur="indefinite" nodeType="mainSeq">
+                <p:childTnLst>
+                  <p:par>
+                    <p:cTn id="3" fill="hold">
+                      <p:stCondLst>
+                        <p:cond delay="indefinite"/>
+                      </p:stCondLst>
+                      <p:childTnLst>
+                        <p:par>
+                          <p:cTn id="4" fill="hold">
+                            <p:stCondLst>
+                              <p:cond delay="0"/>
+                            </p:stCondLst>
+                            <p:childTnLst>
+                              <p:par>
+                                <p:cTn id="5" presetID="2" presetClass="entr" presetSubtype="8" fill="hold" nodeType="clickEffect">
+                                  <p:stCondLst>
+                                    <p:cond delay="0"/>
+                                  </p:stCondLst>
+                                  <p:childTnLst>
+                                    <p:set>
+                                      <p:cBhvr>
+                                        <p:cTn id="6" dur="1" fill="hold">
+                                          <p:stCondLst>
+                                            <p:cond delay="0"/>
+                                          </p:stCondLst>
+                                        </p:cTn>
+                                        <p:tgtEl>
+                                          <p:spTgt spid="35"/>
+                                        </p:tgtEl>
+                                        <p:attrNameLst>
+                                          <p:attrName>style.visibility</p:attrName>
+                                        </p:attrNameLst>
+                                      </p:cBhvr>
+                                      <p:to>
+                                        <p:strVal val="visible"/>
+                                      </p:to>
+                                    </p:set>
+                                    <p:anim calcmode="lin" valueType="num">
+                                      <p:cBhvr additive="base">
+                                        <p:cTn id="7" dur="500" fill="hold"/>
+                                        <p:tgtEl>
+                                          <p:spTgt spid="35"/>
+                                        </p:tgtEl>
+                                        <p:attrNameLst>
+                                          <p:attrName>ppt_x</p:attrName>
+                                        </p:attrNameLst>
+                                      </p:cBhvr>
+                                      <p:tavLst>
+                                        <p:tav tm="0">
+                                          <p:val>
+                                            <p:strVal val="0-#ppt_w/2"/>
+                                          </p:val>
+                                        </p:tav>
+                                        <p:tav tm="100000">
+                                          <p:val>
+                                            <p:strVal val="#ppt_x"/>
+                                          </p:val>
+                                        </p:tav>
+                                      </p:tavLst>
+                                    </p:anim>
+                                    <p:anim calcmode="lin" valueType="num">
+                                      <p:cBhvr additive="base">
+                                        <p:cTn id="8" dur="500" fill="hold"/>
+                                        <p:tgtEl>
+                                          <p:spTgt spid="35"/>
+                                        </p:tgtEl>
+                                        <p:attrNameLst>
+                                          <p:attrName>ppt_y</p:attrName>
+                                        </p:attrNameLst>
+                                      </p:cBhvr>
+                                      <p:tavLst>
+                                        <p:tav tm="0">
+                                          <p:val>
+                                            <p:strVal val="#ppt_y"/>
+                                          </p:val>
+                                        </p:tav>
+                                        <p:tav tm="100000">
+                                          <p:val>
+                                            <p:strVal val="#ppt_y"/>
+                                          </p:val>
+                                        </p:tav>
+                                      </p:tavLst>
+                                    </p:anim>
+                                  </p:childTnLst>
+                                </p:cTn>
+                              </p:par>
+                            </p:childTnLst>
+                          </p:cTn>
+                        </p:par>
+                      </p:childTnLst>
+                    </p:cTn>
+                  </p:par>
+                </p:childTnLst>
+              </p:cTn>
+              <p:prevCondLst>
+                <p:cond evt="onPrev" delay="0">
+                  <p:tgtEl>
+                    <p:sldTgt/>
+                  </p:tgtEl>
+                </p:cond>
+              </p:prevCondLst>
+              <p:nextCondLst>
+                <p:cond evt="onNext" delay="0">
+                  <p:tgtEl>
+                    <p:sldTgt/>
+                  </p:tgtEl>
+                </p:cond>
+              </p:nextCondLst>
+            </p:seq>
+          </p:childTnLst>
+        </p:cTn>
+      </p:par>
+    </p:tnLst>
+  </p:timing>
 </p:sld>
 </file>
 
@@ -13151,13 +14137,13 @@
   <p:clrMapOvr>
     <a:masterClrMapping/>
   </p:clrMapOvr>
-  <mc:AlternateContent xmlns:mc="http://schemas.openxmlformats.org/markup-compatibility/2006">
-    <mc:Choice xmlns="" xmlns:p159="http://schemas.microsoft.com/office/powerpoint/2015/09/main" Requires="p159">
+  <mc:AlternateContent xmlns:mc="http://schemas.openxmlformats.org/markup-compatibility/2006" xmlns:p159="http://schemas.microsoft.com/office/powerpoint/2015/09/main">
+    <mc:Choice Requires="p159">
       <p:transition xmlns:p14="http://schemas.microsoft.com/office/powerpoint/2010/main" spd="slow" p14:dur="2000">
         <p159:morph option="byObject"/>
       </p:transition>
     </mc:Choice>
-    <mc:Fallback>
+    <mc:Fallback xmlns="">
       <p:transition spd="slow">
         <p:fade/>
       </p:transition>
@@ -17217,13 +18203,13 @@
   <p:clrMapOvr>
     <a:masterClrMapping/>
   </p:clrMapOvr>
-  <mc:AlternateContent xmlns:mc="http://schemas.openxmlformats.org/markup-compatibility/2006">
-    <mc:Choice xmlns="" xmlns:p159="http://schemas.microsoft.com/office/powerpoint/2015/09/main" Requires="p159">
+  <mc:AlternateContent xmlns:mc="http://schemas.openxmlformats.org/markup-compatibility/2006" xmlns:p159="http://schemas.microsoft.com/office/powerpoint/2015/09/main">
+    <mc:Choice Requires="p159">
       <p:transition xmlns:p14="http://schemas.microsoft.com/office/powerpoint/2010/main" spd="slow" p14:dur="2000">
         <p159:morph option="byObject"/>
       </p:transition>
     </mc:Choice>
-    <mc:Fallback>
+    <mc:Fallback xmlns="">
       <p:transition spd="slow">
         <p:fade/>
       </p:transition>
@@ -18159,34 +19145,22 @@
               <a:rPr lang="en-GB" dirty="0"/>
               <a:t> </a:t>
             </a:r>
-            <a:endParaRPr lang="en-GB" dirty="0" smtClean="0"/>
-          </a:p>
-          <a:p>
-            <a:r>
-              <a:rPr lang="en-GB" dirty="0" smtClean="0"/>
-              <a:t>Shiny contest apps for </a:t>
-            </a:r>
+          </a:p>
+          <a:p>
             <a:r>
               <a:rPr lang="en-GB" dirty="0"/>
-              <a:t>even more ideas: </a:t>
+              <a:t>Shiny contest apps for even more ideas: </a:t>
             </a:r>
             <a:r>
               <a:rPr lang="en-GB" dirty="0">
                 <a:hlinkClick r:id="rId9"/>
               </a:rPr>
-              <a:t>https://</a:t>
-            </a:r>
-            <a:r>
-              <a:rPr lang="en-GB" dirty="0" smtClean="0">
-                <a:hlinkClick r:id="rId9"/>
-              </a:rPr>
-              <a:t>community.rstudio.com/c/shiny/shiny-contest/30</a:t>
-            </a:r>
-            <a:r>
-              <a:rPr lang="en-GB" dirty="0" smtClean="0"/>
+              <a:t>https://community.rstudio.com/c/shiny/shiny-contest/30</a:t>
+            </a:r>
+            <a:r>
+              <a:rPr lang="en-GB" dirty="0"/>
               <a:t> </a:t>
             </a:r>
-            <a:endParaRPr lang="en-GB" dirty="0"/>
           </a:p>
           <a:p>
             <a:endParaRPr lang="en-GB" dirty="0"/>
@@ -18209,6 +19183,30 @@
 <file path=ppt/slides/slide2.xml><?xml version="1.0" encoding="utf-8"?>
 <p:sld xmlns:a="http://schemas.openxmlformats.org/drawingml/2006/main" xmlns:r="http://schemas.openxmlformats.org/officeDocument/2006/relationships" xmlns:p="http://schemas.openxmlformats.org/presentationml/2006/main">
   <p:cSld>
+    <p:bg>
+      <p:bgPr>
+        <a:blipFill rotWithShape="1">
+          <a:blip r:embed="rId2">
+            <a:duotone>
+              <a:schemeClr val="bg2">
+                <a:shade val="69000"/>
+                <a:hueMod val="108000"/>
+                <a:satMod val="164000"/>
+                <a:lumMod val="74000"/>
+              </a:schemeClr>
+              <a:schemeClr val="bg2">
+                <a:tint val="96000"/>
+                <a:hueMod val="88000"/>
+                <a:satMod val="140000"/>
+                <a:lumMod val="132000"/>
+              </a:schemeClr>
+            </a:duotone>
+          </a:blip>
+          <a:stretch/>
+        </a:blipFill>
+        <a:effectLst/>
+      </p:bgPr>
+    </p:bg>
     <p:spTree>
       <p:nvGrpSpPr>
         <p:cNvPr id="1" name=""/>
@@ -18239,9 +19237,16 @@
             <p:ph type="title"/>
           </p:nvPr>
         </p:nvSpPr>
-        <p:spPr/>
+        <p:spPr>
+          <a:xfrm>
+            <a:off x="648930" y="629266"/>
+            <a:ext cx="9252154" cy="1223983"/>
+          </a:xfrm>
+        </p:spPr>
         <p:txBody>
-          <a:bodyPr/>
+          <a:bodyPr>
+            <a:normAutofit/>
+          </a:bodyPr>
           <a:lstStyle/>
           <a:p>
             <a:r>
@@ -18267,7 +19272,12 @@
             <p:ph idx="1"/>
           </p:nvPr>
         </p:nvSpPr>
-        <p:spPr/>
+        <p:spPr>
+          <a:xfrm>
+            <a:off x="1103311" y="2052214"/>
+            <a:ext cx="5965394" cy="4196185"/>
+          </a:xfrm>
+        </p:spPr>
         <p:txBody>
           <a:bodyPr>
             <a:normAutofit/>
@@ -18275,24 +19285,64 @@
           <a:lstStyle/>
           <a:p>
             <a:r>
-              <a:rPr lang="en-GB" sz="2800" dirty="0"/>
+              <a:rPr lang="en-GB" sz="3200" dirty="0"/>
               <a:t>A package that makes interactive websites.</a:t>
             </a:r>
           </a:p>
           <a:p>
             <a:r>
-              <a:rPr lang="en-GB" sz="2800" dirty="0"/>
+              <a:rPr lang="en-GB" sz="3200" dirty="0"/>
               <a:t>Translates R code into web code: HTML, CSS and JavaScript.</a:t>
-            </a:r>
-          </a:p>
-          <a:p>
-            <a:r>
-              <a:rPr lang="en-GB" sz="2800" dirty="0"/>
-              <a:t>Works well with data.</a:t>
             </a:r>
           </a:p>
         </p:txBody>
       </p:sp>
+      <p:pic>
+        <p:nvPicPr>
+          <p:cNvPr id="7" name="Graphic 6" descr="Web Design">
+            <a:extLst>
+              <a:ext uri="{FF2B5EF4-FFF2-40B4-BE49-F238E27FC236}">
+                <a16:creationId xmlns:a16="http://schemas.microsoft.com/office/drawing/2014/main" id="{3AE17242-D677-4AA8-B743-4BA853F539A6}"/>
+              </a:ext>
+            </a:extLst>
+          </p:cNvPr>
+          <p:cNvPicPr>
+            <a:picLocks noChangeAspect="1"/>
+          </p:cNvPicPr>
+          <p:nvPr/>
+        </p:nvPicPr>
+        <p:blipFill>
+          <a:blip r:embed="rId3">
+            <a:extLst>
+              <a:ext uri="{28A0092B-C50C-407E-A947-70E740481C1C}">
+                <a14:useLocalDpi xmlns:a14="http://schemas.microsoft.com/office/drawing/2010/main" val="0"/>
+              </a:ext>
+              <a:ext uri="{96DAC541-7B7A-43D3-8B79-37D633B846F1}">
+                <asvg:svgBlip xmlns:asvg="http://schemas.microsoft.com/office/drawing/2016/SVG/main" r:embed="rId4"/>
+              </a:ext>
+            </a:extLst>
+          </a:blip>
+          <a:stretch>
+            <a:fillRect/>
+          </a:stretch>
+        </p:blipFill>
+        <p:spPr>
+          <a:xfrm>
+            <a:off x="7534655" y="2145861"/>
+            <a:ext cx="4008888" cy="4008888"/>
+          </a:xfrm>
+          <a:prstGeom prst="rect">
+            <a:avLst/>
+          </a:prstGeom>
+          <a:effectLst>
+            <a:outerShdw blurRad="50800" dist="38100" dir="5400000" algn="t" rotWithShape="0">
+              <a:prstClr val="black">
+                <a:alpha val="43000"/>
+              </a:prstClr>
+            </a:outerShdw>
+          </a:effectLst>
+        </p:spPr>
+      </p:pic>
     </p:spTree>
     <p:extLst>
       <p:ext uri="{BB962C8B-B14F-4D97-AF65-F5344CB8AC3E}">
@@ -18429,12 +19479,7 @@
             <p:ph type="title"/>
           </p:nvPr>
         </p:nvSpPr>
-        <p:spPr>
-          <a:xfrm>
-            <a:off x="646111" y="452718"/>
-            <a:ext cx="9404723" cy="1400530"/>
-          </a:xfrm>
-        </p:spPr>
+        <p:spPr/>
         <p:txBody>
           <a:bodyPr/>
           <a:lstStyle/>
@@ -18460,42 +19505,127 @@
             <a:spLocks noGrp="1"/>
           </p:cNvSpPr>
           <p:nvPr>
-            <p:ph idx="1"/>
+            <p:ph sz="half" idx="1"/>
           </p:nvPr>
         </p:nvSpPr>
-        <p:spPr/>
+        <p:spPr>
+          <a:xfrm>
+            <a:off x="1103312" y="2060575"/>
+            <a:ext cx="6118582" cy="4195763"/>
+          </a:xfrm>
+        </p:spPr>
         <p:txBody>
-          <a:bodyPr/>
+          <a:bodyPr>
+            <a:normAutofit/>
+          </a:bodyPr>
           <a:lstStyle/>
           <a:p>
             <a:r>
+              <a:rPr lang="en-GB" sz="2800" dirty="0"/>
+              <a:t>Free to develop and deploy (with paid options)</a:t>
+            </a:r>
+          </a:p>
+          <a:p>
+            <a:r>
+              <a:rPr lang="en-GB" sz="2800" dirty="0"/>
+              <a:t>Flexibility and Potential</a:t>
+            </a:r>
+          </a:p>
+          <a:p>
+            <a:r>
+              <a:rPr lang="en-GB" sz="2800" dirty="0"/>
+              <a:t>Teamwork</a:t>
+            </a:r>
+          </a:p>
+          <a:p>
+            <a:r>
+              <a:rPr lang="en-GB" sz="2800" dirty="0"/>
+              <a:t>Public engagement</a:t>
+            </a:r>
+          </a:p>
+          <a:p>
+            <a:r>
+              <a:rPr lang="en-GB" sz="2800" dirty="0"/>
+              <a:t>Reproducibility and open research</a:t>
+            </a:r>
+          </a:p>
+        </p:txBody>
+      </p:sp>
+      <p:sp>
+        <p:nvSpPr>
+          <p:cNvPr id="5" name="Content Placeholder 4">
+            <a:extLst>
+              <a:ext uri="{FF2B5EF4-FFF2-40B4-BE49-F238E27FC236}">
+                <a16:creationId xmlns:a16="http://schemas.microsoft.com/office/drawing/2014/main" id="{28624F95-0814-48E2-A3C0-68841245C8F9}"/>
+              </a:ext>
+            </a:extLst>
+          </p:cNvPr>
+          <p:cNvSpPr>
+            <a:spLocks noGrp="1"/>
+          </p:cNvSpPr>
+          <p:nvPr>
+            <p:ph sz="half" idx="2"/>
+          </p:nvPr>
+        </p:nvSpPr>
+        <p:spPr>
+          <a:xfrm>
+            <a:off x="7221894" y="4310743"/>
+            <a:ext cx="4595108" cy="2346810"/>
+          </a:xfrm>
+          <a:prstGeom prst="roundRect">
+            <a:avLst/>
+          </a:prstGeom>
+        </p:spPr>
+        <p:style>
+          <a:lnRef idx="2">
+            <a:schemeClr val="accent6">
+              <a:shade val="50000"/>
+            </a:schemeClr>
+          </a:lnRef>
+          <a:fillRef idx="1">
+            <a:schemeClr val="accent6"/>
+          </a:fillRef>
+          <a:effectRef idx="0">
+            <a:schemeClr val="accent6"/>
+          </a:effectRef>
+          <a:fontRef idx="minor">
+            <a:schemeClr val="lt1"/>
+          </a:fontRef>
+        </p:style>
+        <p:txBody>
+          <a:bodyPr>
+            <a:normAutofit/>
+          </a:bodyPr>
+          <a:lstStyle/>
+          <a:p>
+            <a:pPr marL="0" indent="0">
+              <a:buNone/>
+            </a:pPr>
+            <a:r>
               <a:rPr lang="en-GB" dirty="0"/>
-              <a:t>Price</a:t>
+              <a:t>But…</a:t>
             </a:r>
           </a:p>
           <a:p>
             <a:r>
               <a:rPr lang="en-GB" dirty="0"/>
-              <a:t>Flexibility</a:t>
+              <a:t>Another new thing?!</a:t>
             </a:r>
           </a:p>
           <a:p>
             <a:r>
               <a:rPr lang="en-GB" dirty="0"/>
-              <a:t>Potential</a:t>
+              <a:t>Easy for public-facing data, not as easy for confidential information</a:t>
             </a:r>
           </a:p>
           <a:p>
             <a:r>
               <a:rPr lang="en-GB" dirty="0"/>
-              <a:t>Public engagement</a:t>
-            </a:r>
-          </a:p>
-          <a:p>
-            <a:r>
-              <a:rPr lang="en-GB" dirty="0"/>
-              <a:t>Reproducibility and open research</a:t>
-            </a:r>
+              <a:t>Time for development</a:t>
+            </a:r>
+          </a:p>
+          <a:p>
+            <a:endParaRPr lang="en-GB" dirty="0"/>
           </a:p>
         </p:txBody>
       </p:sp>
@@ -18513,200 +19643,6 @@
 </file>
 
 <file path=ppt/slides/slide4.xml><?xml version="1.0" encoding="utf-8"?>
-<p:sld xmlns:a="http://schemas.openxmlformats.org/drawingml/2006/main" xmlns:r="http://schemas.openxmlformats.org/officeDocument/2006/relationships" xmlns:p="http://schemas.openxmlformats.org/presentationml/2006/main">
-  <p:cSld>
-    <p:spTree>
-      <p:nvGrpSpPr>
-        <p:cNvPr id="1" name=""/>
-        <p:cNvGrpSpPr/>
-        <p:nvPr/>
-      </p:nvGrpSpPr>
-      <p:grpSpPr>
-        <a:xfrm>
-          <a:off x="0" y="0"/>
-          <a:ext cx="0" cy="0"/>
-          <a:chOff x="0" y="0"/>
-          <a:chExt cx="0" cy="0"/>
-        </a:xfrm>
-      </p:grpSpPr>
-      <p:sp>
-        <p:nvSpPr>
-          <p:cNvPr id="4" name="Title 3">
-            <a:extLst>
-              <a:ext uri="{FF2B5EF4-FFF2-40B4-BE49-F238E27FC236}">
-                <a16:creationId xmlns:a16="http://schemas.microsoft.com/office/drawing/2014/main" id="{FAB69340-C9C3-4821-89C1-A448099BB704}"/>
-              </a:ext>
-            </a:extLst>
-          </p:cNvPr>
-          <p:cNvSpPr>
-            <a:spLocks noGrp="1"/>
-          </p:cNvSpPr>
-          <p:nvPr>
-            <p:ph type="title"/>
-          </p:nvPr>
-        </p:nvSpPr>
-        <p:spPr/>
-        <p:txBody>
-          <a:bodyPr/>
-          <a:lstStyle/>
-          <a:p>
-            <a:r>
-              <a:rPr lang="en-GB" dirty="0"/>
-              <a:t>Why use Shiny?</a:t>
-            </a:r>
-          </a:p>
-        </p:txBody>
-      </p:sp>
-      <p:sp>
-        <p:nvSpPr>
-          <p:cNvPr id="7" name="Text Placeholder 6">
-            <a:extLst>
-              <a:ext uri="{FF2B5EF4-FFF2-40B4-BE49-F238E27FC236}">
-                <a16:creationId xmlns:a16="http://schemas.microsoft.com/office/drawing/2014/main" id="{D8E5303C-4F3A-4D4C-835C-3C1503CCDFE4}"/>
-              </a:ext>
-            </a:extLst>
-          </p:cNvPr>
-          <p:cNvSpPr>
-            <a:spLocks noGrp="1"/>
-          </p:cNvSpPr>
-          <p:nvPr>
-            <p:ph type="body" idx="1"/>
-          </p:nvPr>
-        </p:nvSpPr>
-        <p:spPr/>
-        <p:txBody>
-          <a:bodyPr/>
-          <a:lstStyle/>
-          <a:p>
-            <a:r>
-              <a:rPr lang="en-GB" dirty="0"/>
-              <a:t>Advantages</a:t>
-            </a:r>
-          </a:p>
-        </p:txBody>
-      </p:sp>
-      <p:sp>
-        <p:nvSpPr>
-          <p:cNvPr id="8" name="Content Placeholder 7">
-            <a:extLst>
-              <a:ext uri="{FF2B5EF4-FFF2-40B4-BE49-F238E27FC236}">
-                <a16:creationId xmlns:a16="http://schemas.microsoft.com/office/drawing/2014/main" id="{3BEC7258-DE0C-48BC-84C7-16980935F257}"/>
-              </a:ext>
-            </a:extLst>
-          </p:cNvPr>
-          <p:cNvSpPr>
-            <a:spLocks noGrp="1"/>
-          </p:cNvSpPr>
-          <p:nvPr>
-            <p:ph sz="half" idx="2"/>
-          </p:nvPr>
-        </p:nvSpPr>
-        <p:spPr/>
-        <p:txBody>
-          <a:bodyPr/>
-          <a:lstStyle/>
-          <a:p>
-            <a:r>
-              <a:rPr lang="en-GB" dirty="0"/>
-              <a:t>Mapping and modelling</a:t>
-            </a:r>
-          </a:p>
-          <a:p>
-            <a:r>
-              <a:rPr lang="en-GB" dirty="0"/>
-              <a:t>Extremely flexible</a:t>
-            </a:r>
-          </a:p>
-          <a:p>
-            <a:r>
-              <a:rPr lang="en-GB" dirty="0"/>
-              <a:t>Develop a new skill set</a:t>
-            </a:r>
-          </a:p>
-        </p:txBody>
-      </p:sp>
-      <p:sp>
-        <p:nvSpPr>
-          <p:cNvPr id="9" name="Text Placeholder 8">
-            <a:extLst>
-              <a:ext uri="{FF2B5EF4-FFF2-40B4-BE49-F238E27FC236}">
-                <a16:creationId xmlns:a16="http://schemas.microsoft.com/office/drawing/2014/main" id="{DB127B58-FA8D-42C4-BF89-6E3817AAA0E1}"/>
-              </a:ext>
-            </a:extLst>
-          </p:cNvPr>
-          <p:cNvSpPr>
-            <a:spLocks noGrp="1"/>
-          </p:cNvSpPr>
-          <p:nvPr>
-            <p:ph type="body" sz="quarter" idx="3"/>
-          </p:nvPr>
-        </p:nvSpPr>
-        <p:spPr/>
-        <p:txBody>
-          <a:bodyPr/>
-          <a:lstStyle/>
-          <a:p>
-            <a:r>
-              <a:rPr lang="en-GB" dirty="0"/>
-              <a:t>Disadvantages</a:t>
-            </a:r>
-          </a:p>
-        </p:txBody>
-      </p:sp>
-      <p:sp>
-        <p:nvSpPr>
-          <p:cNvPr id="10" name="Content Placeholder 9">
-            <a:extLst>
-              <a:ext uri="{FF2B5EF4-FFF2-40B4-BE49-F238E27FC236}">
-                <a16:creationId xmlns:a16="http://schemas.microsoft.com/office/drawing/2014/main" id="{4CCB4A21-46D0-4343-84BD-0AF63F2B8F5C}"/>
-              </a:ext>
-            </a:extLst>
-          </p:cNvPr>
-          <p:cNvSpPr>
-            <a:spLocks noGrp="1"/>
-          </p:cNvSpPr>
-          <p:nvPr>
-            <p:ph sz="quarter" idx="4"/>
-          </p:nvPr>
-        </p:nvSpPr>
-        <p:spPr/>
-        <p:txBody>
-          <a:bodyPr/>
-          <a:lstStyle/>
-          <a:p>
-            <a:r>
-              <a:rPr lang="en-GB" dirty="0"/>
-              <a:t>Potentially not widely used in your organisation</a:t>
-            </a:r>
-          </a:p>
-          <a:p>
-            <a:r>
-              <a:rPr lang="en-GB" dirty="0"/>
-              <a:t>Easy for public-facing data, not as easy for confidential information</a:t>
-            </a:r>
-          </a:p>
-          <a:p>
-            <a:r>
-              <a:rPr lang="en-GB" dirty="0"/>
-              <a:t>Time for development</a:t>
-            </a:r>
-          </a:p>
-        </p:txBody>
-      </p:sp>
-    </p:spTree>
-    <p:extLst>
-      <p:ext uri="{BB962C8B-B14F-4D97-AF65-F5344CB8AC3E}">
-        <p14:creationId xmlns:p14="http://schemas.microsoft.com/office/powerpoint/2010/main" val="387730021"/>
-      </p:ext>
-    </p:extLst>
-  </p:cSld>
-  <p:clrMapOvr>
-    <a:masterClrMapping/>
-  </p:clrMapOvr>
-</p:sld>
-</file>
-
-<file path=ppt/slides/slide5.xml><?xml version="1.0" encoding="utf-8"?>
 <p:sld xmlns:a="http://schemas.openxmlformats.org/drawingml/2006/main" xmlns:r="http://schemas.openxmlformats.org/officeDocument/2006/relationships" xmlns:p="http://schemas.openxmlformats.org/presentationml/2006/main">
   <p:cSld>
     <p:bg>
@@ -18739,7 +19675,7 @@
                 <a16:creationId xmlns:a16="http://schemas.microsoft.com/office/drawing/2014/main" id="{4E78424C-6FD0-41F8-9CAA-5DC19C42359F}"/>
               </a:ext>
               <a:ext uri="{C183D7F6-B498-43B3-948B-1728B52AA6E4}">
-                <adec:decorative xmlns="" xmlns:adec="http://schemas.microsoft.com/office/drawing/2017/decorative" val="1"/>
+                <adec:decorative xmlns:adec="http://schemas.microsoft.com/office/drawing/2017/decorative" val="1"/>
               </a:ext>
             </a:extLst>
           </p:cNvPr>
@@ -18867,7 +19803,7 @@
                 <a16:creationId xmlns:a16="http://schemas.microsoft.com/office/drawing/2014/main" id="{DD136760-57DC-4301-8BEA-B71AD2D13905}"/>
               </a:ext>
               <a:ext uri="{C183D7F6-B498-43B3-948B-1728B52AA6E4}">
-                <adec:decorative xmlns="" xmlns:adec="http://schemas.microsoft.com/office/drawing/2017/decorative" val="1"/>
+                <adec:decorative xmlns:adec="http://schemas.microsoft.com/office/drawing/2017/decorative" val="1"/>
               </a:ext>
             </a:extLst>
           </p:cNvPr>
@@ -19388,7 +20324,7 @@
                 <a16:creationId xmlns:a16="http://schemas.microsoft.com/office/drawing/2014/main" id="{BDC58DEA-1307-4F44-AD47-E613D8B76A89}"/>
               </a:ext>
               <a:ext uri="{C183D7F6-B498-43B3-948B-1728B52AA6E4}">
-                <adec:decorative xmlns="" xmlns:adec="http://schemas.microsoft.com/office/drawing/2017/decorative" val="1"/>
+                <adec:decorative xmlns:adec="http://schemas.microsoft.com/office/drawing/2017/decorative" val="1"/>
               </a:ext>
             </a:extLst>
           </p:cNvPr>
@@ -19769,7 +20705,7 @@
                 <a16:creationId xmlns:a16="http://schemas.microsoft.com/office/drawing/2014/main" id="{C99B912D-1E4B-42AF-A2BE-CFEFEC916EE7}"/>
               </a:ext>
               <a:ext uri="{C183D7F6-B498-43B3-948B-1728B52AA6E4}">
-                <adec:decorative xmlns="" xmlns:adec="http://schemas.microsoft.com/office/drawing/2017/decorative" val="1"/>
+                <adec:decorative xmlns:adec="http://schemas.microsoft.com/office/drawing/2017/decorative" val="1"/>
               </a:ext>
             </a:extLst>
           </p:cNvPr>
@@ -19828,6 +20764,11 @@
           </p:cNvGraphicFramePr>
           <p:nvPr>
             <p:ph idx="1"/>
+            <p:extLst>
+              <p:ext uri="{D42A27DB-BD31-4B8C-83A1-F6EECF244321}">
+                <p14:modId xmlns:p14="http://schemas.microsoft.com/office/powerpoint/2010/main" val="1041638354"/>
+              </p:ext>
+            </p:extLst>
           </p:nvPr>
         </p:nvGraphicFramePr>
         <p:xfrm>
@@ -19853,7 +20794,7 @@
 </p:sld>
 </file>
 
-<file path=ppt/slides/slide6.xml><?xml version="1.0" encoding="utf-8"?>
+<file path=ppt/slides/slide5.xml><?xml version="1.0" encoding="utf-8"?>
 <p:sld xmlns:a="http://schemas.openxmlformats.org/drawingml/2006/main" xmlns:r="http://schemas.openxmlformats.org/officeDocument/2006/relationships" xmlns:p="http://schemas.openxmlformats.org/presentationml/2006/main">
   <p:cSld>
     <p:spTree>
@@ -20024,10 +20965,6 @@
               <a:rPr lang="en-GB" sz="2000" dirty="0" err="1"/>
               <a:t>ui.R</a:t>
             </a:r>
-            <a:r>
-              <a:rPr lang="en-GB" sz="2000" dirty="0"/>
-              <a:t/>
-            </a:r>
             <a:br>
               <a:rPr lang="en-GB" sz="2000" dirty="0"/>
             </a:br>
@@ -20066,26 +21003,25 @@
             <a:endParaRPr lang="en-GB" sz="1800" dirty="0"/>
           </a:p>
           <a:p>
-            <a:pPr lvl="1">
-              <a:buFont typeface="Wingdings" panose="05000000000000000000" pitchFamily="2" charset="2"/>
-              <a:buChar char="v"/>
+            <a:pPr marL="857250" lvl="2" indent="0">
+              <a:buNone/>
             </a:pPr>
             <a:r>
-              <a:rPr lang="en-GB" sz="1800" dirty="0"/>
+              <a:rPr lang="en-GB" sz="1600" dirty="0"/>
               <a:t>… layout/structure of </a:t>
             </a:r>
             <a:r>
-              <a:rPr lang="en-GB" sz="1800" dirty="0" err="1"/>
+              <a:rPr lang="en-GB" sz="1600" dirty="0" err="1"/>
               <a:t>ui</a:t>
             </a:r>
             <a:r>
-              <a:rPr lang="en-GB" sz="1800" dirty="0"/>
+              <a:rPr lang="en-GB" sz="1600" dirty="0"/>
               <a:t> …</a:t>
             </a:r>
             <a:br>
-              <a:rPr lang="en-GB" sz="1800" dirty="0"/>
+              <a:rPr lang="en-GB" sz="1600" dirty="0"/>
             </a:br>
-            <a:endParaRPr lang="en-GB" sz="1800" dirty="0"/>
+            <a:endParaRPr lang="en-GB" sz="1600" dirty="0"/>
           </a:p>
           <a:p>
             <a:pPr lvl="1">
@@ -20156,10 +21092,6 @@
               <a:rPr lang="en-GB" sz="2000" dirty="0" err="1"/>
               <a:t>server.R</a:t>
             </a:r>
-            <a:r>
-              <a:rPr lang="en-GB" sz="2000" dirty="0"/>
-              <a:t/>
-            </a:r>
             <a:br>
               <a:rPr lang="en-GB" sz="2000" dirty="0"/>
             </a:br>
@@ -20186,28 +21118,23 @@
               <a:rPr lang="en-GB" sz="1800" dirty="0" err="1"/>
               <a:t>ui</a:t>
             </a:r>
-            <a:r>
-              <a:rPr lang="en-GB" sz="1800" dirty="0"/>
-              <a:t/>
-            </a:r>
             <a:br>
               <a:rPr lang="en-GB" sz="1800" dirty="0"/>
             </a:br>
             <a:endParaRPr lang="en-GB" sz="1800" dirty="0"/>
           </a:p>
           <a:p>
-            <a:pPr lvl="1">
-              <a:buFont typeface="Wingdings" panose="05000000000000000000" pitchFamily="2" charset="2"/>
-              <a:buChar char="v"/>
+            <a:pPr marL="857250" lvl="2" indent="0">
+              <a:buNone/>
             </a:pPr>
             <a:r>
-              <a:rPr lang="en-GB" sz="1800" dirty="0"/>
+              <a:rPr lang="en-GB" sz="1600" dirty="0"/>
               <a:t>… R code processes …</a:t>
             </a:r>
             <a:br>
-              <a:rPr lang="en-GB" sz="1800" dirty="0"/>
+              <a:rPr lang="en-GB" sz="1600" dirty="0"/>
             </a:br>
-            <a:endParaRPr lang="en-GB" sz="1800" dirty="0"/>
+            <a:endParaRPr lang="en-GB" sz="1600" dirty="0"/>
           </a:p>
           <a:p>
             <a:pPr lvl="1">
@@ -20816,6 +21743,1939 @@
   <p:clrMapOvr>
     <a:masterClrMapping/>
   </p:clrMapOvr>
+</p:sld>
+</file>
+
+<file path=ppt/slides/slide6.xml><?xml version="1.0" encoding="utf-8"?>
+<p:sld xmlns:a="http://schemas.openxmlformats.org/drawingml/2006/main" xmlns:r="http://schemas.openxmlformats.org/officeDocument/2006/relationships" xmlns:p="http://schemas.openxmlformats.org/presentationml/2006/main">
+  <p:cSld>
+    <p:spTree>
+      <p:nvGrpSpPr>
+        <p:cNvPr id="1" name=""/>
+        <p:cNvGrpSpPr/>
+        <p:nvPr/>
+      </p:nvGrpSpPr>
+      <p:grpSpPr>
+        <a:xfrm>
+          <a:off x="0" y="0"/>
+          <a:ext cx="0" cy="0"/>
+          <a:chOff x="0" y="0"/>
+          <a:chExt cx="0" cy="0"/>
+        </a:xfrm>
+      </p:grpSpPr>
+      <p:sp>
+        <p:nvSpPr>
+          <p:cNvPr id="23" name="Rectangle 22">
+            <a:extLst>
+              <a:ext uri="{FF2B5EF4-FFF2-40B4-BE49-F238E27FC236}">
+                <a16:creationId xmlns:a16="http://schemas.microsoft.com/office/drawing/2014/main" id="{46AAD75B-A2E9-4A40-ABB3-63A55FA528F2}"/>
+              </a:ext>
+            </a:extLst>
+          </p:cNvPr>
+          <p:cNvSpPr/>
+          <p:nvPr/>
+        </p:nvSpPr>
+        <p:spPr>
+          <a:xfrm>
+            <a:off x="965200" y="1747520"/>
+            <a:ext cx="4622800" cy="4789914"/>
+          </a:xfrm>
+          <a:prstGeom prst="rect">
+            <a:avLst/>
+          </a:prstGeom>
+          <a:solidFill>
+            <a:schemeClr val="tx1">
+              <a:lumMod val="95000"/>
+            </a:schemeClr>
+          </a:solidFill>
+          <a:ln>
+            <a:noFill/>
+          </a:ln>
+        </p:spPr>
+        <p:style>
+          <a:lnRef idx="2">
+            <a:schemeClr val="accent1">
+              <a:shade val="50000"/>
+            </a:schemeClr>
+          </a:lnRef>
+          <a:fillRef idx="1">
+            <a:schemeClr val="accent1"/>
+          </a:fillRef>
+          <a:effectRef idx="0">
+            <a:schemeClr val="accent1"/>
+          </a:effectRef>
+          <a:fontRef idx="minor">
+            <a:schemeClr val="lt1"/>
+          </a:fontRef>
+        </p:style>
+        <p:txBody>
+          <a:bodyPr rtlCol="0" anchor="ctr"/>
+          <a:lstStyle/>
+          <a:p>
+            <a:pPr algn="ctr"/>
+            <a:endParaRPr lang="en-GB"/>
+          </a:p>
+        </p:txBody>
+      </p:sp>
+      <p:sp>
+        <p:nvSpPr>
+          <p:cNvPr id="2" name="Title 1">
+            <a:extLst>
+              <a:ext uri="{FF2B5EF4-FFF2-40B4-BE49-F238E27FC236}">
+                <a16:creationId xmlns:a16="http://schemas.microsoft.com/office/drawing/2014/main" id="{46129A8C-8A94-4F15-95A6-4C2F51B8FB9A}"/>
+              </a:ext>
+            </a:extLst>
+          </p:cNvPr>
+          <p:cNvSpPr>
+            <a:spLocks noGrp="1"/>
+          </p:cNvSpPr>
+          <p:nvPr>
+            <p:ph type="title"/>
+          </p:nvPr>
+        </p:nvSpPr>
+        <p:spPr/>
+        <p:txBody>
+          <a:bodyPr/>
+          <a:lstStyle/>
+          <a:p>
+            <a:r>
+              <a:rPr lang="en-GB" dirty="0"/>
+              <a:t>Structuring the User Interface</a:t>
+            </a:r>
+          </a:p>
+        </p:txBody>
+      </p:sp>
+      <p:sp>
+        <p:nvSpPr>
+          <p:cNvPr id="3" name="Content Placeholder 2">
+            <a:extLst>
+              <a:ext uri="{FF2B5EF4-FFF2-40B4-BE49-F238E27FC236}">
+                <a16:creationId xmlns:a16="http://schemas.microsoft.com/office/drawing/2014/main" id="{F6FCFF02-107A-484A-A357-DD1BA0B4CC1F}"/>
+              </a:ext>
+            </a:extLst>
+          </p:cNvPr>
+          <p:cNvSpPr>
+            <a:spLocks noGrp="1"/>
+          </p:cNvSpPr>
+          <p:nvPr>
+            <p:ph sz="half" idx="1"/>
+          </p:nvPr>
+        </p:nvSpPr>
+        <p:spPr>
+          <a:xfrm>
+            <a:off x="965200" y="1407763"/>
+            <a:ext cx="590280" cy="339757"/>
+          </a:xfrm>
+          <a:solidFill>
+            <a:schemeClr val="tx1">
+              <a:lumMod val="75000"/>
+            </a:schemeClr>
+          </a:solidFill>
+        </p:spPr>
+        <p:txBody>
+          <a:bodyPr anchor="b">
+            <a:normAutofit fontScale="77500" lnSpcReduction="20000"/>
+          </a:bodyPr>
+          <a:lstStyle/>
+          <a:p>
+            <a:pPr marL="0" indent="0" algn="ctr">
+              <a:buNone/>
+            </a:pPr>
+            <a:r>
+              <a:rPr lang="en-GB" dirty="0" err="1">
+                <a:solidFill>
+                  <a:schemeClr val="bg1"/>
+                </a:solidFill>
+                <a:latin typeface="Consolas" panose="020B0609020204030204" pitchFamily="49" charset="0"/>
+              </a:rPr>
+              <a:t>ui.R</a:t>
+            </a:r>
+            <a:endParaRPr lang="en-GB" dirty="0">
+              <a:solidFill>
+                <a:schemeClr val="bg1"/>
+              </a:solidFill>
+              <a:latin typeface="Consolas" panose="020B0609020204030204" pitchFamily="49" charset="0"/>
+            </a:endParaRPr>
+          </a:p>
+        </p:txBody>
+      </p:sp>
+      <p:sp>
+        <p:nvSpPr>
+          <p:cNvPr id="6" name="Rectangle 5">
+            <a:extLst>
+              <a:ext uri="{FF2B5EF4-FFF2-40B4-BE49-F238E27FC236}">
+                <a16:creationId xmlns:a16="http://schemas.microsoft.com/office/drawing/2014/main" id="{A37EC92B-46A4-432A-BFB4-17895B2CA251}"/>
+              </a:ext>
+            </a:extLst>
+          </p:cNvPr>
+          <p:cNvSpPr/>
+          <p:nvPr/>
+        </p:nvSpPr>
+        <p:spPr>
+          <a:xfrm>
+            <a:off x="5927834" y="1513491"/>
+            <a:ext cx="5938345" cy="5023943"/>
+          </a:xfrm>
+          <a:prstGeom prst="rect">
+            <a:avLst/>
+          </a:prstGeom>
+          <a:solidFill>
+            <a:schemeClr val="tx1"/>
+          </a:solidFill>
+          <a:ln>
+            <a:solidFill>
+              <a:schemeClr val="bg1">
+                <a:lumMod val="95000"/>
+                <a:lumOff val="5000"/>
+              </a:schemeClr>
+            </a:solidFill>
+          </a:ln>
+        </p:spPr>
+        <p:style>
+          <a:lnRef idx="2">
+            <a:schemeClr val="accent1">
+              <a:shade val="50000"/>
+            </a:schemeClr>
+          </a:lnRef>
+          <a:fillRef idx="1">
+            <a:schemeClr val="accent1"/>
+          </a:fillRef>
+          <a:effectRef idx="0">
+            <a:schemeClr val="accent1"/>
+          </a:effectRef>
+          <a:fontRef idx="minor">
+            <a:schemeClr val="lt1"/>
+          </a:fontRef>
+        </p:style>
+        <p:txBody>
+          <a:bodyPr rtlCol="0" anchor="ctr"/>
+          <a:lstStyle/>
+          <a:p>
+            <a:pPr algn="ctr"/>
+            <a:endParaRPr lang="en-GB" dirty="0"/>
+          </a:p>
+        </p:txBody>
+      </p:sp>
+      <p:grpSp>
+        <p:nvGrpSpPr>
+          <p:cNvPr id="25" name="Group 24">
+            <a:extLst>
+              <a:ext uri="{FF2B5EF4-FFF2-40B4-BE49-F238E27FC236}">
+                <a16:creationId xmlns:a16="http://schemas.microsoft.com/office/drawing/2014/main" id="{979E42C4-E3A7-4B71-B2BF-3CB4E211E058}"/>
+              </a:ext>
+            </a:extLst>
+          </p:cNvPr>
+          <p:cNvGrpSpPr/>
+          <p:nvPr/>
+        </p:nvGrpSpPr>
+        <p:grpSpPr>
+          <a:xfrm>
+            <a:off x="6030353" y="1671145"/>
+            <a:ext cx="5741233" cy="4734138"/>
+            <a:chOff x="6030353" y="1671145"/>
+            <a:chExt cx="5741233" cy="4734138"/>
+          </a:xfrm>
+        </p:grpSpPr>
+        <p:sp>
+          <p:nvSpPr>
+            <p:cNvPr id="7" name="Rectangle: Rounded Corners 6">
+              <a:extLst>
+                <a:ext uri="{FF2B5EF4-FFF2-40B4-BE49-F238E27FC236}">
+                  <a16:creationId xmlns:a16="http://schemas.microsoft.com/office/drawing/2014/main" id="{9F78966E-516F-42B9-99AA-FF84048F3434}"/>
+                </a:ext>
+              </a:extLst>
+            </p:cNvPr>
+            <p:cNvSpPr/>
+            <p:nvPr/>
+          </p:nvSpPr>
+          <p:spPr>
+            <a:xfrm>
+              <a:off x="6030353" y="1671145"/>
+              <a:ext cx="5741233" cy="4734138"/>
+            </a:xfrm>
+            <a:prstGeom prst="roundRect">
+              <a:avLst>
+                <a:gd name="adj" fmla="val 4234"/>
+              </a:avLst>
+            </a:prstGeom>
+            <a:solidFill>
+              <a:schemeClr val="bg2">
+                <a:lumMod val="20000"/>
+                <a:lumOff val="80000"/>
+              </a:schemeClr>
+            </a:solidFill>
+            <a:ln>
+              <a:noFill/>
+            </a:ln>
+          </p:spPr>
+          <p:style>
+            <a:lnRef idx="2">
+              <a:schemeClr val="accent1">
+                <a:shade val="50000"/>
+              </a:schemeClr>
+            </a:lnRef>
+            <a:fillRef idx="1">
+              <a:schemeClr val="accent1"/>
+            </a:fillRef>
+            <a:effectRef idx="0">
+              <a:schemeClr val="accent1"/>
+            </a:effectRef>
+            <a:fontRef idx="minor">
+              <a:schemeClr val="lt1"/>
+            </a:fontRef>
+          </p:style>
+          <p:txBody>
+            <a:bodyPr rtlCol="0" anchor="t"/>
+            <a:lstStyle/>
+            <a:p>
+              <a:endParaRPr lang="en-GB" sz="1600" dirty="0">
+                <a:solidFill>
+                  <a:schemeClr val="bg1">
+                    <a:lumMod val="95000"/>
+                    <a:lumOff val="5000"/>
+                  </a:schemeClr>
+                </a:solidFill>
+                <a:latin typeface="Consolas" panose="020B0609020204030204" pitchFamily="49" charset="0"/>
+              </a:endParaRPr>
+            </a:p>
+          </p:txBody>
+        </p:sp>
+        <p:sp>
+          <p:nvSpPr>
+            <p:cNvPr id="8" name="Rectangle: Rounded Corners 7">
+              <a:extLst>
+                <a:ext uri="{FF2B5EF4-FFF2-40B4-BE49-F238E27FC236}">
+                  <a16:creationId xmlns:a16="http://schemas.microsoft.com/office/drawing/2014/main" id="{56AD8C75-73D6-4EF2-90B9-63CDD91DF6CB}"/>
+                </a:ext>
+              </a:extLst>
+            </p:cNvPr>
+            <p:cNvSpPr/>
+            <p:nvPr/>
+          </p:nvSpPr>
+          <p:spPr>
+            <a:xfrm>
+              <a:off x="6182754" y="1823545"/>
+              <a:ext cx="5363136" cy="499241"/>
+            </a:xfrm>
+            <a:prstGeom prst="roundRect">
+              <a:avLst>
+                <a:gd name="adj" fmla="val 21076"/>
+              </a:avLst>
+            </a:prstGeom>
+            <a:solidFill>
+              <a:schemeClr val="accent3">
+                <a:lumMod val="20000"/>
+                <a:lumOff val="80000"/>
+              </a:schemeClr>
+            </a:solidFill>
+            <a:ln>
+              <a:noFill/>
+            </a:ln>
+          </p:spPr>
+          <p:style>
+            <a:lnRef idx="2">
+              <a:schemeClr val="accent1">
+                <a:shade val="50000"/>
+              </a:schemeClr>
+            </a:lnRef>
+            <a:fillRef idx="1">
+              <a:schemeClr val="accent1"/>
+            </a:fillRef>
+            <a:effectRef idx="0">
+              <a:schemeClr val="accent1"/>
+            </a:effectRef>
+            <a:fontRef idx="minor">
+              <a:schemeClr val="lt1"/>
+            </a:fontRef>
+          </p:style>
+          <p:txBody>
+            <a:bodyPr rtlCol="0" anchor="t"/>
+            <a:lstStyle/>
+            <a:p>
+              <a:endParaRPr lang="en-GB" sz="1600" dirty="0">
+                <a:solidFill>
+                  <a:schemeClr val="bg1">
+                    <a:lumMod val="95000"/>
+                    <a:lumOff val="5000"/>
+                  </a:schemeClr>
+                </a:solidFill>
+                <a:latin typeface="Consolas" panose="020B0609020204030204" pitchFamily="49" charset="0"/>
+              </a:endParaRPr>
+            </a:p>
+          </p:txBody>
+        </p:sp>
+        <p:sp>
+          <p:nvSpPr>
+            <p:cNvPr id="9" name="Rectangle: Rounded Corners 8">
+              <a:extLst>
+                <a:ext uri="{FF2B5EF4-FFF2-40B4-BE49-F238E27FC236}">
+                  <a16:creationId xmlns:a16="http://schemas.microsoft.com/office/drawing/2014/main" id="{5B0A65A4-526A-47B9-9E7B-9F8D14D1DFEF}"/>
+                </a:ext>
+              </a:extLst>
+            </p:cNvPr>
+            <p:cNvSpPr/>
+            <p:nvPr/>
+          </p:nvSpPr>
+          <p:spPr>
+            <a:xfrm>
+              <a:off x="6182754" y="2427890"/>
+              <a:ext cx="5363136" cy="3825765"/>
+            </a:xfrm>
+            <a:prstGeom prst="roundRect">
+              <a:avLst>
+                <a:gd name="adj" fmla="val 2931"/>
+              </a:avLst>
+            </a:prstGeom>
+            <a:solidFill>
+              <a:schemeClr val="accent1">
+                <a:lumMod val="20000"/>
+                <a:lumOff val="80000"/>
+              </a:schemeClr>
+            </a:solidFill>
+            <a:ln>
+              <a:noFill/>
+            </a:ln>
+          </p:spPr>
+          <p:style>
+            <a:lnRef idx="2">
+              <a:schemeClr val="accent1">
+                <a:shade val="50000"/>
+              </a:schemeClr>
+            </a:lnRef>
+            <a:fillRef idx="1">
+              <a:schemeClr val="accent1"/>
+            </a:fillRef>
+            <a:effectRef idx="0">
+              <a:schemeClr val="accent1"/>
+            </a:effectRef>
+            <a:fontRef idx="minor">
+              <a:schemeClr val="lt1"/>
+            </a:fontRef>
+          </p:style>
+          <p:txBody>
+            <a:bodyPr rtlCol="0" anchor="ctr"/>
+            <a:lstStyle/>
+            <a:p>
+              <a:pPr algn="ctr"/>
+              <a:endParaRPr lang="en-GB"/>
+            </a:p>
+          </p:txBody>
+        </p:sp>
+      </p:grpSp>
+      <p:sp>
+        <p:nvSpPr>
+          <p:cNvPr id="10" name="Rectangle: Rounded Corners 9">
+            <a:extLst>
+              <a:ext uri="{FF2B5EF4-FFF2-40B4-BE49-F238E27FC236}">
+                <a16:creationId xmlns:a16="http://schemas.microsoft.com/office/drawing/2014/main" id="{EAFB4463-E613-429E-834A-604D6F167A34}"/>
+              </a:ext>
+            </a:extLst>
+          </p:cNvPr>
+          <p:cNvSpPr/>
+          <p:nvPr/>
+        </p:nvSpPr>
+        <p:spPr>
+          <a:xfrm>
+            <a:off x="6348247" y="2532993"/>
+            <a:ext cx="1447843" cy="3552497"/>
+          </a:xfrm>
+          <a:prstGeom prst="roundRect">
+            <a:avLst/>
+          </a:prstGeom>
+          <a:solidFill>
+            <a:schemeClr val="tx1">
+              <a:lumMod val="85000"/>
+            </a:schemeClr>
+          </a:solidFill>
+          <a:ln>
+            <a:solidFill>
+              <a:schemeClr val="tx1">
+                <a:lumMod val="50000"/>
+              </a:schemeClr>
+            </a:solidFill>
+          </a:ln>
+        </p:spPr>
+        <p:style>
+          <a:lnRef idx="2">
+            <a:schemeClr val="accent1">
+              <a:shade val="50000"/>
+            </a:schemeClr>
+          </a:lnRef>
+          <a:fillRef idx="1">
+            <a:schemeClr val="accent1"/>
+          </a:fillRef>
+          <a:effectRef idx="0">
+            <a:schemeClr val="accent1"/>
+          </a:effectRef>
+          <a:fontRef idx="minor">
+            <a:schemeClr val="lt1"/>
+          </a:fontRef>
+        </p:style>
+        <p:txBody>
+          <a:bodyPr rtlCol="0" anchor="ctr"/>
+          <a:lstStyle/>
+          <a:p>
+            <a:pPr algn="ctr"/>
+            <a:endParaRPr lang="en-GB"/>
+          </a:p>
+        </p:txBody>
+      </p:sp>
+      <p:grpSp>
+        <p:nvGrpSpPr>
+          <p:cNvPr id="26" name="Group 25">
+            <a:extLst>
+              <a:ext uri="{FF2B5EF4-FFF2-40B4-BE49-F238E27FC236}">
+                <a16:creationId xmlns:a16="http://schemas.microsoft.com/office/drawing/2014/main" id="{788393F3-5DF2-43DE-B53E-831D6F2A358C}"/>
+              </a:ext>
+            </a:extLst>
+          </p:cNvPr>
+          <p:cNvGrpSpPr/>
+          <p:nvPr/>
+        </p:nvGrpSpPr>
+        <p:grpSpPr>
+          <a:xfrm>
+            <a:off x="6500647" y="2532992"/>
+            <a:ext cx="4913587" cy="3552497"/>
+            <a:chOff x="6500647" y="2532992"/>
+            <a:chExt cx="4913587" cy="3552497"/>
+          </a:xfrm>
+        </p:grpSpPr>
+        <p:sp>
+          <p:nvSpPr>
+            <p:cNvPr id="11" name="Rectangle: Rounded Corners 10">
+              <a:extLst>
+                <a:ext uri="{FF2B5EF4-FFF2-40B4-BE49-F238E27FC236}">
+                  <a16:creationId xmlns:a16="http://schemas.microsoft.com/office/drawing/2014/main" id="{0C8ADD41-3DAA-4C2A-927B-0A7B30EF2D9A}"/>
+                </a:ext>
+              </a:extLst>
+            </p:cNvPr>
+            <p:cNvSpPr/>
+            <p:nvPr/>
+          </p:nvSpPr>
+          <p:spPr>
+            <a:xfrm>
+              <a:off x="6500647" y="2685394"/>
+              <a:ext cx="1171905" cy="3210910"/>
+            </a:xfrm>
+            <a:prstGeom prst="roundRect">
+              <a:avLst>
+                <a:gd name="adj" fmla="val 8595"/>
+              </a:avLst>
+            </a:prstGeom>
+            <a:solidFill>
+              <a:schemeClr val="accent6">
+                <a:lumMod val="60000"/>
+                <a:lumOff val="40000"/>
+              </a:schemeClr>
+            </a:solidFill>
+            <a:ln>
+              <a:noFill/>
+            </a:ln>
+          </p:spPr>
+          <p:style>
+            <a:lnRef idx="2">
+              <a:schemeClr val="accent1">
+                <a:shade val="50000"/>
+              </a:schemeClr>
+            </a:lnRef>
+            <a:fillRef idx="1">
+              <a:schemeClr val="accent1"/>
+            </a:fillRef>
+            <a:effectRef idx="0">
+              <a:schemeClr val="accent1"/>
+            </a:effectRef>
+            <a:fontRef idx="minor">
+              <a:schemeClr val="lt1"/>
+            </a:fontRef>
+          </p:style>
+          <p:txBody>
+            <a:bodyPr rtlCol="0" anchor="ctr"/>
+            <a:lstStyle/>
+            <a:p>
+              <a:pPr algn="ctr"/>
+              <a:endParaRPr lang="en-GB"/>
+            </a:p>
+          </p:txBody>
+        </p:sp>
+        <p:sp>
+          <p:nvSpPr>
+            <p:cNvPr id="12" name="Rectangle: Rounded Corners 11">
+              <a:extLst>
+                <a:ext uri="{FF2B5EF4-FFF2-40B4-BE49-F238E27FC236}">
+                  <a16:creationId xmlns:a16="http://schemas.microsoft.com/office/drawing/2014/main" id="{5875F767-B307-46A9-ACBB-6F97B393D0C1}"/>
+                </a:ext>
+              </a:extLst>
+            </p:cNvPr>
+            <p:cNvSpPr/>
+            <p:nvPr/>
+          </p:nvSpPr>
+          <p:spPr>
+            <a:xfrm>
+              <a:off x="7961583" y="2532992"/>
+              <a:ext cx="3452651" cy="3552497"/>
+            </a:xfrm>
+            <a:prstGeom prst="roundRect">
+              <a:avLst>
+                <a:gd name="adj" fmla="val 8595"/>
+              </a:avLst>
+            </a:prstGeom>
+            <a:solidFill>
+              <a:schemeClr val="accent4">
+                <a:lumMod val="60000"/>
+                <a:lumOff val="40000"/>
+              </a:schemeClr>
+            </a:solidFill>
+            <a:ln>
+              <a:noFill/>
+            </a:ln>
+          </p:spPr>
+          <p:style>
+            <a:lnRef idx="2">
+              <a:schemeClr val="accent1">
+                <a:shade val="50000"/>
+              </a:schemeClr>
+            </a:lnRef>
+            <a:fillRef idx="1">
+              <a:schemeClr val="accent1"/>
+            </a:fillRef>
+            <a:effectRef idx="0">
+              <a:schemeClr val="accent1"/>
+            </a:effectRef>
+            <a:fontRef idx="minor">
+              <a:schemeClr val="lt1"/>
+            </a:fontRef>
+          </p:style>
+          <p:txBody>
+            <a:bodyPr rtlCol="0" anchor="ctr"/>
+            <a:lstStyle/>
+            <a:p>
+              <a:pPr algn="ctr"/>
+              <a:endParaRPr lang="en-GB"/>
+            </a:p>
+          </p:txBody>
+        </p:sp>
+      </p:grpSp>
+      <p:sp>
+        <p:nvSpPr>
+          <p:cNvPr id="21" name="Rectangle 20">
+            <a:extLst>
+              <a:ext uri="{FF2B5EF4-FFF2-40B4-BE49-F238E27FC236}">
+                <a16:creationId xmlns:a16="http://schemas.microsoft.com/office/drawing/2014/main" id="{16FE22ED-761B-4BCD-89D0-E3FBEC9A9A04}"/>
+              </a:ext>
+            </a:extLst>
+          </p:cNvPr>
+          <p:cNvSpPr/>
+          <p:nvPr/>
+        </p:nvSpPr>
+        <p:spPr>
+          <a:xfrm>
+            <a:off x="1145354" y="1853248"/>
+            <a:ext cx="4172881" cy="4552034"/>
+          </a:xfrm>
+          <a:prstGeom prst="rect">
+            <a:avLst/>
+          </a:prstGeom>
+          <a:noFill/>
+          <a:ln>
+            <a:noFill/>
+          </a:ln>
+        </p:spPr>
+        <p:style>
+          <a:lnRef idx="2">
+            <a:schemeClr val="accent1">
+              <a:shade val="50000"/>
+            </a:schemeClr>
+          </a:lnRef>
+          <a:fillRef idx="1">
+            <a:schemeClr val="accent1"/>
+          </a:fillRef>
+          <a:effectRef idx="0">
+            <a:schemeClr val="accent1"/>
+          </a:effectRef>
+          <a:fontRef idx="minor">
+            <a:schemeClr val="lt1"/>
+          </a:fontRef>
+        </p:style>
+        <p:txBody>
+          <a:bodyPr rtlCol="0" anchor="t"/>
+          <a:lstStyle/>
+          <a:p>
+            <a:r>
+              <a:rPr lang="en-GB" sz="1600" dirty="0" err="1">
+                <a:solidFill>
+                  <a:schemeClr val="bg1"/>
+                </a:solidFill>
+                <a:latin typeface="Consolas" panose="020B0609020204030204" pitchFamily="49" charset="0"/>
+              </a:rPr>
+              <a:t>fluidPage</a:t>
+            </a:r>
+            <a:r>
+              <a:rPr lang="en-GB" sz="1600" dirty="0">
+                <a:solidFill>
+                  <a:schemeClr val="bg1"/>
+                </a:solidFill>
+                <a:latin typeface="Consolas" panose="020B0609020204030204" pitchFamily="49" charset="0"/>
+              </a:rPr>
+              <a:t>(</a:t>
+            </a:r>
+          </a:p>
+          <a:p>
+            <a:endParaRPr lang="en-GB" sz="1600" dirty="0">
+              <a:solidFill>
+                <a:schemeClr val="bg1"/>
+              </a:solidFill>
+              <a:latin typeface="Consolas" panose="020B0609020204030204" pitchFamily="49" charset="0"/>
+            </a:endParaRPr>
+          </a:p>
+          <a:p>
+            <a:r>
+              <a:rPr lang="en-GB" sz="1600" dirty="0">
+                <a:solidFill>
+                  <a:schemeClr val="bg1"/>
+                </a:solidFill>
+                <a:latin typeface="Consolas" panose="020B0609020204030204" pitchFamily="49" charset="0"/>
+              </a:rPr>
+              <a:t>    </a:t>
+            </a:r>
+            <a:r>
+              <a:rPr lang="en-GB" sz="1600" dirty="0" err="1">
+                <a:solidFill>
+                  <a:schemeClr val="bg1"/>
+                </a:solidFill>
+                <a:latin typeface="Consolas" panose="020B0609020204030204" pitchFamily="49" charset="0"/>
+              </a:rPr>
+              <a:t>titlePanel</a:t>
+            </a:r>
+            <a:r>
+              <a:rPr lang="en-GB" sz="1600" dirty="0">
+                <a:solidFill>
+                  <a:schemeClr val="bg1"/>
+                </a:solidFill>
+                <a:latin typeface="Consolas" panose="020B0609020204030204" pitchFamily="49" charset="0"/>
+              </a:rPr>
+              <a:t>(...),</a:t>
+            </a:r>
+          </a:p>
+          <a:p>
+            <a:endParaRPr lang="en-GB" sz="1600" dirty="0">
+              <a:solidFill>
+                <a:schemeClr val="bg1"/>
+              </a:solidFill>
+              <a:latin typeface="Consolas" panose="020B0609020204030204" pitchFamily="49" charset="0"/>
+            </a:endParaRPr>
+          </a:p>
+          <a:p>
+            <a:r>
+              <a:rPr lang="en-GB" sz="1600" dirty="0">
+                <a:solidFill>
+                  <a:schemeClr val="bg1"/>
+                </a:solidFill>
+                <a:latin typeface="Consolas" panose="020B0609020204030204" pitchFamily="49" charset="0"/>
+              </a:rPr>
+              <a:t>    </a:t>
+            </a:r>
+            <a:r>
+              <a:rPr lang="en-GB" sz="1600" dirty="0" err="1">
+                <a:solidFill>
+                  <a:schemeClr val="bg1"/>
+                </a:solidFill>
+                <a:latin typeface="Consolas" panose="020B0609020204030204" pitchFamily="49" charset="0"/>
+              </a:rPr>
+              <a:t>sidebarLayout</a:t>
+            </a:r>
+            <a:r>
+              <a:rPr lang="en-GB" sz="1600" dirty="0">
+                <a:solidFill>
+                  <a:schemeClr val="bg1"/>
+                </a:solidFill>
+                <a:latin typeface="Consolas" panose="020B0609020204030204" pitchFamily="49" charset="0"/>
+              </a:rPr>
+              <a:t>(</a:t>
+            </a:r>
+          </a:p>
+          <a:p>
+            <a:r>
+              <a:rPr lang="en-GB" sz="1600" dirty="0">
+                <a:solidFill>
+                  <a:schemeClr val="bg1"/>
+                </a:solidFill>
+                <a:latin typeface="Consolas" panose="020B0609020204030204" pitchFamily="49" charset="0"/>
+              </a:rPr>
+              <a:t>        </a:t>
+            </a:r>
+          </a:p>
+          <a:p>
+            <a:r>
+              <a:rPr lang="en-GB" sz="1600" dirty="0">
+                <a:solidFill>
+                  <a:schemeClr val="bg1"/>
+                </a:solidFill>
+                <a:latin typeface="Consolas" panose="020B0609020204030204" pitchFamily="49" charset="0"/>
+              </a:rPr>
+              <a:t>        </a:t>
+            </a:r>
+            <a:r>
+              <a:rPr lang="en-GB" sz="1600" dirty="0" err="1">
+                <a:solidFill>
+                  <a:schemeClr val="bg1"/>
+                </a:solidFill>
+                <a:latin typeface="Consolas" panose="020B0609020204030204" pitchFamily="49" charset="0"/>
+              </a:rPr>
+              <a:t>sidebarPanel</a:t>
+            </a:r>
+            <a:r>
+              <a:rPr lang="en-GB" sz="1600" dirty="0">
+                <a:solidFill>
+                  <a:schemeClr val="bg1"/>
+                </a:solidFill>
+                <a:latin typeface="Consolas" panose="020B0609020204030204" pitchFamily="49" charset="0"/>
+              </a:rPr>
+              <a:t>(</a:t>
+            </a:r>
+          </a:p>
+          <a:p>
+            <a:r>
+              <a:rPr lang="en-GB" sz="1600" dirty="0">
+                <a:solidFill>
+                  <a:schemeClr val="bg1"/>
+                </a:solidFill>
+                <a:latin typeface="Consolas" panose="020B0609020204030204" pitchFamily="49" charset="0"/>
+              </a:rPr>
+              <a:t>            ...</a:t>
+            </a:r>
+          </a:p>
+          <a:p>
+            <a:r>
+              <a:rPr lang="en-GB" sz="1600" dirty="0">
+                <a:solidFill>
+                  <a:schemeClr val="bg1"/>
+                </a:solidFill>
+                <a:latin typeface="Consolas" panose="020B0609020204030204" pitchFamily="49" charset="0"/>
+              </a:rPr>
+              <a:t>        ),</a:t>
+            </a:r>
+          </a:p>
+          <a:p>
+            <a:endParaRPr lang="en-GB" sz="1600" dirty="0">
+              <a:solidFill>
+                <a:schemeClr val="bg1"/>
+              </a:solidFill>
+              <a:latin typeface="Consolas" panose="020B0609020204030204" pitchFamily="49" charset="0"/>
+            </a:endParaRPr>
+          </a:p>
+          <a:p>
+            <a:r>
+              <a:rPr lang="en-GB" sz="1600" dirty="0">
+                <a:solidFill>
+                  <a:schemeClr val="bg1"/>
+                </a:solidFill>
+                <a:latin typeface="Consolas" panose="020B0609020204030204" pitchFamily="49" charset="0"/>
+              </a:rPr>
+              <a:t>        </a:t>
+            </a:r>
+            <a:r>
+              <a:rPr lang="en-GB" sz="1600" dirty="0" err="1">
+                <a:solidFill>
+                  <a:schemeClr val="bg1"/>
+                </a:solidFill>
+                <a:latin typeface="Consolas" panose="020B0609020204030204" pitchFamily="49" charset="0"/>
+              </a:rPr>
+              <a:t>mainPanel</a:t>
+            </a:r>
+            <a:r>
+              <a:rPr lang="en-GB" sz="1600" dirty="0">
+                <a:solidFill>
+                  <a:schemeClr val="bg1"/>
+                </a:solidFill>
+                <a:latin typeface="Consolas" panose="020B0609020204030204" pitchFamily="49" charset="0"/>
+              </a:rPr>
+              <a:t>(</a:t>
+            </a:r>
+          </a:p>
+          <a:p>
+            <a:r>
+              <a:rPr lang="en-GB" sz="1600" dirty="0">
+                <a:solidFill>
+                  <a:schemeClr val="bg1"/>
+                </a:solidFill>
+                <a:latin typeface="Consolas" panose="020B0609020204030204" pitchFamily="49" charset="0"/>
+              </a:rPr>
+              <a:t>            ...</a:t>
+            </a:r>
+          </a:p>
+          <a:p>
+            <a:r>
+              <a:rPr lang="en-GB" sz="1600" dirty="0">
+                <a:solidFill>
+                  <a:schemeClr val="bg1"/>
+                </a:solidFill>
+                <a:latin typeface="Consolas" panose="020B0609020204030204" pitchFamily="49" charset="0"/>
+              </a:rPr>
+              <a:t>            ...</a:t>
+            </a:r>
+          </a:p>
+          <a:p>
+            <a:r>
+              <a:rPr lang="en-GB" sz="1600" dirty="0">
+                <a:solidFill>
+                  <a:schemeClr val="bg1"/>
+                </a:solidFill>
+                <a:latin typeface="Consolas" panose="020B0609020204030204" pitchFamily="49" charset="0"/>
+              </a:rPr>
+              <a:t>            ...</a:t>
+            </a:r>
+          </a:p>
+          <a:p>
+            <a:r>
+              <a:rPr lang="en-GB" sz="1600" dirty="0">
+                <a:solidFill>
+                  <a:schemeClr val="bg1"/>
+                </a:solidFill>
+                <a:latin typeface="Consolas" panose="020B0609020204030204" pitchFamily="49" charset="0"/>
+              </a:rPr>
+              <a:t>            ...</a:t>
+            </a:r>
+          </a:p>
+          <a:p>
+            <a:r>
+              <a:rPr lang="en-GB" sz="1600" dirty="0">
+                <a:solidFill>
+                  <a:schemeClr val="bg1"/>
+                </a:solidFill>
+                <a:latin typeface="Consolas" panose="020B0609020204030204" pitchFamily="49" charset="0"/>
+              </a:rPr>
+              <a:t>        )</a:t>
+            </a:r>
+          </a:p>
+          <a:p>
+            <a:r>
+              <a:rPr lang="en-GB" sz="1600" dirty="0">
+                <a:solidFill>
+                  <a:schemeClr val="bg1"/>
+                </a:solidFill>
+                <a:latin typeface="Consolas" panose="020B0609020204030204" pitchFamily="49" charset="0"/>
+              </a:rPr>
+              <a:t>    )</a:t>
+            </a:r>
+          </a:p>
+          <a:p>
+            <a:r>
+              <a:rPr lang="en-GB" sz="1600" dirty="0">
+                <a:solidFill>
+                  <a:schemeClr val="bg1"/>
+                </a:solidFill>
+                <a:latin typeface="Consolas" panose="020B0609020204030204" pitchFamily="49" charset="0"/>
+              </a:rPr>
+              <a:t>)</a:t>
+            </a:r>
+          </a:p>
+        </p:txBody>
+      </p:sp>
+      <p:grpSp>
+        <p:nvGrpSpPr>
+          <p:cNvPr id="22" name="Group 21">
+            <a:extLst>
+              <a:ext uri="{FF2B5EF4-FFF2-40B4-BE49-F238E27FC236}">
+                <a16:creationId xmlns:a16="http://schemas.microsoft.com/office/drawing/2014/main" id="{5CA646F4-089B-4F5D-9240-892A0B0A3612}"/>
+              </a:ext>
+            </a:extLst>
+          </p:cNvPr>
+          <p:cNvGrpSpPr/>
+          <p:nvPr/>
+        </p:nvGrpSpPr>
+        <p:grpSpPr>
+          <a:xfrm>
+            <a:off x="1061270" y="1826199"/>
+            <a:ext cx="4396339" cy="4579083"/>
+            <a:chOff x="1061270" y="1826199"/>
+            <a:chExt cx="4396339" cy="4579083"/>
+          </a:xfrm>
+        </p:grpSpPr>
+        <p:sp>
+          <p:nvSpPr>
+            <p:cNvPr id="17" name="Rectangle: Rounded Corners 16">
+              <a:extLst>
+                <a:ext uri="{FF2B5EF4-FFF2-40B4-BE49-F238E27FC236}">
+                  <a16:creationId xmlns:a16="http://schemas.microsoft.com/office/drawing/2014/main" id="{0494615E-99B7-4D84-B647-7C94E70BF177}"/>
+                </a:ext>
+              </a:extLst>
+            </p:cNvPr>
+            <p:cNvSpPr/>
+            <p:nvPr/>
+          </p:nvSpPr>
+          <p:spPr>
+            <a:xfrm>
+              <a:off x="1061270" y="1826199"/>
+              <a:ext cx="4396339" cy="4579083"/>
+            </a:xfrm>
+            <a:prstGeom prst="roundRect">
+              <a:avLst>
+                <a:gd name="adj" fmla="val 4234"/>
+              </a:avLst>
+            </a:prstGeom>
+            <a:solidFill>
+              <a:schemeClr val="bg2">
+                <a:lumMod val="20000"/>
+                <a:lumOff val="80000"/>
+              </a:schemeClr>
+            </a:solidFill>
+            <a:ln>
+              <a:noFill/>
+            </a:ln>
+          </p:spPr>
+          <p:style>
+            <a:lnRef idx="2">
+              <a:schemeClr val="accent1">
+                <a:shade val="50000"/>
+              </a:schemeClr>
+            </a:lnRef>
+            <a:fillRef idx="1">
+              <a:schemeClr val="accent1"/>
+            </a:fillRef>
+            <a:effectRef idx="0">
+              <a:schemeClr val="accent1"/>
+            </a:effectRef>
+            <a:fontRef idx="minor">
+              <a:schemeClr val="lt1"/>
+            </a:fontRef>
+          </p:style>
+          <p:txBody>
+            <a:bodyPr rtlCol="0" anchor="t"/>
+            <a:lstStyle/>
+            <a:p>
+              <a:endParaRPr lang="en-GB" sz="1600" dirty="0">
+                <a:solidFill>
+                  <a:schemeClr val="bg1">
+                    <a:lumMod val="95000"/>
+                    <a:lumOff val="5000"/>
+                  </a:schemeClr>
+                </a:solidFill>
+                <a:latin typeface="Consolas" panose="020B0609020204030204" pitchFamily="49" charset="0"/>
+              </a:endParaRPr>
+            </a:p>
+          </p:txBody>
+        </p:sp>
+        <p:sp>
+          <p:nvSpPr>
+            <p:cNvPr id="16" name="Rectangle: Rounded Corners 15">
+              <a:extLst>
+                <a:ext uri="{FF2B5EF4-FFF2-40B4-BE49-F238E27FC236}">
+                  <a16:creationId xmlns:a16="http://schemas.microsoft.com/office/drawing/2014/main" id="{C44E4B26-B732-4CB1-AC53-0CDEA9E3E0FB}"/>
+                </a:ext>
+              </a:extLst>
+            </p:cNvPr>
+            <p:cNvSpPr/>
+            <p:nvPr/>
+          </p:nvSpPr>
+          <p:spPr>
+            <a:xfrm>
+              <a:off x="1548850" y="2322787"/>
+              <a:ext cx="3727343" cy="388884"/>
+            </a:xfrm>
+            <a:prstGeom prst="roundRect">
+              <a:avLst>
+                <a:gd name="adj" fmla="val 21076"/>
+              </a:avLst>
+            </a:prstGeom>
+            <a:solidFill>
+              <a:schemeClr val="accent3">
+                <a:lumMod val="20000"/>
+                <a:lumOff val="80000"/>
+              </a:schemeClr>
+            </a:solidFill>
+            <a:ln>
+              <a:noFill/>
+            </a:ln>
+          </p:spPr>
+          <p:style>
+            <a:lnRef idx="2">
+              <a:schemeClr val="accent1">
+                <a:shade val="50000"/>
+              </a:schemeClr>
+            </a:lnRef>
+            <a:fillRef idx="1">
+              <a:schemeClr val="accent1"/>
+            </a:fillRef>
+            <a:effectRef idx="0">
+              <a:schemeClr val="accent1"/>
+            </a:effectRef>
+            <a:fontRef idx="minor">
+              <a:schemeClr val="lt1"/>
+            </a:fontRef>
+          </p:style>
+          <p:txBody>
+            <a:bodyPr rtlCol="0" anchor="t"/>
+            <a:lstStyle/>
+            <a:p>
+              <a:endParaRPr lang="en-GB" sz="1600" dirty="0">
+                <a:solidFill>
+                  <a:schemeClr val="bg1">
+                    <a:lumMod val="95000"/>
+                    <a:lumOff val="5000"/>
+                  </a:schemeClr>
+                </a:solidFill>
+                <a:latin typeface="Consolas" panose="020B0609020204030204" pitchFamily="49" charset="0"/>
+              </a:endParaRPr>
+            </a:p>
+          </p:txBody>
+        </p:sp>
+        <p:sp>
+          <p:nvSpPr>
+            <p:cNvPr id="15" name="Rectangle: Rounded Corners 14">
+              <a:extLst>
+                <a:ext uri="{FF2B5EF4-FFF2-40B4-BE49-F238E27FC236}">
+                  <a16:creationId xmlns:a16="http://schemas.microsoft.com/office/drawing/2014/main" id="{2D92F3E0-009F-42C2-98E5-B88ADF912C0E}"/>
+                </a:ext>
+              </a:extLst>
+            </p:cNvPr>
+            <p:cNvSpPr/>
+            <p:nvPr/>
+          </p:nvSpPr>
+          <p:spPr>
+            <a:xfrm>
+              <a:off x="1548850" y="2816772"/>
+              <a:ext cx="3727343" cy="3268717"/>
+            </a:xfrm>
+            <a:prstGeom prst="roundRect">
+              <a:avLst>
+                <a:gd name="adj" fmla="val 2931"/>
+              </a:avLst>
+            </a:prstGeom>
+            <a:solidFill>
+              <a:schemeClr val="accent1">
+                <a:lumMod val="20000"/>
+                <a:lumOff val="80000"/>
+              </a:schemeClr>
+            </a:solidFill>
+            <a:ln>
+              <a:noFill/>
+            </a:ln>
+          </p:spPr>
+          <p:style>
+            <a:lnRef idx="2">
+              <a:schemeClr val="accent1">
+                <a:shade val="50000"/>
+              </a:schemeClr>
+            </a:lnRef>
+            <a:fillRef idx="1">
+              <a:schemeClr val="accent1"/>
+            </a:fillRef>
+            <a:effectRef idx="0">
+              <a:schemeClr val="accent1"/>
+            </a:effectRef>
+            <a:fontRef idx="minor">
+              <a:schemeClr val="lt1"/>
+            </a:fontRef>
+          </p:style>
+          <p:txBody>
+            <a:bodyPr rtlCol="0" anchor="ctr"/>
+            <a:lstStyle/>
+            <a:p>
+              <a:pPr algn="ctr"/>
+              <a:endParaRPr lang="en-GB"/>
+            </a:p>
+          </p:txBody>
+        </p:sp>
+        <p:sp>
+          <p:nvSpPr>
+            <p:cNvPr id="14" name="Rectangle: Rounded Corners 13">
+              <a:extLst>
+                <a:ext uri="{FF2B5EF4-FFF2-40B4-BE49-F238E27FC236}">
+                  <a16:creationId xmlns:a16="http://schemas.microsoft.com/office/drawing/2014/main" id="{A8244744-2A77-42A3-97F2-62CA534337A9}"/>
+                </a:ext>
+              </a:extLst>
+            </p:cNvPr>
+            <p:cNvSpPr/>
+            <p:nvPr/>
+          </p:nvSpPr>
+          <p:spPr>
+            <a:xfrm>
+              <a:off x="1978524" y="3326524"/>
+              <a:ext cx="3192565" cy="814552"/>
+            </a:xfrm>
+            <a:prstGeom prst="roundRect">
+              <a:avLst>
+                <a:gd name="adj" fmla="val 8595"/>
+              </a:avLst>
+            </a:prstGeom>
+            <a:solidFill>
+              <a:schemeClr val="accent6">
+                <a:lumMod val="60000"/>
+                <a:lumOff val="40000"/>
+              </a:schemeClr>
+            </a:solidFill>
+            <a:ln>
+              <a:noFill/>
+            </a:ln>
+          </p:spPr>
+          <p:style>
+            <a:lnRef idx="2">
+              <a:schemeClr val="accent1">
+                <a:shade val="50000"/>
+              </a:schemeClr>
+            </a:lnRef>
+            <a:fillRef idx="1">
+              <a:schemeClr val="accent1"/>
+            </a:fillRef>
+            <a:effectRef idx="0">
+              <a:schemeClr val="accent1"/>
+            </a:effectRef>
+            <a:fontRef idx="minor">
+              <a:schemeClr val="lt1"/>
+            </a:fontRef>
+          </p:style>
+          <p:txBody>
+            <a:bodyPr rtlCol="0" anchor="ctr"/>
+            <a:lstStyle/>
+            <a:p>
+              <a:pPr algn="ctr"/>
+              <a:endParaRPr lang="en-GB"/>
+            </a:p>
+          </p:txBody>
+        </p:sp>
+        <p:sp>
+          <p:nvSpPr>
+            <p:cNvPr id="13" name="Rectangle: Rounded Corners 12">
+              <a:extLst>
+                <a:ext uri="{FF2B5EF4-FFF2-40B4-BE49-F238E27FC236}">
+                  <a16:creationId xmlns:a16="http://schemas.microsoft.com/office/drawing/2014/main" id="{4B5CB373-0530-4472-B37F-3F92993F8BAE}"/>
+                </a:ext>
+              </a:extLst>
+            </p:cNvPr>
+            <p:cNvSpPr/>
+            <p:nvPr/>
+          </p:nvSpPr>
+          <p:spPr>
+            <a:xfrm>
+              <a:off x="1975944" y="4246178"/>
+              <a:ext cx="3195145" cy="1629105"/>
+            </a:xfrm>
+            <a:prstGeom prst="roundRect">
+              <a:avLst>
+                <a:gd name="adj" fmla="val 8595"/>
+              </a:avLst>
+            </a:prstGeom>
+            <a:solidFill>
+              <a:schemeClr val="accent4">
+                <a:lumMod val="60000"/>
+                <a:lumOff val="40000"/>
+              </a:schemeClr>
+            </a:solidFill>
+            <a:ln>
+              <a:noFill/>
+            </a:ln>
+          </p:spPr>
+          <p:style>
+            <a:lnRef idx="2">
+              <a:schemeClr val="accent1">
+                <a:shade val="50000"/>
+              </a:schemeClr>
+            </a:lnRef>
+            <a:fillRef idx="1">
+              <a:schemeClr val="accent1"/>
+            </a:fillRef>
+            <a:effectRef idx="0">
+              <a:schemeClr val="accent1"/>
+            </a:effectRef>
+            <a:fontRef idx="minor">
+              <a:schemeClr val="lt1"/>
+            </a:fontRef>
+          </p:style>
+          <p:txBody>
+            <a:bodyPr rtlCol="0" anchor="ctr"/>
+            <a:lstStyle/>
+            <a:p>
+              <a:pPr algn="ctr"/>
+              <a:endParaRPr lang="en-GB"/>
+            </a:p>
+          </p:txBody>
+        </p:sp>
+        <p:sp>
+          <p:nvSpPr>
+            <p:cNvPr id="5" name="Rectangle 4">
+              <a:extLst>
+                <a:ext uri="{FF2B5EF4-FFF2-40B4-BE49-F238E27FC236}">
+                  <a16:creationId xmlns:a16="http://schemas.microsoft.com/office/drawing/2014/main" id="{E0ABDC7F-4E83-4525-8E65-D3F1831BF91E}"/>
+                </a:ext>
+              </a:extLst>
+            </p:cNvPr>
+            <p:cNvSpPr/>
+            <p:nvPr/>
+          </p:nvSpPr>
+          <p:spPr>
+            <a:xfrm>
+              <a:off x="1145354" y="1853248"/>
+              <a:ext cx="4172881" cy="4552034"/>
+            </a:xfrm>
+            <a:prstGeom prst="rect">
+              <a:avLst/>
+            </a:prstGeom>
+            <a:noFill/>
+            <a:ln>
+              <a:noFill/>
+            </a:ln>
+          </p:spPr>
+          <p:style>
+            <a:lnRef idx="2">
+              <a:schemeClr val="accent1">
+                <a:shade val="50000"/>
+              </a:schemeClr>
+            </a:lnRef>
+            <a:fillRef idx="1">
+              <a:schemeClr val="accent1"/>
+            </a:fillRef>
+            <a:effectRef idx="0">
+              <a:schemeClr val="accent1"/>
+            </a:effectRef>
+            <a:fontRef idx="minor">
+              <a:schemeClr val="lt1"/>
+            </a:fontRef>
+          </p:style>
+          <p:txBody>
+            <a:bodyPr rtlCol="0" anchor="t"/>
+            <a:lstStyle/>
+            <a:p>
+              <a:r>
+                <a:rPr lang="en-GB" sz="1600" dirty="0" err="1">
+                  <a:solidFill>
+                    <a:schemeClr val="bg2">
+                      <a:lumMod val="75000"/>
+                    </a:schemeClr>
+                  </a:solidFill>
+                  <a:latin typeface="Consolas" panose="020B0609020204030204" pitchFamily="49" charset="0"/>
+                </a:rPr>
+                <a:t>fluidPage</a:t>
+              </a:r>
+              <a:r>
+                <a:rPr lang="en-GB" sz="1600" dirty="0">
+                  <a:solidFill>
+                    <a:schemeClr val="bg2">
+                      <a:lumMod val="75000"/>
+                    </a:schemeClr>
+                  </a:solidFill>
+                  <a:latin typeface="Consolas" panose="020B0609020204030204" pitchFamily="49" charset="0"/>
+                </a:rPr>
+                <a:t>(</a:t>
+              </a:r>
+            </a:p>
+            <a:p>
+              <a:endParaRPr lang="en-GB" sz="1600" dirty="0">
+                <a:solidFill>
+                  <a:schemeClr val="bg1">
+                    <a:lumMod val="95000"/>
+                    <a:lumOff val="5000"/>
+                  </a:schemeClr>
+                </a:solidFill>
+                <a:latin typeface="Consolas" panose="020B0609020204030204" pitchFamily="49" charset="0"/>
+              </a:endParaRPr>
+            </a:p>
+            <a:p>
+              <a:r>
+                <a:rPr lang="en-GB" sz="1600" dirty="0">
+                  <a:solidFill>
+                    <a:schemeClr val="bg1">
+                      <a:lumMod val="95000"/>
+                      <a:lumOff val="5000"/>
+                    </a:schemeClr>
+                  </a:solidFill>
+                  <a:latin typeface="Consolas" panose="020B0609020204030204" pitchFamily="49" charset="0"/>
+                </a:rPr>
+                <a:t>    </a:t>
+              </a:r>
+              <a:r>
+                <a:rPr lang="en-GB" sz="1600" dirty="0" err="1">
+                  <a:solidFill>
+                    <a:schemeClr val="accent3">
+                      <a:lumMod val="75000"/>
+                    </a:schemeClr>
+                  </a:solidFill>
+                  <a:latin typeface="Consolas" panose="020B0609020204030204" pitchFamily="49" charset="0"/>
+                </a:rPr>
+                <a:t>titlePanel</a:t>
+              </a:r>
+              <a:r>
+                <a:rPr lang="en-GB" sz="1600" dirty="0">
+                  <a:solidFill>
+                    <a:schemeClr val="accent3">
+                      <a:lumMod val="75000"/>
+                    </a:schemeClr>
+                  </a:solidFill>
+                  <a:latin typeface="Consolas" panose="020B0609020204030204" pitchFamily="49" charset="0"/>
+                </a:rPr>
+                <a:t>(...),</a:t>
+              </a:r>
+            </a:p>
+            <a:p>
+              <a:endParaRPr lang="en-GB" sz="1600" dirty="0">
+                <a:solidFill>
+                  <a:schemeClr val="bg1">
+                    <a:lumMod val="95000"/>
+                    <a:lumOff val="5000"/>
+                  </a:schemeClr>
+                </a:solidFill>
+                <a:latin typeface="Consolas" panose="020B0609020204030204" pitchFamily="49" charset="0"/>
+              </a:endParaRPr>
+            </a:p>
+            <a:p>
+              <a:r>
+                <a:rPr lang="en-GB" sz="1600" dirty="0">
+                  <a:solidFill>
+                    <a:schemeClr val="accent1">
+                      <a:lumMod val="75000"/>
+                    </a:schemeClr>
+                  </a:solidFill>
+                  <a:latin typeface="Consolas" panose="020B0609020204030204" pitchFamily="49" charset="0"/>
+                </a:rPr>
+                <a:t>    </a:t>
+              </a:r>
+              <a:r>
+                <a:rPr lang="en-GB" sz="1600" dirty="0" err="1">
+                  <a:solidFill>
+                    <a:schemeClr val="accent1">
+                      <a:lumMod val="75000"/>
+                    </a:schemeClr>
+                  </a:solidFill>
+                  <a:latin typeface="Consolas" panose="020B0609020204030204" pitchFamily="49" charset="0"/>
+                </a:rPr>
+                <a:t>sidebarLayout</a:t>
+              </a:r>
+              <a:r>
+                <a:rPr lang="en-GB" sz="1600" dirty="0">
+                  <a:solidFill>
+                    <a:schemeClr val="accent1">
+                      <a:lumMod val="75000"/>
+                    </a:schemeClr>
+                  </a:solidFill>
+                  <a:latin typeface="Consolas" panose="020B0609020204030204" pitchFamily="49" charset="0"/>
+                </a:rPr>
+                <a:t>(</a:t>
+              </a:r>
+            </a:p>
+            <a:p>
+              <a:r>
+                <a:rPr lang="en-GB" sz="1600" dirty="0">
+                  <a:solidFill>
+                    <a:schemeClr val="bg1">
+                      <a:lumMod val="95000"/>
+                      <a:lumOff val="5000"/>
+                    </a:schemeClr>
+                  </a:solidFill>
+                  <a:latin typeface="Consolas" panose="020B0609020204030204" pitchFamily="49" charset="0"/>
+                </a:rPr>
+                <a:t>        </a:t>
+              </a:r>
+            </a:p>
+            <a:p>
+              <a:r>
+                <a:rPr lang="en-GB" sz="1600" dirty="0">
+                  <a:solidFill>
+                    <a:schemeClr val="accent6">
+                      <a:lumMod val="50000"/>
+                    </a:schemeClr>
+                  </a:solidFill>
+                  <a:latin typeface="Consolas" panose="020B0609020204030204" pitchFamily="49" charset="0"/>
+                </a:rPr>
+                <a:t>        </a:t>
+              </a:r>
+              <a:r>
+                <a:rPr lang="en-GB" sz="1600" dirty="0" err="1">
+                  <a:solidFill>
+                    <a:schemeClr val="accent6">
+                      <a:lumMod val="50000"/>
+                    </a:schemeClr>
+                  </a:solidFill>
+                  <a:latin typeface="Consolas" panose="020B0609020204030204" pitchFamily="49" charset="0"/>
+                </a:rPr>
+                <a:t>sidebarPanel</a:t>
+              </a:r>
+              <a:r>
+                <a:rPr lang="en-GB" sz="1600" dirty="0">
+                  <a:solidFill>
+                    <a:schemeClr val="accent6">
+                      <a:lumMod val="50000"/>
+                    </a:schemeClr>
+                  </a:solidFill>
+                  <a:latin typeface="Consolas" panose="020B0609020204030204" pitchFamily="49" charset="0"/>
+                </a:rPr>
+                <a:t>(</a:t>
+              </a:r>
+            </a:p>
+            <a:p>
+              <a:r>
+                <a:rPr lang="en-GB" sz="1600" dirty="0">
+                  <a:solidFill>
+                    <a:schemeClr val="accent6">
+                      <a:lumMod val="50000"/>
+                    </a:schemeClr>
+                  </a:solidFill>
+                  <a:latin typeface="Consolas" panose="020B0609020204030204" pitchFamily="49" charset="0"/>
+                </a:rPr>
+                <a:t>            ...</a:t>
+              </a:r>
+            </a:p>
+            <a:p>
+              <a:r>
+                <a:rPr lang="en-GB" sz="1600" dirty="0">
+                  <a:solidFill>
+                    <a:schemeClr val="accent6">
+                      <a:lumMod val="50000"/>
+                    </a:schemeClr>
+                  </a:solidFill>
+                  <a:latin typeface="Consolas" panose="020B0609020204030204" pitchFamily="49" charset="0"/>
+                </a:rPr>
+                <a:t>        ),</a:t>
+              </a:r>
+            </a:p>
+            <a:p>
+              <a:endParaRPr lang="en-GB" sz="1600" dirty="0">
+                <a:solidFill>
+                  <a:schemeClr val="bg1">
+                    <a:lumMod val="95000"/>
+                    <a:lumOff val="5000"/>
+                  </a:schemeClr>
+                </a:solidFill>
+                <a:latin typeface="Consolas" panose="020B0609020204030204" pitchFamily="49" charset="0"/>
+              </a:endParaRPr>
+            </a:p>
+            <a:p>
+              <a:r>
+                <a:rPr lang="en-GB" sz="1600" dirty="0">
+                  <a:solidFill>
+                    <a:schemeClr val="accent4">
+                      <a:lumMod val="75000"/>
+                    </a:schemeClr>
+                  </a:solidFill>
+                  <a:latin typeface="Consolas" panose="020B0609020204030204" pitchFamily="49" charset="0"/>
+                </a:rPr>
+                <a:t>        </a:t>
+              </a:r>
+              <a:r>
+                <a:rPr lang="en-GB" sz="1600" dirty="0" err="1">
+                  <a:solidFill>
+                    <a:schemeClr val="accent4">
+                      <a:lumMod val="75000"/>
+                    </a:schemeClr>
+                  </a:solidFill>
+                  <a:latin typeface="Consolas" panose="020B0609020204030204" pitchFamily="49" charset="0"/>
+                </a:rPr>
+                <a:t>mainPanel</a:t>
+              </a:r>
+              <a:r>
+                <a:rPr lang="en-GB" sz="1600" dirty="0">
+                  <a:solidFill>
+                    <a:schemeClr val="accent4">
+                      <a:lumMod val="75000"/>
+                    </a:schemeClr>
+                  </a:solidFill>
+                  <a:latin typeface="Consolas" panose="020B0609020204030204" pitchFamily="49" charset="0"/>
+                </a:rPr>
+                <a:t>(</a:t>
+              </a:r>
+            </a:p>
+            <a:p>
+              <a:r>
+                <a:rPr lang="en-GB" sz="1600" dirty="0">
+                  <a:solidFill>
+                    <a:schemeClr val="accent4">
+                      <a:lumMod val="75000"/>
+                    </a:schemeClr>
+                  </a:solidFill>
+                  <a:latin typeface="Consolas" panose="020B0609020204030204" pitchFamily="49" charset="0"/>
+                </a:rPr>
+                <a:t>            ...</a:t>
+              </a:r>
+            </a:p>
+            <a:p>
+              <a:r>
+                <a:rPr lang="en-GB" sz="1600" dirty="0">
+                  <a:solidFill>
+                    <a:schemeClr val="accent4">
+                      <a:lumMod val="75000"/>
+                    </a:schemeClr>
+                  </a:solidFill>
+                  <a:latin typeface="Consolas" panose="020B0609020204030204" pitchFamily="49" charset="0"/>
+                </a:rPr>
+                <a:t>            ...</a:t>
+              </a:r>
+            </a:p>
+            <a:p>
+              <a:r>
+                <a:rPr lang="en-GB" sz="1600" dirty="0">
+                  <a:solidFill>
+                    <a:schemeClr val="accent4">
+                      <a:lumMod val="75000"/>
+                    </a:schemeClr>
+                  </a:solidFill>
+                  <a:latin typeface="Consolas" panose="020B0609020204030204" pitchFamily="49" charset="0"/>
+                </a:rPr>
+                <a:t>            ...</a:t>
+              </a:r>
+            </a:p>
+            <a:p>
+              <a:r>
+                <a:rPr lang="en-GB" sz="1600" dirty="0">
+                  <a:solidFill>
+                    <a:schemeClr val="accent4">
+                      <a:lumMod val="75000"/>
+                    </a:schemeClr>
+                  </a:solidFill>
+                  <a:latin typeface="Consolas" panose="020B0609020204030204" pitchFamily="49" charset="0"/>
+                </a:rPr>
+                <a:t>            ...</a:t>
+              </a:r>
+            </a:p>
+            <a:p>
+              <a:r>
+                <a:rPr lang="en-GB" sz="1600" dirty="0">
+                  <a:solidFill>
+                    <a:schemeClr val="accent4">
+                      <a:lumMod val="75000"/>
+                    </a:schemeClr>
+                  </a:solidFill>
+                  <a:latin typeface="Consolas" panose="020B0609020204030204" pitchFamily="49" charset="0"/>
+                </a:rPr>
+                <a:t>        )</a:t>
+              </a:r>
+            </a:p>
+            <a:p>
+              <a:r>
+                <a:rPr lang="en-GB" sz="1600" dirty="0">
+                  <a:solidFill>
+                    <a:schemeClr val="bg1">
+                      <a:lumMod val="95000"/>
+                      <a:lumOff val="5000"/>
+                    </a:schemeClr>
+                  </a:solidFill>
+                  <a:latin typeface="Consolas" panose="020B0609020204030204" pitchFamily="49" charset="0"/>
+                </a:rPr>
+                <a:t>    </a:t>
+              </a:r>
+              <a:r>
+                <a:rPr lang="en-GB" sz="1600" dirty="0">
+                  <a:solidFill>
+                    <a:schemeClr val="accent1">
+                      <a:lumMod val="75000"/>
+                    </a:schemeClr>
+                  </a:solidFill>
+                  <a:latin typeface="Consolas" panose="020B0609020204030204" pitchFamily="49" charset="0"/>
+                </a:rPr>
+                <a:t>)</a:t>
+              </a:r>
+            </a:p>
+            <a:p>
+              <a:r>
+                <a:rPr lang="en-GB" sz="1600" dirty="0">
+                  <a:solidFill>
+                    <a:schemeClr val="bg2">
+                      <a:lumMod val="75000"/>
+                    </a:schemeClr>
+                  </a:solidFill>
+                  <a:latin typeface="Consolas" panose="020B0609020204030204" pitchFamily="49" charset="0"/>
+                </a:rPr>
+                <a:t>)</a:t>
+              </a:r>
+            </a:p>
+          </p:txBody>
+        </p:sp>
+      </p:grpSp>
+      <p:sp>
+        <p:nvSpPr>
+          <p:cNvPr id="27" name="TextBox 26">
+            <a:extLst>
+              <a:ext uri="{FF2B5EF4-FFF2-40B4-BE49-F238E27FC236}">
+                <a16:creationId xmlns:a16="http://schemas.microsoft.com/office/drawing/2014/main" id="{2D5B71C1-14CC-4752-B9A8-21CCF3FD711D}"/>
+              </a:ext>
+            </a:extLst>
+          </p:cNvPr>
+          <p:cNvSpPr txBox="1"/>
+          <p:nvPr/>
+        </p:nvSpPr>
+        <p:spPr>
+          <a:xfrm>
+            <a:off x="6348247" y="1774796"/>
+            <a:ext cx="2848657" cy="584775"/>
+          </a:xfrm>
+          <a:prstGeom prst="rect">
+            <a:avLst/>
+          </a:prstGeom>
+          <a:noFill/>
+        </p:spPr>
+        <p:txBody>
+          <a:bodyPr wrap="square" rtlCol="0">
+            <a:spAutoFit/>
+          </a:bodyPr>
+          <a:lstStyle/>
+          <a:p>
+            <a:r>
+              <a:rPr lang="en-GB" sz="3200" dirty="0">
+                <a:solidFill>
+                  <a:schemeClr val="bg1"/>
+                </a:solidFill>
+              </a:rPr>
+              <a:t>Title</a:t>
+            </a:r>
+          </a:p>
+        </p:txBody>
+      </p:sp>
+      <p:sp>
+        <p:nvSpPr>
+          <p:cNvPr id="28" name="TextBox 27">
+            <a:extLst>
+              <a:ext uri="{FF2B5EF4-FFF2-40B4-BE49-F238E27FC236}">
+                <a16:creationId xmlns:a16="http://schemas.microsoft.com/office/drawing/2014/main" id="{8EE31F69-9D61-4487-84B1-EA47FD2CC172}"/>
+              </a:ext>
+            </a:extLst>
+          </p:cNvPr>
+          <p:cNvSpPr txBox="1"/>
+          <p:nvPr/>
+        </p:nvSpPr>
+        <p:spPr>
+          <a:xfrm>
+            <a:off x="6520337" y="2768424"/>
+            <a:ext cx="1234962" cy="400110"/>
+          </a:xfrm>
+          <a:prstGeom prst="rect">
+            <a:avLst/>
+          </a:prstGeom>
+          <a:noFill/>
+        </p:spPr>
+        <p:txBody>
+          <a:bodyPr wrap="square" rtlCol="0">
+            <a:spAutoFit/>
+          </a:bodyPr>
+          <a:lstStyle/>
+          <a:p>
+            <a:r>
+              <a:rPr lang="en-GB" sz="2000" dirty="0">
+                <a:solidFill>
+                  <a:schemeClr val="bg1"/>
+                </a:solidFill>
+              </a:rPr>
+              <a:t>Inputs…</a:t>
+            </a:r>
+          </a:p>
+        </p:txBody>
+      </p:sp>
+      <p:sp>
+        <p:nvSpPr>
+          <p:cNvPr id="29" name="TextBox 28">
+            <a:extLst>
+              <a:ext uri="{FF2B5EF4-FFF2-40B4-BE49-F238E27FC236}">
+                <a16:creationId xmlns:a16="http://schemas.microsoft.com/office/drawing/2014/main" id="{26080F22-FDEF-410B-A0D0-67DA53833F53}"/>
+              </a:ext>
+            </a:extLst>
+          </p:cNvPr>
+          <p:cNvSpPr txBox="1"/>
+          <p:nvPr/>
+        </p:nvSpPr>
+        <p:spPr>
+          <a:xfrm>
+            <a:off x="8177680" y="2768424"/>
+            <a:ext cx="2038448" cy="400110"/>
+          </a:xfrm>
+          <a:prstGeom prst="rect">
+            <a:avLst/>
+          </a:prstGeom>
+          <a:noFill/>
+        </p:spPr>
+        <p:txBody>
+          <a:bodyPr wrap="square" rtlCol="0">
+            <a:spAutoFit/>
+          </a:bodyPr>
+          <a:lstStyle/>
+          <a:p>
+            <a:r>
+              <a:rPr lang="en-GB" sz="2000" dirty="0">
+                <a:solidFill>
+                  <a:schemeClr val="bg1"/>
+                </a:solidFill>
+              </a:rPr>
+              <a:t>Outputs…</a:t>
+            </a:r>
+          </a:p>
+        </p:txBody>
+      </p:sp>
+    </p:spTree>
+    <p:extLst>
+      <p:ext uri="{BB962C8B-B14F-4D97-AF65-F5344CB8AC3E}">
+        <p14:creationId xmlns:p14="http://schemas.microsoft.com/office/powerpoint/2010/main" val="379422893"/>
+      </p:ext>
+    </p:extLst>
+  </p:cSld>
+  <p:clrMapOvr>
+    <a:masterClrMapping/>
+  </p:clrMapOvr>
+  <p:timing>
+    <p:tnLst>
+      <p:par>
+        <p:cTn id="1" dur="indefinite" restart="never" nodeType="tmRoot">
+          <p:childTnLst>
+            <p:seq concurrent="1" nextAc="seek">
+              <p:cTn id="2" dur="indefinite" nodeType="mainSeq">
+                <p:childTnLst>
+                  <p:par>
+                    <p:cTn id="3" fill="hold">
+                      <p:stCondLst>
+                        <p:cond delay="indefinite"/>
+                      </p:stCondLst>
+                      <p:childTnLst>
+                        <p:par>
+                          <p:cTn id="4" fill="hold">
+                            <p:stCondLst>
+                              <p:cond delay="0"/>
+                            </p:stCondLst>
+                            <p:childTnLst>
+                              <p:par>
+                                <p:cTn id="5" presetID="10" presetClass="entr" presetSubtype="0" fill="hold" nodeType="clickEffect">
+                                  <p:stCondLst>
+                                    <p:cond delay="0"/>
+                                  </p:stCondLst>
+                                  <p:childTnLst>
+                                    <p:set>
+                                      <p:cBhvr>
+                                        <p:cTn id="6" dur="1" fill="hold">
+                                          <p:stCondLst>
+                                            <p:cond delay="0"/>
+                                          </p:stCondLst>
+                                        </p:cTn>
+                                        <p:tgtEl>
+                                          <p:spTgt spid="22"/>
+                                        </p:tgtEl>
+                                        <p:attrNameLst>
+                                          <p:attrName>style.visibility</p:attrName>
+                                        </p:attrNameLst>
+                                      </p:cBhvr>
+                                      <p:to>
+                                        <p:strVal val="visible"/>
+                                      </p:to>
+                                    </p:set>
+                                    <p:animEffect transition="in" filter="fade">
+                                      <p:cBhvr>
+                                        <p:cTn id="7" dur="500"/>
+                                        <p:tgtEl>
+                                          <p:spTgt spid="22"/>
+                                        </p:tgtEl>
+                                      </p:cBhvr>
+                                    </p:animEffect>
+                                  </p:childTnLst>
+                                </p:cTn>
+                              </p:par>
+                            </p:childTnLst>
+                          </p:cTn>
+                        </p:par>
+                      </p:childTnLst>
+                    </p:cTn>
+                  </p:par>
+                  <p:par>
+                    <p:cTn id="8" fill="hold">
+                      <p:stCondLst>
+                        <p:cond delay="indefinite"/>
+                      </p:stCondLst>
+                      <p:childTnLst>
+                        <p:par>
+                          <p:cTn id="9" fill="hold">
+                            <p:stCondLst>
+                              <p:cond delay="0"/>
+                            </p:stCondLst>
+                            <p:childTnLst>
+                              <p:par>
+                                <p:cTn id="10" presetID="10" presetClass="entr" presetSubtype="0" fill="hold" nodeType="clickEffect">
+                                  <p:stCondLst>
+                                    <p:cond delay="0"/>
+                                  </p:stCondLst>
+                                  <p:childTnLst>
+                                    <p:set>
+                                      <p:cBhvr>
+                                        <p:cTn id="11" dur="1" fill="hold">
+                                          <p:stCondLst>
+                                            <p:cond delay="0"/>
+                                          </p:stCondLst>
+                                        </p:cTn>
+                                        <p:tgtEl>
+                                          <p:spTgt spid="26"/>
+                                        </p:tgtEl>
+                                        <p:attrNameLst>
+                                          <p:attrName>style.visibility</p:attrName>
+                                        </p:attrNameLst>
+                                      </p:cBhvr>
+                                      <p:to>
+                                        <p:strVal val="visible"/>
+                                      </p:to>
+                                    </p:set>
+                                    <p:animEffect transition="in" filter="fade">
+                                      <p:cBhvr>
+                                        <p:cTn id="12" dur="500"/>
+                                        <p:tgtEl>
+                                          <p:spTgt spid="26"/>
+                                        </p:tgtEl>
+                                      </p:cBhvr>
+                                    </p:animEffect>
+                                  </p:childTnLst>
+                                </p:cTn>
+                              </p:par>
+                              <p:par>
+                                <p:cTn id="13" presetID="10" presetClass="entr" presetSubtype="0" fill="hold" nodeType="withEffect">
+                                  <p:stCondLst>
+                                    <p:cond delay="0"/>
+                                  </p:stCondLst>
+                                  <p:childTnLst>
+                                    <p:set>
+                                      <p:cBhvr>
+                                        <p:cTn id="14" dur="1" fill="hold">
+                                          <p:stCondLst>
+                                            <p:cond delay="0"/>
+                                          </p:stCondLst>
+                                        </p:cTn>
+                                        <p:tgtEl>
+                                          <p:spTgt spid="25"/>
+                                        </p:tgtEl>
+                                        <p:attrNameLst>
+                                          <p:attrName>style.visibility</p:attrName>
+                                        </p:attrNameLst>
+                                      </p:cBhvr>
+                                      <p:to>
+                                        <p:strVal val="visible"/>
+                                      </p:to>
+                                    </p:set>
+                                    <p:animEffect transition="in" filter="fade">
+                                      <p:cBhvr>
+                                        <p:cTn id="15" dur="500"/>
+                                        <p:tgtEl>
+                                          <p:spTgt spid="25"/>
+                                        </p:tgtEl>
+                                      </p:cBhvr>
+                                    </p:animEffect>
+                                  </p:childTnLst>
+                                </p:cTn>
+                              </p:par>
+                            </p:childTnLst>
+                          </p:cTn>
+                        </p:par>
+                      </p:childTnLst>
+                    </p:cTn>
+                  </p:par>
+                </p:childTnLst>
+              </p:cTn>
+              <p:prevCondLst>
+                <p:cond evt="onPrev" delay="0">
+                  <p:tgtEl>
+                    <p:sldTgt/>
+                  </p:tgtEl>
+                </p:cond>
+              </p:prevCondLst>
+              <p:nextCondLst>
+                <p:cond evt="onNext" delay="0">
+                  <p:tgtEl>
+                    <p:sldTgt/>
+                  </p:tgtEl>
+                </p:cond>
+              </p:nextCondLst>
+            </p:seq>
+          </p:childTnLst>
+        </p:cTn>
+      </p:par>
+    </p:tnLst>
+  </p:timing>
 </p:sld>
 </file>
 
@@ -21460,6 +24320,124 @@
           </p:txBody>
         </p:sp>
       </p:grpSp>
+      <p:grpSp>
+        <p:nvGrpSpPr>
+          <p:cNvPr id="18" name="Group 17">
+            <a:extLst>
+              <a:ext uri="{FF2B5EF4-FFF2-40B4-BE49-F238E27FC236}">
+                <a16:creationId xmlns:a16="http://schemas.microsoft.com/office/drawing/2014/main" id="{F143B0D9-F7FB-4D00-92E2-090FBFF468B0}"/>
+              </a:ext>
+            </a:extLst>
+          </p:cNvPr>
+          <p:cNvGrpSpPr/>
+          <p:nvPr/>
+        </p:nvGrpSpPr>
+        <p:grpSpPr>
+          <a:xfrm>
+            <a:off x="2674776" y="949186"/>
+            <a:ext cx="6842448" cy="4959628"/>
+            <a:chOff x="2674776" y="949186"/>
+            <a:chExt cx="6842448" cy="4959628"/>
+          </a:xfrm>
+        </p:grpSpPr>
+        <p:pic>
+          <p:nvPicPr>
+            <p:cNvPr id="10" name="Picture 9">
+              <a:extLst>
+                <a:ext uri="{FF2B5EF4-FFF2-40B4-BE49-F238E27FC236}">
+                  <a16:creationId xmlns:a16="http://schemas.microsoft.com/office/drawing/2014/main" id="{F5713540-BD38-4002-8DE4-A5478AB092F8}"/>
+                </a:ext>
+              </a:extLst>
+            </p:cNvPr>
+            <p:cNvPicPr>
+              <a:picLocks noChangeAspect="1"/>
+            </p:cNvPicPr>
+            <p:nvPr/>
+          </p:nvPicPr>
+          <p:blipFill>
+            <a:blip r:embed="rId3"/>
+            <a:stretch>
+              <a:fillRect/>
+            </a:stretch>
+          </p:blipFill>
+          <p:spPr>
+            <a:xfrm>
+              <a:off x="2674776" y="949186"/>
+              <a:ext cx="6842448" cy="4959628"/>
+            </a:xfrm>
+            <a:prstGeom prst="rect">
+              <a:avLst/>
+            </a:prstGeom>
+          </p:spPr>
+        </p:pic>
+        <p:sp>
+          <p:nvSpPr>
+            <p:cNvPr id="11" name="Rectangle: Rounded Corners 10">
+              <a:extLst>
+                <a:ext uri="{FF2B5EF4-FFF2-40B4-BE49-F238E27FC236}">
+                  <a16:creationId xmlns:a16="http://schemas.microsoft.com/office/drawing/2014/main" id="{67D85D37-9E79-4791-8DDD-AF62231666D1}"/>
+                </a:ext>
+              </a:extLst>
+            </p:cNvPr>
+            <p:cNvSpPr/>
+            <p:nvPr/>
+          </p:nvSpPr>
+          <p:spPr>
+            <a:xfrm>
+              <a:off x="3090598" y="2744791"/>
+              <a:ext cx="6134681" cy="1763740"/>
+            </a:xfrm>
+            <a:prstGeom prst="roundRect">
+              <a:avLst/>
+            </a:prstGeom>
+            <a:solidFill>
+              <a:schemeClr val="accent3">
+                <a:lumMod val="20000"/>
+                <a:lumOff val="80000"/>
+              </a:schemeClr>
+            </a:solidFill>
+            <a:ln>
+              <a:noFill/>
+            </a:ln>
+            <a:effectLst>
+              <a:outerShdw blurRad="50800" dist="114300" dir="6900000" sx="101000" sy="101000" algn="tr" rotWithShape="0">
+                <a:prstClr val="black">
+                  <a:alpha val="10000"/>
+                </a:prstClr>
+              </a:outerShdw>
+              <a:softEdge rad="31750"/>
+            </a:effectLst>
+          </p:spPr>
+          <p:style>
+            <a:lnRef idx="2">
+              <a:schemeClr val="accent5"/>
+            </a:lnRef>
+            <a:fillRef idx="1">
+              <a:schemeClr val="lt1"/>
+            </a:fillRef>
+            <a:effectRef idx="0">
+              <a:schemeClr val="accent5"/>
+            </a:effectRef>
+            <a:fontRef idx="minor">
+              <a:schemeClr val="dk1"/>
+            </a:fontRef>
+          </p:style>
+          <p:txBody>
+            <a:bodyPr rtlCol="0" anchor="ctr"/>
+            <a:lstStyle/>
+            <a:p>
+              <a:pPr algn="ctr"/>
+              <a:r>
+                <a:rPr lang="en-GB" sz="2400" dirty="0">
+                  <a:hlinkClick r:id="rId4"/>
+                </a:rPr>
+                <a:t>https://shiny.rstudio.com/images/shiny-cheatsheet.pdf</a:t>
+              </a:r>
+              <a:endParaRPr lang="en-GB" sz="2400" dirty="0"/>
+            </a:p>
+          </p:txBody>
+        </p:sp>
+      </p:grpSp>
     </p:spTree>
     <p:extLst>
       <p:ext uri="{BB962C8B-B14F-4D97-AF65-F5344CB8AC3E}">
@@ -21470,6 +24448,89 @@
   <p:clrMapOvr>
     <a:masterClrMapping/>
   </p:clrMapOvr>
+  <p:timing>
+    <p:tnLst>
+      <p:par>
+        <p:cTn id="1" dur="indefinite" restart="never" nodeType="tmRoot">
+          <p:childTnLst>
+            <p:seq concurrent="1" nextAc="seek">
+              <p:cTn id="2" dur="indefinite" nodeType="mainSeq">
+                <p:childTnLst>
+                  <p:par>
+                    <p:cTn id="3" fill="hold">
+                      <p:stCondLst>
+                        <p:cond delay="indefinite"/>
+                      </p:stCondLst>
+                      <p:childTnLst>
+                        <p:par>
+                          <p:cTn id="4" fill="hold">
+                            <p:stCondLst>
+                              <p:cond delay="0"/>
+                            </p:stCondLst>
+                            <p:childTnLst>
+                              <p:par>
+                                <p:cTn id="5" presetID="10" presetClass="entr" presetSubtype="0" fill="hold" nodeType="clickEffect">
+                                  <p:stCondLst>
+                                    <p:cond delay="0"/>
+                                  </p:stCondLst>
+                                  <p:childTnLst>
+                                    <p:set>
+                                      <p:cBhvr>
+                                        <p:cTn id="6" dur="1" fill="hold">
+                                          <p:stCondLst>
+                                            <p:cond delay="0"/>
+                                          </p:stCondLst>
+                                        </p:cTn>
+                                        <p:tgtEl>
+                                          <p:spTgt spid="18"/>
+                                        </p:tgtEl>
+                                        <p:attrNameLst>
+                                          <p:attrName>style.visibility</p:attrName>
+                                        </p:attrNameLst>
+                                      </p:cBhvr>
+                                      <p:to>
+                                        <p:strVal val="visible"/>
+                                      </p:to>
+                                    </p:set>
+                                    <p:animEffect transition="in" filter="fade">
+                                      <p:cBhvr>
+                                        <p:cTn id="7" dur="500"/>
+                                        <p:tgtEl>
+                                          <p:spTgt spid="18"/>
+                                        </p:tgtEl>
+                                      </p:cBhvr>
+                                    </p:animEffect>
+                                  </p:childTnLst>
+                                </p:cTn>
+                              </p:par>
+                            </p:childTnLst>
+                          </p:cTn>
+                        </p:par>
+                      </p:childTnLst>
+                    </p:cTn>
+                  </p:par>
+                </p:childTnLst>
+              </p:cTn>
+              <p:prevCondLst>
+                <p:cond evt="onPrev" delay="0">
+                  <p:tgtEl>
+                    <p:sldTgt/>
+                  </p:tgtEl>
+                </p:cond>
+              </p:prevCondLst>
+              <p:nextCondLst>
+                <p:cond evt="onNext" delay="0">
+                  <p:tgtEl>
+                    <p:sldTgt/>
+                  </p:tgtEl>
+                </p:cond>
+              </p:nextCondLst>
+            </p:seq>
+          </p:childTnLst>
+        </p:cTn>
+      </p:par>
+    </p:tnLst>
+  </p:timing>
 </p:sld>
 </file>
 
@@ -22562,13 +25623,13 @@
   <p:clrMapOvr>
     <a:masterClrMapping/>
   </p:clrMapOvr>
-  <mc:AlternateContent xmlns:mc="http://schemas.openxmlformats.org/markup-compatibility/2006">
-    <mc:Choice xmlns="" xmlns:p159="http://schemas.microsoft.com/office/powerpoint/2015/09/main" Requires="p159">
+  <mc:AlternateContent xmlns:mc="http://schemas.openxmlformats.org/markup-compatibility/2006" xmlns:p159="http://schemas.microsoft.com/office/powerpoint/2015/09/main">
+    <mc:Choice Requires="p159">
       <p:transition xmlns:p14="http://schemas.microsoft.com/office/powerpoint/2010/main" spd="slow" p14:dur="2000">
         <p159:morph option="byObject"/>
       </p:transition>
     </mc:Choice>
-    <mc:Fallback>
+    <mc:Fallback xmlns="">
       <p:transition spd="slow">
         <p:fade/>
       </p:transition>
@@ -22844,12 +25905,9 @@
 </file>
 
 <file path=customXml/item1.xml><?xml version="1.0" encoding="utf-8"?>
-<?mso-contentType ?>
-<FormTemplates xmlns="http://schemas.microsoft.com/sharepoint/v3/contenttype/forms">
-  <Display>DocumentLibraryForm</Display>
-  <Edit>DocumentLibraryForm</Edit>
-  <New>DocumentLibraryForm</New>
-</FormTemplates>
+<p:properties xmlns:p="http://schemas.microsoft.com/office/2006/metadata/properties" xmlns:xsi="http://www.w3.org/2001/XMLSchema-instance" xmlns:pc="http://schemas.microsoft.com/office/infopath/2007/PartnerControls">
+  <documentManagement/>
+</p:properties>
 </file>
 
 <file path=customXml/item2.xml><?xml version="1.0" encoding="utf-8"?>
@@ -23076,15 +26134,19 @@
 </file>
 
 <file path=customXml/item3.xml><?xml version="1.0" encoding="utf-8"?>
-<p:properties xmlns:p="http://schemas.microsoft.com/office/2006/metadata/properties" xmlns:xsi="http://www.w3.org/2001/XMLSchema-instance" xmlns:pc="http://schemas.microsoft.com/office/infopath/2007/PartnerControls">
-  <documentManagement/>
-</p:properties>
+<?mso-contentType ?>
+<FormTemplates xmlns="http://schemas.microsoft.com/sharepoint/v3/contenttype/forms">
+  <Display>DocumentLibraryForm</Display>
+  <Edit>DocumentLibraryForm</Edit>
+  <New>DocumentLibraryForm</New>
+</FormTemplates>
 </file>
 
 <file path=customXml/itemProps1.xml><?xml version="1.0" encoding="utf-8"?>
-<ds:datastoreItem xmlns:ds="http://schemas.openxmlformats.org/officeDocument/2006/customXml" ds:itemID="{473A845A-2E2B-48C8-9A01-4445D4EAB389}">
+<ds:datastoreItem xmlns:ds="http://schemas.openxmlformats.org/officeDocument/2006/customXml" ds:itemID="{7BB1F7E6-706A-4BB7-B2E4-66E62B47D47E}">
   <ds:schemaRefs>
-    <ds:schemaRef ds:uri="http://schemas.microsoft.com/sharepoint/v3/contenttype/forms"/>
+    <ds:schemaRef ds:uri="http://schemas.microsoft.com/office/2006/metadata/properties"/>
+    <ds:schemaRef ds:uri="http://schemas.microsoft.com/office/infopath/2007/PartnerControls"/>
   </ds:schemaRefs>
 </ds:datastoreItem>
 </file>
@@ -23109,18 +26171,9 @@
 </file>
 
 <file path=customXml/itemProps3.xml><?xml version="1.0" encoding="utf-8"?>
-<ds:datastoreItem xmlns:ds="http://schemas.openxmlformats.org/officeDocument/2006/customXml" ds:itemID="{7BB1F7E6-706A-4BB7-B2E4-66E62B47D47E}">
+<ds:datastoreItem xmlns:ds="http://schemas.openxmlformats.org/officeDocument/2006/customXml" ds:itemID="{473A845A-2E2B-48C8-9A01-4445D4EAB389}">
   <ds:schemaRefs>
-    <ds:schemaRef ds:uri="http://schemas.openxmlformats.org/package/2006/metadata/core-properties"/>
-    <ds:schemaRef ds:uri="http://schemas.microsoft.com/office/2006/documentManagement/types"/>
-    <ds:schemaRef ds:uri="http://schemas.microsoft.com/office/infopath/2007/PartnerControls"/>
-    <ds:schemaRef ds:uri="http://purl.org/dc/elements/1.1/"/>
-    <ds:schemaRef ds:uri="http://schemas.microsoft.com/office/2006/metadata/properties"/>
-    <ds:schemaRef ds:uri="e7d8f92c-3952-4b7d-acc4-88cf8f2f7888"/>
-    <ds:schemaRef ds:uri="http://purl.org/dc/terms/"/>
-    <ds:schemaRef ds:uri="b24ac480-a0b1-4388-a6cd-cfb001cdf6c7"/>
-    <ds:schemaRef ds:uri="http://www.w3.org/XML/1998/namespace"/>
-    <ds:schemaRef ds:uri="http://purl.org/dc/dcmitype/"/>
+    <ds:schemaRef ds:uri="http://schemas.microsoft.com/sharepoint/v3/contenttype/forms"/>
   </ds:schemaRefs>
 </ds:datastoreItem>
 </file>
</xml_diff>